<commit_message>
Droped some of my slides so that it becomes shorter
Relayouted Tabeas slides to fit Jens and my layout
</commit_message>
<xml_diff>
--- a/Impulsvortrag/4_Activity_Grounded_Hybrid_Theory.pptx
+++ b/Impulsvortrag/4_Activity_Grounded_Hybrid_Theory.pptx
@@ -2,7 +2,7 @@
 <file path=ppt/presentation.xml><?xml version="1.0" encoding="utf-8"?>
 <p:presentation xmlns:a="http://schemas.openxmlformats.org/drawingml/2006/main" xmlns:r="http://schemas.openxmlformats.org/officeDocument/2006/relationships" xmlns:p="http://schemas.openxmlformats.org/presentationml/2006/main" saveSubsetFonts="1">
   <p:sldMasterIdLst>
-    <p:sldMasterId id="2147483900" r:id="rId1"/>
+    <p:sldMasterId id="2147483924" r:id="rId1"/>
   </p:sldMasterIdLst>
   <p:sldIdLst>
     <p:sldId id="256" r:id="rId2"/>
@@ -106,6 +106,22 @@
       </a:defRPr>
     </a:lvl9pPr>
   </p:defaultTextStyle>
+  <p:extLst>
+    <p:ext uri="{EFAFB233-063F-42B5-8137-9DF3F51BA10A}">
+      <p15:sldGuideLst xmlns:p15="http://schemas.microsoft.com/office/powerpoint/2012/main">
+        <p15:guide id="1" orient="horz" pos="2160">
+          <p15:clr>
+            <a:srgbClr val="A4A3A4"/>
+          </p15:clr>
+        </p15:guide>
+        <p15:guide id="2" pos="2880">
+          <p15:clr>
+            <a:srgbClr val="A4A3A4"/>
+          </p15:clr>
+        </p15:guide>
+      </p15:sldGuideLst>
+    </p:ext>
+  </p:extLst>
 </p:presentation>
 </file>
 
@@ -1826,6 +1842,13 @@
         </dgm:presLayoutVars>
       </dgm:prSet>
       <dgm:spPr/>
+      <dgm:t>
+        <a:bodyPr/>
+        <a:lstStyle/>
+        <a:p>
+          <a:endParaRPr lang="de-DE"/>
+        </a:p>
+      </dgm:t>
     </dgm:pt>
     <dgm:pt modelId="{BE9C9A74-B427-4D9B-97B2-6636A09FDBAC}" type="pres">
       <dgm:prSet presAssocID="{888F3C9D-9AB8-40A9-BB25-70718C74FC0D}" presName="node" presStyleLbl="node1" presStyleIdx="0" presStyleCnt="3">
@@ -1849,6 +1872,13 @@
     <dgm:pt modelId="{E52E9E77-30A9-446B-B6E7-F10DD6257421}" type="pres">
       <dgm:prSet presAssocID="{0E101679-2D5C-4B22-B4AC-9A4BA254570C}" presName="sibTrans" presStyleLbl="sibTrans1D1" presStyleIdx="0" presStyleCnt="3"/>
       <dgm:spPr/>
+      <dgm:t>
+        <a:bodyPr/>
+        <a:lstStyle/>
+        <a:p>
+          <a:endParaRPr lang="de-DE"/>
+        </a:p>
+      </dgm:t>
     </dgm:pt>
     <dgm:pt modelId="{903B71E9-A3DD-4708-A62B-744D8945C04C}" type="pres">
       <dgm:prSet presAssocID="{CA136722-4657-4B20-BF53-67B9036F0CB8}" presName="node" presStyleLbl="node1" presStyleIdx="1" presStyleCnt="3">
@@ -1872,6 +1902,13 @@
     <dgm:pt modelId="{16605E07-EC61-4879-AF33-FCEF7199F9BF}" type="pres">
       <dgm:prSet presAssocID="{236993A6-D9DD-476E-B984-C55FCF7883A9}" presName="sibTrans" presStyleLbl="sibTrans1D1" presStyleIdx="1" presStyleCnt="3"/>
       <dgm:spPr/>
+      <dgm:t>
+        <a:bodyPr/>
+        <a:lstStyle/>
+        <a:p>
+          <a:endParaRPr lang="de-DE"/>
+        </a:p>
+      </dgm:t>
     </dgm:pt>
     <dgm:pt modelId="{0DD0F4A5-9E5C-4510-8FC1-9E20E8E3741B}" type="pres">
       <dgm:prSet presAssocID="{E1D8D4A4-08A1-4F14-A4FF-E38FC5B80912}" presName="node" presStyleLbl="node1" presStyleIdx="2" presStyleCnt="3">
@@ -1895,19 +1932,26 @@
     <dgm:pt modelId="{B4337CB5-A10A-4031-BF3D-0E952902C3AE}" type="pres">
       <dgm:prSet presAssocID="{995EC6C3-2C46-4AF8-A609-F6B171B829A4}" presName="sibTrans" presStyleLbl="sibTrans1D1" presStyleIdx="2" presStyleCnt="3"/>
       <dgm:spPr/>
+      <dgm:t>
+        <a:bodyPr/>
+        <a:lstStyle/>
+        <a:p>
+          <a:endParaRPr lang="de-DE"/>
+        </a:p>
+      </dgm:t>
     </dgm:pt>
   </dgm:ptLst>
   <dgm:cxnLst>
+    <dgm:cxn modelId="{F8873359-FA40-4EA0-9538-BFF279DFFC4B}" srcId="{1D172BBA-A3F6-40CE-9E33-3AAEAAA19B68}" destId="{CA136722-4657-4B20-BF53-67B9036F0CB8}" srcOrd="1" destOrd="0" parTransId="{7CF23150-B4D1-4094-946A-6E3FA722CB65}" sibTransId="{236993A6-D9DD-476E-B984-C55FCF7883A9}"/>
+    <dgm:cxn modelId="{B3D83F0C-2601-45CD-9404-33DF300D517D}" srcId="{1D172BBA-A3F6-40CE-9E33-3AAEAAA19B68}" destId="{888F3C9D-9AB8-40A9-BB25-70718C74FC0D}" srcOrd="0" destOrd="0" parTransId="{E6EB266E-5B44-4760-9195-D5D5B5407979}" sibTransId="{0E101679-2D5C-4B22-B4AC-9A4BA254570C}"/>
     <dgm:cxn modelId="{10B6853D-9C1F-478C-BC5E-987825091D0E}" type="presOf" srcId="{CA136722-4657-4B20-BF53-67B9036F0CB8}" destId="{903B71E9-A3DD-4708-A62B-744D8945C04C}" srcOrd="0" destOrd="0" presId="urn:microsoft.com/office/officeart/2005/8/layout/cycle5"/>
-    <dgm:cxn modelId="{B3D83F0C-2601-45CD-9404-33DF300D517D}" srcId="{1D172BBA-A3F6-40CE-9E33-3AAEAAA19B68}" destId="{888F3C9D-9AB8-40A9-BB25-70718C74FC0D}" srcOrd="0" destOrd="0" parTransId="{E6EB266E-5B44-4760-9195-D5D5B5407979}" sibTransId="{0E101679-2D5C-4B22-B4AC-9A4BA254570C}"/>
+    <dgm:cxn modelId="{8EFE629A-B36C-4AF3-846F-BEC7AA9C0CC4}" type="presOf" srcId="{1D172BBA-A3F6-40CE-9E33-3AAEAAA19B68}" destId="{08FEDF54-9A5F-4462-B506-BCE0D51A27A0}" srcOrd="0" destOrd="0" presId="urn:microsoft.com/office/officeart/2005/8/layout/cycle5"/>
+    <dgm:cxn modelId="{30514C0B-C92C-48A4-A9AB-356D91C8A571}" srcId="{1D172BBA-A3F6-40CE-9E33-3AAEAAA19B68}" destId="{E1D8D4A4-08A1-4F14-A4FF-E38FC5B80912}" srcOrd="2" destOrd="0" parTransId="{2E41F75C-7E46-4A62-8C1E-66472EE22E3C}" sibTransId="{995EC6C3-2C46-4AF8-A609-F6B171B829A4}"/>
     <dgm:cxn modelId="{57A935BD-B250-4092-87AC-2110021A1B66}" type="presOf" srcId="{995EC6C3-2C46-4AF8-A609-F6B171B829A4}" destId="{B4337CB5-A10A-4031-BF3D-0E952902C3AE}" srcOrd="0" destOrd="0" presId="urn:microsoft.com/office/officeart/2005/8/layout/cycle5"/>
-    <dgm:cxn modelId="{30514C0B-C92C-48A4-A9AB-356D91C8A571}" srcId="{1D172BBA-A3F6-40CE-9E33-3AAEAAA19B68}" destId="{E1D8D4A4-08A1-4F14-A4FF-E38FC5B80912}" srcOrd="2" destOrd="0" parTransId="{2E41F75C-7E46-4A62-8C1E-66472EE22E3C}" sibTransId="{995EC6C3-2C46-4AF8-A609-F6B171B829A4}"/>
-    <dgm:cxn modelId="{F8873359-FA40-4EA0-9538-BFF279DFFC4B}" srcId="{1D172BBA-A3F6-40CE-9E33-3AAEAAA19B68}" destId="{CA136722-4657-4B20-BF53-67B9036F0CB8}" srcOrd="1" destOrd="0" parTransId="{7CF23150-B4D1-4094-946A-6E3FA722CB65}" sibTransId="{236993A6-D9DD-476E-B984-C55FCF7883A9}"/>
-    <dgm:cxn modelId="{8EFE629A-B36C-4AF3-846F-BEC7AA9C0CC4}" type="presOf" srcId="{1D172BBA-A3F6-40CE-9E33-3AAEAAA19B68}" destId="{08FEDF54-9A5F-4462-B506-BCE0D51A27A0}" srcOrd="0" destOrd="0" presId="urn:microsoft.com/office/officeart/2005/8/layout/cycle5"/>
     <dgm:cxn modelId="{90A935DA-4B64-4548-8C48-D115D56EB693}" type="presOf" srcId="{E1D8D4A4-08A1-4F14-A4FF-E38FC5B80912}" destId="{0DD0F4A5-9E5C-4510-8FC1-9E20E8E3741B}" srcOrd="0" destOrd="0" presId="urn:microsoft.com/office/officeart/2005/8/layout/cycle5"/>
+    <dgm:cxn modelId="{CCACED45-3A08-41F5-AD4E-1F15A1C764FC}" type="presOf" srcId="{236993A6-D9DD-476E-B984-C55FCF7883A9}" destId="{16605E07-EC61-4879-AF33-FCEF7199F9BF}" srcOrd="0" destOrd="0" presId="urn:microsoft.com/office/officeart/2005/8/layout/cycle5"/>
     <dgm:cxn modelId="{4C38DB2C-6324-46D2-B2DD-DCB5F7BCEAB9}" type="presOf" srcId="{888F3C9D-9AB8-40A9-BB25-70718C74FC0D}" destId="{BE9C9A74-B427-4D9B-97B2-6636A09FDBAC}" srcOrd="0" destOrd="0" presId="urn:microsoft.com/office/officeart/2005/8/layout/cycle5"/>
     <dgm:cxn modelId="{59F86FC7-46B8-422C-B045-36294AD0E218}" type="presOf" srcId="{0E101679-2D5C-4B22-B4AC-9A4BA254570C}" destId="{E52E9E77-30A9-446B-B6E7-F10DD6257421}" srcOrd="0" destOrd="0" presId="urn:microsoft.com/office/officeart/2005/8/layout/cycle5"/>
-    <dgm:cxn modelId="{CCACED45-3A08-41F5-AD4E-1F15A1C764FC}" type="presOf" srcId="{236993A6-D9DD-476E-B984-C55FCF7883A9}" destId="{16605E07-EC61-4879-AF33-FCEF7199F9BF}" srcOrd="0" destOrd="0" presId="urn:microsoft.com/office/officeart/2005/8/layout/cycle5"/>
     <dgm:cxn modelId="{33691A64-F365-452F-BB34-6B8196BC7311}" type="presParOf" srcId="{08FEDF54-9A5F-4462-B506-BCE0D51A27A0}" destId="{BE9C9A74-B427-4D9B-97B2-6636A09FDBAC}" srcOrd="0" destOrd="0" presId="urn:microsoft.com/office/officeart/2005/8/layout/cycle5"/>
     <dgm:cxn modelId="{0AD02758-1BCB-4410-BAFD-C7DC83732099}" type="presParOf" srcId="{08FEDF54-9A5F-4462-B506-BCE0D51A27A0}" destId="{D7DC8D62-8481-43F7-ADE7-5D2068F3A585}" srcOrd="1" destOrd="0" presId="urn:microsoft.com/office/officeart/2005/8/layout/cycle5"/>
     <dgm:cxn modelId="{546D4629-22A6-4986-AC96-DCAECE7524BE}" type="presParOf" srcId="{08FEDF54-9A5F-4462-B506-BCE0D51A27A0}" destId="{E52E9E77-30A9-446B-B6E7-F10DD6257421}" srcOrd="2" destOrd="0" presId="urn:microsoft.com/office/officeart/2005/8/layout/cycle5"/>
@@ -1922,7 +1966,7 @@
   <dgm:whole/>
   <dgm:extLst>
     <a:ext uri="http://schemas.microsoft.com/office/drawing/2008/diagram">
-      <dsp:dataModelExt xmlns:dsp="http://schemas.microsoft.com/office/drawing/2008/diagram" xmlns="" relId="rId6" minVer="http://schemas.openxmlformats.org/drawingml/2006/diagram"/>
+      <dsp:dataModelExt xmlns:dsp="http://schemas.microsoft.com/office/drawing/2008/diagram" relId="rId6" minVer="http://schemas.openxmlformats.org/drawingml/2006/diagram"/>
     </a:ext>
   </dgm:extLst>
 </dgm:dataModel>
@@ -2102,6 +2146,13 @@
         </dgm:presLayoutVars>
       </dgm:prSet>
       <dgm:spPr/>
+      <dgm:t>
+        <a:bodyPr/>
+        <a:lstStyle/>
+        <a:p>
+          <a:endParaRPr lang="de-DE"/>
+        </a:p>
+      </dgm:t>
     </dgm:pt>
     <dgm:pt modelId="{3CCF0AC6-1077-4C8A-A896-3602296930E5}" type="pres">
       <dgm:prSet presAssocID="{8DC3DE76-903F-4759-A432-EE7CFB81B6BA}" presName="ellipse" presStyleLbl="trBgShp" presStyleIdx="0" presStyleCnt="1"/>
@@ -2163,6 +2214,13 @@
         </dgm:presLayoutVars>
       </dgm:prSet>
       <dgm:spPr/>
+      <dgm:t>
+        <a:bodyPr/>
+        <a:lstStyle/>
+        <a:p>
+          <a:endParaRPr lang="de-DE"/>
+        </a:p>
+      </dgm:t>
     </dgm:pt>
     <dgm:pt modelId="{1FBAEFC3-C401-42FD-9F16-EA927271936B}" type="pres">
       <dgm:prSet presAssocID="{8DC3DE76-903F-4759-A432-EE7CFB81B6BA}" presName="funnel" presStyleLbl="trAlignAcc1" presStyleIdx="0" presStyleCnt="1"/>
@@ -2170,15 +2228,15 @@
     </dgm:pt>
   </dgm:ptLst>
   <dgm:cxnLst>
+    <dgm:cxn modelId="{8EC27B23-1B3C-449A-9F41-B40200BA28E6}" srcId="{8DC3DE76-903F-4759-A432-EE7CFB81B6BA}" destId="{8F32951F-0516-44DB-A971-F56447B12ECE}" srcOrd="3" destOrd="0" parTransId="{4DC4D477-4FC3-4D5C-9A26-024EA25DD4F5}" sibTransId="{153A8A4D-FD22-4828-B45C-0A3AB292CE7A}"/>
+    <dgm:cxn modelId="{1CDFDC68-5ED5-4043-A979-D21AF9B67EAF}" srcId="{8DC3DE76-903F-4759-A432-EE7CFB81B6BA}" destId="{E4E46E1F-C2E2-43A9-983C-C350F2863ED8}" srcOrd="2" destOrd="0" parTransId="{4E3FDAFF-1EF9-4585-9204-907F323163DE}" sibTransId="{45FBBBDE-7383-45FD-84F4-ECF6DB458B03}"/>
+    <dgm:cxn modelId="{E35669E1-CBDC-4BC7-A467-A6D0D28FDCDE}" type="presOf" srcId="{8F32951F-0516-44DB-A971-F56447B12ECE}" destId="{C576A65B-8480-4509-83E9-F5A4C1FDA0FE}" srcOrd="0" destOrd="0" presId="urn:microsoft.com/office/officeart/2005/8/layout/funnel1"/>
+    <dgm:cxn modelId="{44D8C9B2-73B3-489B-904A-465A0AEF81DE}" type="presOf" srcId="{8DC3DE76-903F-4759-A432-EE7CFB81B6BA}" destId="{3EF277F9-90A1-4C20-8CA8-F2DDCD6B6388}" srcOrd="0" destOrd="0" presId="urn:microsoft.com/office/officeart/2005/8/layout/funnel1"/>
+    <dgm:cxn modelId="{3EC55052-A89E-4C3A-BE8A-14250781397B}" srcId="{8DC3DE76-903F-4759-A432-EE7CFB81B6BA}" destId="{E972E312-DBFF-41C7-8543-33BEDA3725E0}" srcOrd="0" destOrd="0" parTransId="{C497FFC2-94F0-49C8-83D3-4BE3B235E875}" sibTransId="{A3F11F0C-6849-4823-A505-453710D71D19}"/>
+    <dgm:cxn modelId="{0793501D-177D-4258-A943-93749DE12E74}" type="presOf" srcId="{66D69CCA-46B2-43AF-AB5C-F81F6C25C0E7}" destId="{747AEF02-8F1F-426A-9CAB-5D33747352F0}" srcOrd="0" destOrd="0" presId="urn:microsoft.com/office/officeart/2005/8/layout/funnel1"/>
+    <dgm:cxn modelId="{0F413C8A-BF29-4BEA-93D9-B35183B566C2}" srcId="{8DC3DE76-903F-4759-A432-EE7CFB81B6BA}" destId="{66D69CCA-46B2-43AF-AB5C-F81F6C25C0E7}" srcOrd="1" destOrd="0" parTransId="{74FBEE16-0640-49EB-9D1D-4271DF58FA50}" sibTransId="{E9C356B4-2A54-465C-A316-95F8E241D62C}"/>
     <dgm:cxn modelId="{5AB3C5F5-10DF-42AE-AA91-5D9F06FFFD67}" type="presOf" srcId="{E972E312-DBFF-41C7-8543-33BEDA3725E0}" destId="{CF9FA0BD-6C96-46C5-9109-4FEBED892E92}" srcOrd="0" destOrd="0" presId="urn:microsoft.com/office/officeart/2005/8/layout/funnel1"/>
-    <dgm:cxn modelId="{8EC27B23-1B3C-449A-9F41-B40200BA28E6}" srcId="{8DC3DE76-903F-4759-A432-EE7CFB81B6BA}" destId="{8F32951F-0516-44DB-A971-F56447B12ECE}" srcOrd="3" destOrd="0" parTransId="{4DC4D477-4FC3-4D5C-9A26-024EA25DD4F5}" sibTransId="{153A8A4D-FD22-4828-B45C-0A3AB292CE7A}"/>
-    <dgm:cxn modelId="{44D8C9B2-73B3-489B-904A-465A0AEF81DE}" type="presOf" srcId="{8DC3DE76-903F-4759-A432-EE7CFB81B6BA}" destId="{3EF277F9-90A1-4C20-8CA8-F2DDCD6B6388}" srcOrd="0" destOrd="0" presId="urn:microsoft.com/office/officeart/2005/8/layout/funnel1"/>
-    <dgm:cxn modelId="{1CDFDC68-5ED5-4043-A979-D21AF9B67EAF}" srcId="{8DC3DE76-903F-4759-A432-EE7CFB81B6BA}" destId="{E4E46E1F-C2E2-43A9-983C-C350F2863ED8}" srcOrd="2" destOrd="0" parTransId="{4E3FDAFF-1EF9-4585-9204-907F323163DE}" sibTransId="{45FBBBDE-7383-45FD-84F4-ECF6DB458B03}"/>
-    <dgm:cxn modelId="{0793501D-177D-4258-A943-93749DE12E74}" type="presOf" srcId="{66D69CCA-46B2-43AF-AB5C-F81F6C25C0E7}" destId="{747AEF02-8F1F-426A-9CAB-5D33747352F0}" srcOrd="0" destOrd="0" presId="urn:microsoft.com/office/officeart/2005/8/layout/funnel1"/>
-    <dgm:cxn modelId="{E35669E1-CBDC-4BC7-A467-A6D0D28FDCDE}" type="presOf" srcId="{8F32951F-0516-44DB-A971-F56447B12ECE}" destId="{C576A65B-8480-4509-83E9-F5A4C1FDA0FE}" srcOrd="0" destOrd="0" presId="urn:microsoft.com/office/officeart/2005/8/layout/funnel1"/>
     <dgm:cxn modelId="{C857A254-410E-4D0A-80F4-2A944BE7C360}" type="presOf" srcId="{E4E46E1F-C2E2-43A9-983C-C350F2863ED8}" destId="{8127A5E6-493F-44B3-A335-FCA2F1A02DFE}" srcOrd="0" destOrd="0" presId="urn:microsoft.com/office/officeart/2005/8/layout/funnel1"/>
-    <dgm:cxn modelId="{3EC55052-A89E-4C3A-BE8A-14250781397B}" srcId="{8DC3DE76-903F-4759-A432-EE7CFB81B6BA}" destId="{E972E312-DBFF-41C7-8543-33BEDA3725E0}" srcOrd="0" destOrd="0" parTransId="{C497FFC2-94F0-49C8-83D3-4BE3B235E875}" sibTransId="{A3F11F0C-6849-4823-A505-453710D71D19}"/>
-    <dgm:cxn modelId="{0F413C8A-BF29-4BEA-93D9-B35183B566C2}" srcId="{8DC3DE76-903F-4759-A432-EE7CFB81B6BA}" destId="{66D69CCA-46B2-43AF-AB5C-F81F6C25C0E7}" srcOrd="1" destOrd="0" parTransId="{74FBEE16-0640-49EB-9D1D-4271DF58FA50}" sibTransId="{E9C356B4-2A54-465C-A316-95F8E241D62C}"/>
     <dgm:cxn modelId="{EA70A1AD-9FFF-4AF7-BC26-B72A7B1D615C}" type="presParOf" srcId="{3EF277F9-90A1-4C20-8CA8-F2DDCD6B6388}" destId="{3CCF0AC6-1077-4C8A-A896-3602296930E5}" srcOrd="0" destOrd="0" presId="urn:microsoft.com/office/officeart/2005/8/layout/funnel1"/>
     <dgm:cxn modelId="{D4A72E7A-6A3F-42BD-A391-ED5A92BB3AEB}" type="presParOf" srcId="{3EF277F9-90A1-4C20-8CA8-F2DDCD6B6388}" destId="{449C4019-57EC-4A35-9F2B-0DBC75DCC6BB}" srcOrd="1" destOrd="0" presId="urn:microsoft.com/office/officeart/2005/8/layout/funnel1"/>
     <dgm:cxn modelId="{29FEF5C3-5F1C-4129-910A-0E858BAFB315}" type="presParOf" srcId="{3EF277F9-90A1-4C20-8CA8-F2DDCD6B6388}" destId="{C576A65B-8480-4509-83E9-F5A4C1FDA0FE}" srcOrd="2" destOrd="0" presId="urn:microsoft.com/office/officeart/2005/8/layout/funnel1"/>
@@ -2191,14 +2249,14 @@
   <dgm:whole/>
   <dgm:extLst>
     <a:ext uri="http://schemas.microsoft.com/office/drawing/2008/diagram">
-      <dsp:dataModelExt xmlns:dsp="http://schemas.microsoft.com/office/drawing/2008/diagram" xmlns="" relId="rId6" minVer="http://schemas.openxmlformats.org/drawingml/2006/diagram"/>
+      <dsp:dataModelExt xmlns:dsp="http://schemas.microsoft.com/office/drawing/2008/diagram" relId="rId6" minVer="http://schemas.openxmlformats.org/drawingml/2006/diagram"/>
     </a:ext>
   </dgm:extLst>
 </dgm:dataModel>
 </file>
 
 <file path=ppt/diagrams/drawing1.xml><?xml version="1.0" encoding="utf-8"?>
-<dsp:drawing xmlns:dgm="http://schemas.openxmlformats.org/drawingml/2006/diagram" xmlns:a="http://schemas.openxmlformats.org/drawingml/2006/main" xmlns:dsp="http://schemas.microsoft.com/office/drawing/2008/diagram">
+<dsp:drawing xmlns:dgm="http://schemas.openxmlformats.org/drawingml/2006/diagram" xmlns:dsp="http://schemas.microsoft.com/office/drawing/2008/diagram" xmlns:a="http://schemas.openxmlformats.org/drawingml/2006/main">
   <dsp:spTree>
     <dsp:nvGrpSpPr>
       <dsp:cNvPr id="0" name=""/>
@@ -2226,17 +2284,28 @@
                 <a:satOff val="0"/>
                 <a:lumOff val="0"/>
                 <a:alphaOff val="0"/>
-                <a:shade val="51000"/>
+                <a:shade val="85000"/>
                 <a:satMod val="130000"/>
               </a:schemeClr>
             </a:gs>
-            <a:gs pos="80000">
+            <a:gs pos="34000">
               <a:schemeClr val="accent2">
                 <a:hueOff val="0"/>
                 <a:satOff val="0"/>
                 <a:lumOff val="0"/>
                 <a:alphaOff val="0"/>
-                <a:shade val="93000"/>
+                <a:shade val="87000"/>
+                <a:satMod val="125000"/>
+              </a:schemeClr>
+            </a:gs>
+            <a:gs pos="70000">
+              <a:schemeClr val="accent2">
+                <a:hueOff val="0"/>
+                <a:satOff val="0"/>
+                <a:lumOff val="0"/>
+                <a:alphaOff val="0"/>
+                <a:tint val="100000"/>
+                <a:shade val="90000"/>
                 <a:satMod val="130000"/>
               </a:schemeClr>
             </a:gs>
@@ -2246,20 +2315,23 @@
                 <a:satOff val="0"/>
                 <a:lumOff val="0"/>
                 <a:alphaOff val="0"/>
-                <a:shade val="94000"/>
-                <a:satMod val="135000"/>
+                <a:tint val="100000"/>
+                <a:shade val="100000"/>
+                <a:satMod val="110000"/>
               </a:schemeClr>
             </a:gs>
           </a:gsLst>
-          <a:lin ang="16200000" scaled="0"/>
+          <a:path path="circle">
+            <a:fillToRect l="100000" t="100000" r="100000" b="100000"/>
+          </a:path>
         </a:gradFill>
         <a:ln>
           <a:noFill/>
         </a:ln>
         <a:effectLst>
-          <a:outerShdw blurRad="40000" dist="23000" dir="5400000" rotWithShape="0">
+          <a:outerShdw blurRad="38100" dist="25400" dir="2700000" algn="br" rotWithShape="0">
             <a:srgbClr val="000000">
-              <a:alpha val="35000"/>
+              <a:alpha val="60000"/>
             </a:srgbClr>
           </a:outerShdw>
         </a:effectLst>
@@ -2311,8 +2383,8 @@
         </a:p>
       </dsp:txBody>
       <dsp:txXfrm>
-        <a:off x="2164247" y="918"/>
-        <a:ext cx="1370481" cy="890812"/>
+        <a:off x="2207733" y="44404"/>
+        <a:ext cx="1283509" cy="803840"/>
       </dsp:txXfrm>
     </dsp:sp>
     <dsp:sp modelId="{E52E9E77-30A9-446B-B6E7-F10DD6257421}">
@@ -2341,7 +2413,7 @@
           </a:pathLst>
         </a:custGeom>
         <a:noFill/>
-        <a:ln w="9525" cap="flat" cmpd="sng" algn="ctr">
+        <a:ln w="12700" cap="flat" cmpd="sng" algn="ctr">
           <a:solidFill>
             <a:schemeClr val="accent2">
               <a:hueOff val="0"/>
@@ -2385,44 +2457,58 @@
           <a:gsLst>
             <a:gs pos="0">
               <a:schemeClr val="accent2">
-                <a:hueOff val="2340759"/>
-                <a:satOff val="-2919"/>
-                <a:lumOff val="686"/>
+                <a:hueOff val="-665912"/>
+                <a:satOff val="-293"/>
+                <a:lumOff val="784"/>
                 <a:alphaOff val="0"/>
-                <a:shade val="51000"/>
+                <a:shade val="85000"/>
                 <a:satMod val="130000"/>
               </a:schemeClr>
             </a:gs>
-            <a:gs pos="80000">
+            <a:gs pos="34000">
               <a:schemeClr val="accent2">
-                <a:hueOff val="2340759"/>
-                <a:satOff val="-2919"/>
-                <a:lumOff val="686"/>
+                <a:hueOff val="-665912"/>
+                <a:satOff val="-293"/>
+                <a:lumOff val="784"/>
                 <a:alphaOff val="0"/>
-                <a:shade val="93000"/>
+                <a:shade val="87000"/>
+                <a:satMod val="125000"/>
+              </a:schemeClr>
+            </a:gs>
+            <a:gs pos="70000">
+              <a:schemeClr val="accent2">
+                <a:hueOff val="-665912"/>
+                <a:satOff val="-293"/>
+                <a:lumOff val="784"/>
+                <a:alphaOff val="0"/>
+                <a:tint val="100000"/>
+                <a:shade val="90000"/>
                 <a:satMod val="130000"/>
               </a:schemeClr>
             </a:gs>
             <a:gs pos="100000">
               <a:schemeClr val="accent2">
-                <a:hueOff val="2340759"/>
-                <a:satOff val="-2919"/>
-                <a:lumOff val="686"/>
+                <a:hueOff val="-665912"/>
+                <a:satOff val="-293"/>
+                <a:lumOff val="784"/>
                 <a:alphaOff val="0"/>
-                <a:shade val="94000"/>
-                <a:satMod val="135000"/>
+                <a:tint val="100000"/>
+                <a:shade val="100000"/>
+                <a:satMod val="110000"/>
               </a:schemeClr>
             </a:gs>
           </a:gsLst>
-          <a:lin ang="16200000" scaled="0"/>
+          <a:path path="circle">
+            <a:fillToRect l="100000" t="100000" r="100000" b="100000"/>
+          </a:path>
         </a:gradFill>
         <a:ln>
           <a:noFill/>
         </a:ln>
         <a:effectLst>
-          <a:outerShdw blurRad="40000" dist="23000" dir="5400000" rotWithShape="0">
+          <a:outerShdw blurRad="38100" dist="25400" dir="2700000" algn="br" rotWithShape="0">
             <a:srgbClr val="000000">
-              <a:alpha val="35000"/>
+              <a:alpha val="60000"/>
             </a:srgbClr>
           </a:outerShdw>
         </a:effectLst>
@@ -2470,8 +2556,8 @@
         </a:p>
       </dsp:txBody>
       <dsp:txXfrm>
-        <a:off x="3192000" y="1781039"/>
-        <a:ext cx="1370481" cy="890812"/>
+        <a:off x="3235486" y="1824525"/>
+        <a:ext cx="1283509" cy="803840"/>
       </dsp:txXfrm>
     </dsp:sp>
     <dsp:sp modelId="{16605E07-EC61-4879-AF33-FCEF7199F9BF}">
@@ -2500,12 +2586,12 @@
           </a:pathLst>
         </a:custGeom>
         <a:noFill/>
-        <a:ln w="9525" cap="flat" cmpd="sng" algn="ctr">
+        <a:ln w="12700" cap="flat" cmpd="sng" algn="ctr">
           <a:solidFill>
             <a:schemeClr val="accent2">
-              <a:hueOff val="2340759"/>
-              <a:satOff val="-2919"/>
-              <a:lumOff val="686"/>
+              <a:hueOff val="-665912"/>
+              <a:satOff val="-293"/>
+              <a:lumOff val="784"/>
               <a:alphaOff val="0"/>
             </a:schemeClr>
           </a:solidFill>
@@ -2544,44 +2630,58 @@
           <a:gsLst>
             <a:gs pos="0">
               <a:schemeClr val="accent2">
-                <a:hueOff val="4681519"/>
-                <a:satOff val="-5839"/>
-                <a:lumOff val="1373"/>
+                <a:hueOff val="-1331824"/>
+                <a:satOff val="-586"/>
+                <a:lumOff val="1569"/>
                 <a:alphaOff val="0"/>
-                <a:shade val="51000"/>
+                <a:shade val="85000"/>
                 <a:satMod val="130000"/>
               </a:schemeClr>
             </a:gs>
-            <a:gs pos="80000">
+            <a:gs pos="34000">
               <a:schemeClr val="accent2">
-                <a:hueOff val="4681519"/>
-                <a:satOff val="-5839"/>
-                <a:lumOff val="1373"/>
+                <a:hueOff val="-1331824"/>
+                <a:satOff val="-586"/>
+                <a:lumOff val="1569"/>
                 <a:alphaOff val="0"/>
-                <a:shade val="93000"/>
+                <a:shade val="87000"/>
+                <a:satMod val="125000"/>
+              </a:schemeClr>
+            </a:gs>
+            <a:gs pos="70000">
+              <a:schemeClr val="accent2">
+                <a:hueOff val="-1331824"/>
+                <a:satOff val="-586"/>
+                <a:lumOff val="1569"/>
+                <a:alphaOff val="0"/>
+                <a:tint val="100000"/>
+                <a:shade val="90000"/>
                 <a:satMod val="130000"/>
               </a:schemeClr>
             </a:gs>
             <a:gs pos="100000">
               <a:schemeClr val="accent2">
-                <a:hueOff val="4681519"/>
-                <a:satOff val="-5839"/>
-                <a:lumOff val="1373"/>
+                <a:hueOff val="-1331824"/>
+                <a:satOff val="-586"/>
+                <a:lumOff val="1569"/>
                 <a:alphaOff val="0"/>
-                <a:shade val="94000"/>
-                <a:satMod val="135000"/>
+                <a:tint val="100000"/>
+                <a:shade val="100000"/>
+                <a:satMod val="110000"/>
               </a:schemeClr>
             </a:gs>
           </a:gsLst>
-          <a:lin ang="16200000" scaled="0"/>
+          <a:path path="circle">
+            <a:fillToRect l="100000" t="100000" r="100000" b="100000"/>
+          </a:path>
         </a:gradFill>
         <a:ln>
           <a:noFill/>
         </a:ln>
         <a:effectLst>
-          <a:outerShdw blurRad="40000" dist="23000" dir="5400000" rotWithShape="0">
+          <a:outerShdw blurRad="38100" dist="25400" dir="2700000" algn="br" rotWithShape="0">
             <a:srgbClr val="000000">
-              <a:alpha val="35000"/>
+              <a:alpha val="60000"/>
             </a:srgbClr>
           </a:outerShdw>
         </a:effectLst>
@@ -2633,8 +2733,8 @@
         </a:p>
       </dsp:txBody>
       <dsp:txXfrm>
-        <a:off x="1136494" y="1781039"/>
-        <a:ext cx="1370481" cy="890812"/>
+        <a:off x="1179980" y="1824525"/>
+        <a:ext cx="1283509" cy="803840"/>
       </dsp:txXfrm>
     </dsp:sp>
     <dsp:sp modelId="{B4337CB5-A10A-4031-BF3D-0E952902C3AE}">
@@ -2663,12 +2763,12 @@
           </a:pathLst>
         </a:custGeom>
         <a:noFill/>
-        <a:ln w="9525" cap="flat" cmpd="sng" algn="ctr">
+        <a:ln w="12700" cap="flat" cmpd="sng" algn="ctr">
           <a:solidFill>
             <a:schemeClr val="accent2">
-              <a:hueOff val="4681519"/>
-              <a:satOff val="-5839"/>
-              <a:lumOff val="1373"/>
+              <a:hueOff val="-1331824"/>
+              <a:satOff val="-586"/>
+              <a:lumOff val="1569"/>
               <a:alphaOff val="0"/>
             </a:schemeClr>
           </a:solidFill>
@@ -2695,7 +2795,7 @@
 </file>
 
 <file path=ppt/diagrams/drawing2.xml><?xml version="1.0" encoding="utf-8"?>
-<dsp:drawing xmlns:dgm="http://schemas.openxmlformats.org/drawingml/2006/diagram" xmlns:a="http://schemas.openxmlformats.org/drawingml/2006/main" xmlns:dsp="http://schemas.microsoft.com/office/drawing/2008/diagram">
+<dsp:drawing xmlns:dgm="http://schemas.openxmlformats.org/drawingml/2006/diagram" xmlns:dsp="http://schemas.microsoft.com/office/drawing/2008/diagram" xmlns:a="http://schemas.openxmlformats.org/drawingml/2006/main">
   <dsp:spTree>
     <dsp:nvGrpSpPr>
       <dsp:cNvPr id="0" name=""/>
@@ -2774,9 +2874,9 @@
           <a:noFill/>
         </a:ln>
         <a:effectLst>
-          <a:outerShdw blurRad="40000" dist="23000" dir="5400000" rotWithShape="0">
+          <a:outerShdw blurRad="44450" dist="25400" dir="2700000" algn="br" rotWithShape="0">
             <a:srgbClr val="000000">
-              <a:alpha val="35000"/>
+              <a:alpha val="60000"/>
             </a:srgbClr>
           </a:outerShdw>
         </a:effectLst>
@@ -2889,17 +2989,28 @@
                 <a:satOff val="0"/>
                 <a:lumOff val="0"/>
                 <a:alphaOff val="0"/>
-                <a:shade val="51000"/>
+                <a:shade val="85000"/>
                 <a:satMod val="130000"/>
               </a:schemeClr>
             </a:gs>
-            <a:gs pos="80000">
+            <a:gs pos="34000">
               <a:schemeClr val="accent2">
                 <a:hueOff val="0"/>
                 <a:satOff val="0"/>
                 <a:lumOff val="0"/>
                 <a:alphaOff val="0"/>
-                <a:shade val="93000"/>
+                <a:shade val="87000"/>
+                <a:satMod val="125000"/>
+              </a:schemeClr>
+            </a:gs>
+            <a:gs pos="70000">
+              <a:schemeClr val="accent2">
+                <a:hueOff val="0"/>
+                <a:satOff val="0"/>
+                <a:lumOff val="0"/>
+                <a:alphaOff val="0"/>
+                <a:tint val="100000"/>
+                <a:shade val="90000"/>
                 <a:satMod val="130000"/>
               </a:schemeClr>
             </a:gs>
@@ -2909,20 +3020,23 @@
                 <a:satOff val="0"/>
                 <a:lumOff val="0"/>
                 <a:alphaOff val="0"/>
-                <a:shade val="94000"/>
-                <a:satMod val="135000"/>
+                <a:tint val="100000"/>
+                <a:shade val="100000"/>
+                <a:satMod val="110000"/>
               </a:schemeClr>
             </a:gs>
           </a:gsLst>
-          <a:lin ang="16200000" scaled="0"/>
+          <a:path path="circle">
+            <a:fillToRect l="100000" t="100000" r="100000" b="100000"/>
+          </a:path>
         </a:gradFill>
         <a:ln>
           <a:noFill/>
         </a:ln>
         <a:effectLst>
-          <a:outerShdw blurRad="40000" dist="23000" dir="5400000" rotWithShape="0">
+          <a:outerShdw blurRad="38100" dist="25400" dir="2700000" algn="br" rotWithShape="0">
             <a:srgbClr val="000000">
-              <a:alpha val="35000"/>
+              <a:alpha val="60000"/>
             </a:srgbClr>
           </a:outerShdw>
         </a:effectLst>
@@ -2974,8 +3088,8 @@
         </a:p>
       </dsp:txBody>
       <dsp:txXfrm>
-        <a:off x="1985886" y="1015833"/>
-        <a:ext cx="834779" cy="834779"/>
+        <a:off x="2108137" y="1138084"/>
+        <a:ext cx="590277" cy="590277"/>
       </dsp:txXfrm>
     </dsp:sp>
     <dsp:sp modelId="{747AEF02-8F1F-426A-9CAB-5D33747352F0}">
@@ -2995,44 +3109,58 @@
           <a:gsLst>
             <a:gs pos="0">
               <a:schemeClr val="accent2">
-                <a:hueOff val="2340759"/>
-                <a:satOff val="-2919"/>
-                <a:lumOff val="686"/>
+                <a:hueOff val="-665912"/>
+                <a:satOff val="-293"/>
+                <a:lumOff val="784"/>
                 <a:alphaOff val="0"/>
-                <a:shade val="51000"/>
+                <a:shade val="85000"/>
                 <a:satMod val="130000"/>
               </a:schemeClr>
             </a:gs>
-            <a:gs pos="80000">
+            <a:gs pos="34000">
               <a:schemeClr val="accent2">
-                <a:hueOff val="2340759"/>
-                <a:satOff val="-2919"/>
-                <a:lumOff val="686"/>
+                <a:hueOff val="-665912"/>
+                <a:satOff val="-293"/>
+                <a:lumOff val="784"/>
                 <a:alphaOff val="0"/>
-                <a:shade val="93000"/>
+                <a:shade val="87000"/>
+                <a:satMod val="125000"/>
+              </a:schemeClr>
+            </a:gs>
+            <a:gs pos="70000">
+              <a:schemeClr val="accent2">
+                <a:hueOff val="-665912"/>
+                <a:satOff val="-293"/>
+                <a:lumOff val="784"/>
+                <a:alphaOff val="0"/>
+                <a:tint val="100000"/>
+                <a:shade val="90000"/>
                 <a:satMod val="130000"/>
               </a:schemeClr>
             </a:gs>
             <a:gs pos="100000">
               <a:schemeClr val="accent2">
-                <a:hueOff val="2340759"/>
-                <a:satOff val="-2919"/>
-                <a:lumOff val="686"/>
+                <a:hueOff val="-665912"/>
+                <a:satOff val="-293"/>
+                <a:lumOff val="784"/>
                 <a:alphaOff val="0"/>
-                <a:shade val="94000"/>
-                <a:satMod val="135000"/>
+                <a:tint val="100000"/>
+                <a:shade val="100000"/>
+                <a:satMod val="110000"/>
               </a:schemeClr>
             </a:gs>
           </a:gsLst>
-          <a:lin ang="16200000" scaled="0"/>
+          <a:path path="circle">
+            <a:fillToRect l="100000" t="100000" r="100000" b="100000"/>
+          </a:path>
         </a:gradFill>
         <a:ln>
           <a:noFill/>
         </a:ln>
         <a:effectLst>
-          <a:outerShdw blurRad="40000" dist="23000" dir="5400000" rotWithShape="0">
+          <a:outerShdw blurRad="38100" dist="25400" dir="2700000" algn="br" rotWithShape="0">
             <a:srgbClr val="000000">
-              <a:alpha val="35000"/>
+              <a:alpha val="60000"/>
             </a:srgbClr>
           </a:outerShdw>
         </a:effectLst>
@@ -3084,8 +3212,8 @@
         </a:p>
       </dsp:txBody>
       <dsp:txXfrm>
-        <a:off x="1388555" y="389563"/>
-        <a:ext cx="834779" cy="834779"/>
+        <a:off x="1510806" y="511814"/>
+        <a:ext cx="590277" cy="590277"/>
       </dsp:txXfrm>
     </dsp:sp>
     <dsp:sp modelId="{CF9FA0BD-6C96-46C5-9109-4FEBED892E92}">
@@ -3105,44 +3233,58 @@
           <a:gsLst>
             <a:gs pos="0">
               <a:schemeClr val="accent2">
-                <a:hueOff val="4681519"/>
-                <a:satOff val="-5839"/>
-                <a:lumOff val="1373"/>
+                <a:hueOff val="-1331824"/>
+                <a:satOff val="-586"/>
+                <a:lumOff val="1569"/>
                 <a:alphaOff val="0"/>
-                <a:shade val="51000"/>
+                <a:shade val="85000"/>
                 <a:satMod val="130000"/>
               </a:schemeClr>
             </a:gs>
-            <a:gs pos="80000">
+            <a:gs pos="34000">
               <a:schemeClr val="accent2">
-                <a:hueOff val="4681519"/>
-                <a:satOff val="-5839"/>
-                <a:lumOff val="1373"/>
+                <a:hueOff val="-1331824"/>
+                <a:satOff val="-586"/>
+                <a:lumOff val="1569"/>
                 <a:alphaOff val="0"/>
-                <a:shade val="93000"/>
+                <a:shade val="87000"/>
+                <a:satMod val="125000"/>
+              </a:schemeClr>
+            </a:gs>
+            <a:gs pos="70000">
+              <a:schemeClr val="accent2">
+                <a:hueOff val="-1331824"/>
+                <a:satOff val="-586"/>
+                <a:lumOff val="1569"/>
+                <a:alphaOff val="0"/>
+                <a:tint val="100000"/>
+                <a:shade val="90000"/>
                 <a:satMod val="130000"/>
               </a:schemeClr>
             </a:gs>
             <a:gs pos="100000">
               <a:schemeClr val="accent2">
-                <a:hueOff val="4681519"/>
-                <a:satOff val="-5839"/>
-                <a:lumOff val="1373"/>
+                <a:hueOff val="-1331824"/>
+                <a:satOff val="-586"/>
+                <a:lumOff val="1569"/>
                 <a:alphaOff val="0"/>
-                <a:shade val="94000"/>
-                <a:satMod val="135000"/>
+                <a:tint val="100000"/>
+                <a:shade val="100000"/>
+                <a:satMod val="110000"/>
               </a:schemeClr>
             </a:gs>
           </a:gsLst>
-          <a:lin ang="16200000" scaled="0"/>
+          <a:path path="circle">
+            <a:fillToRect l="100000" t="100000" r="100000" b="100000"/>
+          </a:path>
         </a:gradFill>
         <a:ln>
           <a:noFill/>
         </a:ln>
         <a:effectLst>
-          <a:outerShdw blurRad="40000" dist="23000" dir="5400000" rotWithShape="0">
+          <a:outerShdw blurRad="38100" dist="25400" dir="2700000" algn="br" rotWithShape="0">
             <a:srgbClr val="000000">
-              <a:alpha val="35000"/>
+              <a:alpha val="60000"/>
             </a:srgbClr>
           </a:outerShdw>
         </a:effectLst>
@@ -3194,8 +3336,8 @@
         </a:p>
       </dsp:txBody>
       <dsp:txXfrm>
-        <a:off x="2241885" y="187732"/>
-        <a:ext cx="834779" cy="834779"/>
+        <a:off x="2364136" y="309983"/>
+        <a:ext cx="590277" cy="590277"/>
       </dsp:txXfrm>
     </dsp:sp>
     <dsp:sp modelId="{1FBAEFC3-C401-42FD-9F16-EA927271936B}">
@@ -3220,7 +3362,7 @@
             <a:alphaOff val="0"/>
           </a:schemeClr>
         </a:solidFill>
-        <a:ln w="9525" cap="flat" cmpd="sng" algn="ctr">
+        <a:ln w="12700" cap="flat" cmpd="sng" algn="ctr">
           <a:solidFill>
             <a:schemeClr val="accent2">
               <a:hueOff val="0"/>
@@ -3232,9 +3374,9 @@
           <a:prstDash val="solid"/>
         </a:ln>
         <a:effectLst>
-          <a:outerShdw blurRad="40000" dist="23000" dir="5400000" rotWithShape="0">
+          <a:outerShdw blurRad="38100" dist="25400" dir="2700000" algn="br" rotWithShape="0">
             <a:srgbClr val="000000">
-              <a:alpha val="35000"/>
+              <a:alpha val="60000"/>
             </a:srgbClr>
           </a:outerShdw>
         </a:effectLst>
@@ -5941,7 +6083,7 @@
 </file>
 
 <file path=ppt/slideLayouts/slideLayout1.xml><?xml version="1.0" encoding="utf-8"?>
-<p:sldLayout xmlns:a="http://schemas.openxmlformats.org/drawingml/2006/main" xmlns:r="http://schemas.openxmlformats.org/officeDocument/2006/relationships" xmlns:p="http://schemas.openxmlformats.org/presentationml/2006/main" type="title" preserve="1">
+<p:sldLayout xmlns:a="http://schemas.openxmlformats.org/drawingml/2006/main" xmlns:r="http://schemas.openxmlformats.org/officeDocument/2006/relationships" xmlns:p="http://schemas.openxmlformats.org/presentationml/2006/main" showMasterSp="0" type="title" preserve="1">
   <p:cSld name="Titelfolie">
     <p:spTree>
       <p:nvGrpSpPr>
@@ -5959,7 +6101,83 @@
       </p:grpSpPr>
       <p:sp>
         <p:nvSpPr>
-          <p:cNvPr id="2" name="Titel 1"/>
+          <p:cNvPr id="7" name="Rectangle 6"/>
+          <p:cNvSpPr/>
+          <p:nvPr/>
+        </p:nvSpPr>
+        <p:spPr>
+          <a:xfrm>
+            <a:off x="2382" y="6400800"/>
+            <a:ext cx="9141619" cy="457200"/>
+          </a:xfrm>
+          <a:prstGeom prst="rect">
+            <a:avLst/>
+          </a:prstGeom>
+          <a:solidFill>
+            <a:schemeClr val="accent2"/>
+          </a:solidFill>
+          <a:ln>
+            <a:noFill/>
+          </a:ln>
+        </p:spPr>
+        <p:style>
+          <a:lnRef idx="2">
+            <a:schemeClr val="accent1">
+              <a:shade val="50000"/>
+            </a:schemeClr>
+          </a:lnRef>
+          <a:fillRef idx="1">
+            <a:schemeClr val="accent1"/>
+          </a:fillRef>
+          <a:effectRef idx="0">
+            <a:schemeClr val="accent1"/>
+          </a:effectRef>
+          <a:fontRef idx="minor">
+            <a:schemeClr val="lt1"/>
+          </a:fontRef>
+        </p:style>
+      </p:sp>
+      <p:sp>
+        <p:nvSpPr>
+          <p:cNvPr id="8" name="Rectangle 7"/>
+          <p:cNvSpPr/>
+          <p:nvPr/>
+        </p:nvSpPr>
+        <p:spPr>
+          <a:xfrm>
+            <a:off x="12" y="6334316"/>
+            <a:ext cx="9141619" cy="64008"/>
+          </a:xfrm>
+          <a:prstGeom prst="rect">
+            <a:avLst/>
+          </a:prstGeom>
+          <a:solidFill>
+            <a:schemeClr val="accent1"/>
+          </a:solidFill>
+          <a:ln>
+            <a:noFill/>
+          </a:ln>
+        </p:spPr>
+        <p:style>
+          <a:lnRef idx="2">
+            <a:schemeClr val="accent1">
+              <a:shade val="50000"/>
+            </a:schemeClr>
+          </a:lnRef>
+          <a:fillRef idx="1">
+            <a:schemeClr val="accent1"/>
+          </a:fillRef>
+          <a:effectRef idx="0">
+            <a:schemeClr val="accent1"/>
+          </a:effectRef>
+          <a:fontRef idx="minor">
+            <a:schemeClr val="lt1"/>
+          </a:fontRef>
+        </p:style>
+      </p:sp>
+      <p:sp>
+        <p:nvSpPr>
+          <p:cNvPr id="2" name="Title 1"/>
           <p:cNvSpPr>
             <a:spLocks noGrp="1"/>
           </p:cNvSpPr>
@@ -5969,25 +6187,41 @@
         </p:nvSpPr>
         <p:spPr>
           <a:xfrm>
-            <a:off x="685800" y="2130425"/>
-            <a:ext cx="7772400" cy="1470025"/>
+            <a:off x="822960" y="758952"/>
+            <a:ext cx="7543800" cy="3566160"/>
           </a:xfrm>
         </p:spPr>
         <p:txBody>
-          <a:bodyPr/>
-          <a:lstStyle/>
+          <a:bodyPr anchor="b">
+            <a:normAutofit/>
+          </a:bodyPr>
+          <a:lstStyle>
+            <a:lvl1pPr algn="l">
+              <a:lnSpc>
+                <a:spcPct val="85000"/>
+              </a:lnSpc>
+              <a:defRPr sz="8000" spc="-50" baseline="0">
+                <a:solidFill>
+                  <a:schemeClr val="tx1">
+                    <a:lumMod val="85000"/>
+                    <a:lumOff val="15000"/>
+                  </a:schemeClr>
+                </a:solidFill>
+              </a:defRPr>
+            </a:lvl1pPr>
+          </a:lstStyle>
           <a:p>
             <a:r>
               <a:rPr lang="de-DE" smtClean="0"/>
               <a:t>Titelmasterformat durch Klicken bearbeiten</a:t>
             </a:r>
-            <a:endParaRPr lang="de-DE"/>
+            <a:endParaRPr lang="en-US" dirty="0"/>
           </a:p>
         </p:txBody>
       </p:sp>
       <p:sp>
         <p:nvSpPr>
-          <p:cNvPr id="3" name="Untertitel 2"/>
+          <p:cNvPr id="3" name="Subtitle 2"/>
           <p:cNvSpPr>
             <a:spLocks noGrp="1"/>
           </p:cNvSpPr>
@@ -5997,102 +6231,55 @@
         </p:nvSpPr>
         <p:spPr>
           <a:xfrm>
-            <a:off x="1371600" y="3886200"/>
-            <a:ext cx="6400800" cy="1752600"/>
+            <a:off x="825038" y="4455621"/>
+            <a:ext cx="7543800" cy="1143000"/>
           </a:xfrm>
         </p:spPr>
         <p:txBody>
-          <a:bodyPr/>
+          <a:bodyPr lIns="91440" rIns="91440">
+            <a:normAutofit/>
+          </a:bodyPr>
           <a:lstStyle>
-            <a:lvl1pPr marL="0" indent="0" algn="ctr">
+            <a:lvl1pPr marL="0" indent="0" algn="l">
               <a:buNone/>
-              <a:defRPr>
+              <a:defRPr sz="2400" cap="all" spc="200" baseline="0">
                 <a:solidFill>
-                  <a:schemeClr val="tx1">
-                    <a:tint val="75000"/>
-                  </a:schemeClr>
+                  <a:schemeClr val="tx2"/>
                 </a:solidFill>
+                <a:latin typeface="+mj-lt"/>
               </a:defRPr>
             </a:lvl1pPr>
             <a:lvl2pPr marL="457200" indent="0" algn="ctr">
               <a:buNone/>
-              <a:defRPr>
-                <a:solidFill>
-                  <a:schemeClr val="tx1">
-                    <a:tint val="75000"/>
-                  </a:schemeClr>
-                </a:solidFill>
-              </a:defRPr>
+              <a:defRPr sz="2400"/>
             </a:lvl2pPr>
             <a:lvl3pPr marL="914400" indent="0" algn="ctr">
               <a:buNone/>
-              <a:defRPr>
-                <a:solidFill>
-                  <a:schemeClr val="tx1">
-                    <a:tint val="75000"/>
-                  </a:schemeClr>
-                </a:solidFill>
-              </a:defRPr>
+              <a:defRPr sz="2400"/>
             </a:lvl3pPr>
             <a:lvl4pPr marL="1371600" indent="0" algn="ctr">
               <a:buNone/>
-              <a:defRPr>
-                <a:solidFill>
-                  <a:schemeClr val="tx1">
-                    <a:tint val="75000"/>
-                  </a:schemeClr>
-                </a:solidFill>
-              </a:defRPr>
+              <a:defRPr sz="2000"/>
             </a:lvl4pPr>
             <a:lvl5pPr marL="1828800" indent="0" algn="ctr">
               <a:buNone/>
-              <a:defRPr>
-                <a:solidFill>
-                  <a:schemeClr val="tx1">
-                    <a:tint val="75000"/>
-                  </a:schemeClr>
-                </a:solidFill>
-              </a:defRPr>
+              <a:defRPr sz="2000"/>
             </a:lvl5pPr>
             <a:lvl6pPr marL="2286000" indent="0" algn="ctr">
               <a:buNone/>
-              <a:defRPr>
-                <a:solidFill>
-                  <a:schemeClr val="tx1">
-                    <a:tint val="75000"/>
-                  </a:schemeClr>
-                </a:solidFill>
-              </a:defRPr>
+              <a:defRPr sz="2000"/>
             </a:lvl6pPr>
             <a:lvl7pPr marL="2743200" indent="0" algn="ctr">
               <a:buNone/>
-              <a:defRPr>
-                <a:solidFill>
-                  <a:schemeClr val="tx1">
-                    <a:tint val="75000"/>
-                  </a:schemeClr>
-                </a:solidFill>
-              </a:defRPr>
+              <a:defRPr sz="2000"/>
             </a:lvl7pPr>
             <a:lvl8pPr marL="3200400" indent="0" algn="ctr">
               <a:buNone/>
-              <a:defRPr>
-                <a:solidFill>
-                  <a:schemeClr val="tx1">
-                    <a:tint val="75000"/>
-                  </a:schemeClr>
-                </a:solidFill>
-              </a:defRPr>
+              <a:defRPr sz="2000"/>
             </a:lvl8pPr>
             <a:lvl9pPr marL="3657600" indent="0" algn="ctr">
               <a:buNone/>
-              <a:defRPr>
-                <a:solidFill>
-                  <a:schemeClr val="tx1">
-                    <a:tint val="75000"/>
-                  </a:schemeClr>
-                </a:solidFill>
-              </a:defRPr>
+              <a:defRPr sz="2000"/>
             </a:lvl9pPr>
           </a:lstStyle>
           <a:p>
@@ -6100,13 +6287,13 @@
               <a:rPr lang="de-DE" smtClean="0"/>
               <a:t>Formatvorlage des Untertitelmasters durch Klicken bearbeiten</a:t>
             </a:r>
-            <a:endParaRPr lang="de-DE"/>
+            <a:endParaRPr lang="en-US" dirty="0"/>
           </a:p>
         </p:txBody>
       </p:sp>
       <p:sp>
         <p:nvSpPr>
-          <p:cNvPr id="4" name="Datumsplatzhalter 3"/>
+          <p:cNvPr id="4" name="Date Placeholder 3"/>
           <p:cNvSpPr>
             <a:spLocks noGrp="1"/>
           </p:cNvSpPr>
@@ -6122,7 +6309,7 @@
             <a:fld id="{1BA50D42-C9CD-4801-B293-61D1F53EC57E}" type="datetimeFigureOut">
               <a:rPr lang="de-DE" smtClean="0"/>
               <a:pPr/>
-              <a:t>18.05.2016</a:t>
+              <a:t>22.05.2016</a:t>
             </a:fld>
             <a:endParaRPr lang="de-DE"/>
           </a:p>
@@ -6130,7 +6317,7 @@
       </p:sp>
       <p:sp>
         <p:nvSpPr>
-          <p:cNvPr id="5" name="Fußzeilenplatzhalter 4"/>
+          <p:cNvPr id="5" name="Footer Placeholder 4"/>
           <p:cNvSpPr>
             <a:spLocks noGrp="1"/>
           </p:cNvSpPr>
@@ -6149,7 +6336,7 @@
       </p:sp>
       <p:sp>
         <p:nvSpPr>
-          <p:cNvPr id="6" name="Foliennummernplatzhalter 5"/>
+          <p:cNvPr id="6" name="Slide Number Placeholder 5"/>
           <p:cNvSpPr>
             <a:spLocks noGrp="1"/>
           </p:cNvSpPr>
@@ -6171,7 +6358,50 @@
           </a:p>
         </p:txBody>
       </p:sp>
+      <p:cxnSp>
+        <p:nvCxnSpPr>
+          <p:cNvPr id="9" name="Straight Connector 8"/>
+          <p:cNvCxnSpPr/>
+          <p:nvPr/>
+        </p:nvCxnSpPr>
+        <p:spPr>
+          <a:xfrm>
+            <a:off x="905744" y="4343400"/>
+            <a:ext cx="7406640" cy="0"/>
+          </a:xfrm>
+          <a:prstGeom prst="line">
+            <a:avLst/>
+          </a:prstGeom>
+          <a:ln w="6350">
+            <a:solidFill>
+              <a:schemeClr val="tx1">
+                <a:lumMod val="50000"/>
+                <a:lumOff val="50000"/>
+              </a:schemeClr>
+            </a:solidFill>
+          </a:ln>
+        </p:spPr>
+        <p:style>
+          <a:lnRef idx="1">
+            <a:schemeClr val="accent1"/>
+          </a:lnRef>
+          <a:fillRef idx="0">
+            <a:schemeClr val="accent1"/>
+          </a:fillRef>
+          <a:effectRef idx="0">
+            <a:schemeClr val="accent1"/>
+          </a:effectRef>
+          <a:fontRef idx="minor">
+            <a:schemeClr val="tx1"/>
+          </a:fontRef>
+        </p:style>
+      </p:cxnSp>
     </p:spTree>
+    <p:extLst>
+      <p:ext uri="{BB962C8B-B14F-4D97-AF65-F5344CB8AC3E}">
+        <p14:creationId xmlns:p14="http://schemas.microsoft.com/office/powerpoint/2010/main" val="4258504480"/>
+      </p:ext>
+    </p:extLst>
   </p:cSld>
   <p:clrMapOvr>
     <a:masterClrMapping/>
@@ -6198,7 +6428,7 @@
       </p:grpSpPr>
       <p:sp>
         <p:nvSpPr>
-          <p:cNvPr id="2" name="Titel 1"/>
+          <p:cNvPr id="2" name="Title 1"/>
           <p:cNvSpPr>
             <a:spLocks noGrp="1"/>
           </p:cNvSpPr>
@@ -6215,13 +6445,13 @@
               <a:rPr lang="de-DE" smtClean="0"/>
               <a:t>Titelmasterformat durch Klicken bearbeiten</a:t>
             </a:r>
-            <a:endParaRPr lang="de-DE"/>
+            <a:endParaRPr lang="en-US" dirty="0"/>
           </a:p>
         </p:txBody>
       </p:sp>
       <p:sp>
         <p:nvSpPr>
-          <p:cNvPr id="3" name="Vertikaler Textplatzhalter 2"/>
+          <p:cNvPr id="3" name="Vertical Text Placeholder 2"/>
           <p:cNvSpPr>
             <a:spLocks noGrp="1"/>
           </p:cNvSpPr>
@@ -6231,13 +6461,13 @@
         </p:nvSpPr>
         <p:spPr/>
         <p:txBody>
-          <a:bodyPr vert="eaVert"/>
+          <a:bodyPr vert="eaVert" lIns="45720" tIns="0" rIns="45720" bIns="0"/>
           <a:lstStyle/>
           <a:p>
             <a:pPr lvl="0"/>
             <a:r>
               <a:rPr lang="de-DE" smtClean="0"/>
-              <a:t>Textmasterformate durch Klicken bearbeiten</a:t>
+              <a:t>Formatvorlagen des Textmasters bearbeiten</a:t>
             </a:r>
           </a:p>
           <a:p>
@@ -6267,13 +6497,13 @@
               <a:rPr lang="de-DE" smtClean="0"/>
               <a:t>Fünfte Ebene</a:t>
             </a:r>
-            <a:endParaRPr lang="de-DE"/>
+            <a:endParaRPr lang="en-US" dirty="0"/>
           </a:p>
         </p:txBody>
       </p:sp>
       <p:sp>
         <p:nvSpPr>
-          <p:cNvPr id="4" name="Datumsplatzhalter 3"/>
+          <p:cNvPr id="4" name="Date Placeholder 3"/>
           <p:cNvSpPr>
             <a:spLocks noGrp="1"/>
           </p:cNvSpPr>
@@ -6289,7 +6519,7 @@
             <a:fld id="{1BA50D42-C9CD-4801-B293-61D1F53EC57E}" type="datetimeFigureOut">
               <a:rPr lang="de-DE" smtClean="0"/>
               <a:pPr/>
-              <a:t>18.05.2016</a:t>
+              <a:t>22.05.2016</a:t>
             </a:fld>
             <a:endParaRPr lang="de-DE"/>
           </a:p>
@@ -6297,7 +6527,7 @@
       </p:sp>
       <p:sp>
         <p:nvSpPr>
-          <p:cNvPr id="5" name="Fußzeilenplatzhalter 4"/>
+          <p:cNvPr id="5" name="Footer Placeholder 4"/>
           <p:cNvSpPr>
             <a:spLocks noGrp="1"/>
           </p:cNvSpPr>
@@ -6316,7 +6546,7 @@
       </p:sp>
       <p:sp>
         <p:nvSpPr>
-          <p:cNvPr id="6" name="Foliennummernplatzhalter 5"/>
+          <p:cNvPr id="6" name="Slide Number Placeholder 5"/>
           <p:cNvSpPr>
             <a:spLocks noGrp="1"/>
           </p:cNvSpPr>
@@ -6339,6 +6569,11 @@
         </p:txBody>
       </p:sp>
     </p:spTree>
+    <p:extLst>
+      <p:ext uri="{BB962C8B-B14F-4D97-AF65-F5344CB8AC3E}">
+        <p14:creationId xmlns:p14="http://schemas.microsoft.com/office/powerpoint/2010/main" val="2473321595"/>
+      </p:ext>
+    </p:extLst>
   </p:cSld>
   <p:clrMapOvr>
     <a:masterClrMapping/>
@@ -6347,7 +6582,7 @@
 </file>
 
 <file path=ppt/slideLayouts/slideLayout11.xml><?xml version="1.0" encoding="utf-8"?>
-<p:sldLayout xmlns:a="http://schemas.openxmlformats.org/drawingml/2006/main" xmlns:r="http://schemas.openxmlformats.org/officeDocument/2006/relationships" xmlns:p="http://schemas.openxmlformats.org/presentationml/2006/main" type="vertTitleAndTx" preserve="1">
+<p:sldLayout xmlns:a="http://schemas.openxmlformats.org/drawingml/2006/main" xmlns:r="http://schemas.openxmlformats.org/officeDocument/2006/relationships" xmlns:p="http://schemas.openxmlformats.org/presentationml/2006/main" showMasterSp="0" type="vertTitleAndTx" preserve="1">
   <p:cSld name="Vertikaler Titel und Text">
     <p:spTree>
       <p:nvGrpSpPr>
@@ -6365,7 +6600,83 @@
       </p:grpSpPr>
       <p:sp>
         <p:nvSpPr>
-          <p:cNvPr id="2" name="Vertikaler Titel 1"/>
+          <p:cNvPr id="7" name="Rectangle 6"/>
+          <p:cNvSpPr/>
+          <p:nvPr/>
+        </p:nvSpPr>
+        <p:spPr>
+          <a:xfrm>
+            <a:off x="2382" y="6400800"/>
+            <a:ext cx="9141619" cy="457200"/>
+          </a:xfrm>
+          <a:prstGeom prst="rect">
+            <a:avLst/>
+          </a:prstGeom>
+          <a:solidFill>
+            <a:schemeClr val="accent2"/>
+          </a:solidFill>
+          <a:ln>
+            <a:noFill/>
+          </a:ln>
+        </p:spPr>
+        <p:style>
+          <a:lnRef idx="2">
+            <a:schemeClr val="accent1">
+              <a:shade val="50000"/>
+            </a:schemeClr>
+          </a:lnRef>
+          <a:fillRef idx="1">
+            <a:schemeClr val="accent1"/>
+          </a:fillRef>
+          <a:effectRef idx="0">
+            <a:schemeClr val="accent1"/>
+          </a:effectRef>
+          <a:fontRef idx="minor">
+            <a:schemeClr val="lt1"/>
+          </a:fontRef>
+        </p:style>
+      </p:sp>
+      <p:sp>
+        <p:nvSpPr>
+          <p:cNvPr id="8" name="Rectangle 7"/>
+          <p:cNvSpPr/>
+          <p:nvPr/>
+        </p:nvSpPr>
+        <p:spPr>
+          <a:xfrm>
+            <a:off x="12" y="6334316"/>
+            <a:ext cx="9141619" cy="64008"/>
+          </a:xfrm>
+          <a:prstGeom prst="rect">
+            <a:avLst/>
+          </a:prstGeom>
+          <a:solidFill>
+            <a:schemeClr val="accent1"/>
+          </a:solidFill>
+          <a:ln>
+            <a:noFill/>
+          </a:ln>
+        </p:spPr>
+        <p:style>
+          <a:lnRef idx="2">
+            <a:schemeClr val="accent1">
+              <a:shade val="50000"/>
+            </a:schemeClr>
+          </a:lnRef>
+          <a:fillRef idx="1">
+            <a:schemeClr val="accent1"/>
+          </a:fillRef>
+          <a:effectRef idx="0">
+            <a:schemeClr val="accent1"/>
+          </a:effectRef>
+          <a:fontRef idx="minor">
+            <a:schemeClr val="lt1"/>
+          </a:fontRef>
+        </p:style>
+      </p:sp>
+      <p:sp>
+        <p:nvSpPr>
+          <p:cNvPr id="2" name="Vertical Title 1"/>
           <p:cNvSpPr>
             <a:spLocks noGrp="1"/>
           </p:cNvSpPr>
@@ -6375,8 +6686,8 @@
         </p:nvSpPr>
         <p:spPr>
           <a:xfrm>
-            <a:off x="6629400" y="274638"/>
-            <a:ext cx="2057400" cy="5851525"/>
+            <a:off x="6543675" y="412302"/>
+            <a:ext cx="1971675" cy="5759898"/>
           </a:xfrm>
         </p:spPr>
         <p:txBody>
@@ -6387,13 +6698,13 @@
               <a:rPr lang="de-DE" smtClean="0"/>
               <a:t>Titelmasterformat durch Klicken bearbeiten</a:t>
             </a:r>
-            <a:endParaRPr lang="de-DE"/>
+            <a:endParaRPr lang="en-US" dirty="0"/>
           </a:p>
         </p:txBody>
       </p:sp>
       <p:sp>
         <p:nvSpPr>
-          <p:cNvPr id="3" name="Vertikaler Textplatzhalter 2"/>
+          <p:cNvPr id="3" name="Vertical Text Placeholder 2"/>
           <p:cNvSpPr>
             <a:spLocks noGrp="1"/>
           </p:cNvSpPr>
@@ -6403,18 +6714,18 @@
         </p:nvSpPr>
         <p:spPr>
           <a:xfrm>
-            <a:off x="457200" y="274638"/>
-            <a:ext cx="6019800" cy="5851525"/>
+            <a:off x="628650" y="412302"/>
+            <a:ext cx="5800725" cy="5759898"/>
           </a:xfrm>
         </p:spPr>
         <p:txBody>
-          <a:bodyPr vert="eaVert"/>
+          <a:bodyPr vert="eaVert" lIns="45720" tIns="0" rIns="45720" bIns="0"/>
           <a:lstStyle/>
           <a:p>
             <a:pPr lvl="0"/>
             <a:r>
               <a:rPr lang="de-DE" smtClean="0"/>
-              <a:t>Textmasterformate durch Klicken bearbeiten</a:t>
+              <a:t>Formatvorlagen des Textmasters bearbeiten</a:t>
             </a:r>
           </a:p>
           <a:p>
@@ -6444,13 +6755,13 @@
               <a:rPr lang="de-DE" smtClean="0"/>
               <a:t>Fünfte Ebene</a:t>
             </a:r>
-            <a:endParaRPr lang="de-DE"/>
+            <a:endParaRPr lang="en-US" dirty="0"/>
           </a:p>
         </p:txBody>
       </p:sp>
       <p:sp>
         <p:nvSpPr>
-          <p:cNvPr id="4" name="Datumsplatzhalter 3"/>
+          <p:cNvPr id="4" name="Date Placeholder 3"/>
           <p:cNvSpPr>
             <a:spLocks noGrp="1"/>
           </p:cNvSpPr>
@@ -6466,7 +6777,7 @@
             <a:fld id="{1BA50D42-C9CD-4801-B293-61D1F53EC57E}" type="datetimeFigureOut">
               <a:rPr lang="de-DE" smtClean="0"/>
               <a:pPr/>
-              <a:t>18.05.2016</a:t>
+              <a:t>22.05.2016</a:t>
             </a:fld>
             <a:endParaRPr lang="de-DE"/>
           </a:p>
@@ -6474,7 +6785,7 @@
       </p:sp>
       <p:sp>
         <p:nvSpPr>
-          <p:cNvPr id="5" name="Fußzeilenplatzhalter 4"/>
+          <p:cNvPr id="5" name="Footer Placeholder 4"/>
           <p:cNvSpPr>
             <a:spLocks noGrp="1"/>
           </p:cNvSpPr>
@@ -6493,7 +6804,7 @@
       </p:sp>
       <p:sp>
         <p:nvSpPr>
-          <p:cNvPr id="6" name="Foliennummernplatzhalter 5"/>
+          <p:cNvPr id="6" name="Slide Number Placeholder 5"/>
           <p:cNvSpPr>
             <a:spLocks noGrp="1"/>
           </p:cNvSpPr>
@@ -6516,6 +6827,11 @@
         </p:txBody>
       </p:sp>
     </p:spTree>
+    <p:extLst>
+      <p:ext uri="{BB962C8B-B14F-4D97-AF65-F5344CB8AC3E}">
+        <p14:creationId xmlns:p14="http://schemas.microsoft.com/office/powerpoint/2010/main" val="206359443"/>
+      </p:ext>
+    </p:extLst>
   </p:cSld>
   <p:clrMapOvr>
     <a:masterClrMapping/>
@@ -6542,7 +6858,7 @@
       </p:grpSpPr>
       <p:sp>
         <p:nvSpPr>
-          <p:cNvPr id="2" name="Titel 1"/>
+          <p:cNvPr id="2" name="Title 1"/>
           <p:cNvSpPr>
             <a:spLocks noGrp="1"/>
           </p:cNvSpPr>
@@ -6559,13 +6875,13 @@
               <a:rPr lang="de-DE" smtClean="0"/>
               <a:t>Titelmasterformat durch Klicken bearbeiten</a:t>
             </a:r>
-            <a:endParaRPr lang="de-DE"/>
+            <a:endParaRPr lang="en-US" dirty="0"/>
           </a:p>
         </p:txBody>
       </p:sp>
       <p:sp>
         <p:nvSpPr>
-          <p:cNvPr id="3" name="Inhaltsplatzhalter 2"/>
+          <p:cNvPr id="3" name="Content Placeholder 2"/>
           <p:cNvSpPr>
             <a:spLocks noGrp="1"/>
           </p:cNvSpPr>
@@ -6581,7 +6897,7 @@
             <a:pPr lvl="0"/>
             <a:r>
               <a:rPr lang="de-DE" smtClean="0"/>
-              <a:t>Textmasterformate durch Klicken bearbeiten</a:t>
+              <a:t>Formatvorlagen des Textmasters bearbeiten</a:t>
             </a:r>
           </a:p>
           <a:p>
@@ -6611,13 +6927,13 @@
               <a:rPr lang="de-DE" smtClean="0"/>
               <a:t>Fünfte Ebene</a:t>
             </a:r>
-            <a:endParaRPr lang="de-DE"/>
+            <a:endParaRPr lang="en-US" dirty="0"/>
           </a:p>
         </p:txBody>
       </p:sp>
       <p:sp>
         <p:nvSpPr>
-          <p:cNvPr id="4" name="Datumsplatzhalter 3"/>
+          <p:cNvPr id="4" name="Date Placeholder 3"/>
           <p:cNvSpPr>
             <a:spLocks noGrp="1"/>
           </p:cNvSpPr>
@@ -6633,7 +6949,7 @@
             <a:fld id="{1BA50D42-C9CD-4801-B293-61D1F53EC57E}" type="datetimeFigureOut">
               <a:rPr lang="de-DE" smtClean="0"/>
               <a:pPr/>
-              <a:t>18.05.2016</a:t>
+              <a:t>22.05.2016</a:t>
             </a:fld>
             <a:endParaRPr lang="de-DE"/>
           </a:p>
@@ -6641,7 +6957,7 @@
       </p:sp>
       <p:sp>
         <p:nvSpPr>
-          <p:cNvPr id="5" name="Fußzeilenplatzhalter 4"/>
+          <p:cNvPr id="5" name="Footer Placeholder 4"/>
           <p:cNvSpPr>
             <a:spLocks noGrp="1"/>
           </p:cNvSpPr>
@@ -6660,7 +6976,7 @@
       </p:sp>
       <p:sp>
         <p:nvSpPr>
-          <p:cNvPr id="6" name="Foliennummernplatzhalter 5"/>
+          <p:cNvPr id="6" name="Slide Number Placeholder 5"/>
           <p:cNvSpPr>
             <a:spLocks noGrp="1"/>
           </p:cNvSpPr>
@@ -6683,6 +6999,11 @@
         </p:txBody>
       </p:sp>
     </p:spTree>
+    <p:extLst>
+      <p:ext uri="{BB962C8B-B14F-4D97-AF65-F5344CB8AC3E}">
+        <p14:creationId xmlns:p14="http://schemas.microsoft.com/office/powerpoint/2010/main" val="3397220835"/>
+      </p:ext>
+    </p:extLst>
   </p:cSld>
   <p:clrMapOvr>
     <a:masterClrMapping/>
@@ -6691,8 +7012,16 @@
 </file>
 
 <file path=ppt/slideLayouts/slideLayout3.xml><?xml version="1.0" encoding="utf-8"?>
-<p:sldLayout xmlns:a="http://schemas.openxmlformats.org/drawingml/2006/main" xmlns:r="http://schemas.openxmlformats.org/officeDocument/2006/relationships" xmlns:p="http://schemas.openxmlformats.org/presentationml/2006/main" type="secHead" preserve="1">
-  <p:cSld name="Abschnittsüberschrift">
+<p:sldLayout xmlns:a="http://schemas.openxmlformats.org/drawingml/2006/main" xmlns:r="http://schemas.openxmlformats.org/officeDocument/2006/relationships" xmlns:p="http://schemas.openxmlformats.org/presentationml/2006/main" showMasterSp="0" type="secHead" preserve="1">
+  <p:cSld name="Abschnitts-&#10;überschrift">
+    <p:bg>
+      <p:bgPr>
+        <a:solidFill>
+          <a:schemeClr val="bg1"/>
+        </a:solidFill>
+        <a:effectLst/>
+      </p:bgPr>
+    </p:bg>
     <p:spTree>
       <p:nvGrpSpPr>
         <p:cNvPr id="1" name=""/>
@@ -6709,7 +7038,83 @@
       </p:grpSpPr>
       <p:sp>
         <p:nvSpPr>
-          <p:cNvPr id="2" name="Titel 1"/>
+          <p:cNvPr id="7" name="Rectangle 6"/>
+          <p:cNvSpPr/>
+          <p:nvPr/>
+        </p:nvSpPr>
+        <p:spPr>
+          <a:xfrm>
+            <a:off x="2382" y="6400800"/>
+            <a:ext cx="9141619" cy="457200"/>
+          </a:xfrm>
+          <a:prstGeom prst="rect">
+            <a:avLst/>
+          </a:prstGeom>
+          <a:solidFill>
+            <a:schemeClr val="accent2"/>
+          </a:solidFill>
+          <a:ln>
+            <a:noFill/>
+          </a:ln>
+        </p:spPr>
+        <p:style>
+          <a:lnRef idx="2">
+            <a:schemeClr val="accent1">
+              <a:shade val="50000"/>
+            </a:schemeClr>
+          </a:lnRef>
+          <a:fillRef idx="1">
+            <a:schemeClr val="accent1"/>
+          </a:fillRef>
+          <a:effectRef idx="0">
+            <a:schemeClr val="accent1"/>
+          </a:effectRef>
+          <a:fontRef idx="minor">
+            <a:schemeClr val="lt1"/>
+          </a:fontRef>
+        </p:style>
+      </p:sp>
+      <p:sp>
+        <p:nvSpPr>
+          <p:cNvPr id="8" name="Rectangle 7"/>
+          <p:cNvSpPr/>
+          <p:nvPr/>
+        </p:nvSpPr>
+        <p:spPr>
+          <a:xfrm>
+            <a:off x="12" y="6334316"/>
+            <a:ext cx="9141619" cy="64008"/>
+          </a:xfrm>
+          <a:prstGeom prst="rect">
+            <a:avLst/>
+          </a:prstGeom>
+          <a:solidFill>
+            <a:schemeClr val="accent1"/>
+          </a:solidFill>
+          <a:ln>
+            <a:noFill/>
+          </a:ln>
+        </p:spPr>
+        <p:style>
+          <a:lnRef idx="2">
+            <a:schemeClr val="accent1">
+              <a:shade val="50000"/>
+            </a:schemeClr>
+          </a:lnRef>
+          <a:fillRef idx="1">
+            <a:schemeClr val="accent1"/>
+          </a:fillRef>
+          <a:effectRef idx="0">
+            <a:schemeClr val="accent1"/>
+          </a:effectRef>
+          <a:fontRef idx="minor">
+            <a:schemeClr val="lt1"/>
+          </a:fontRef>
+        </p:style>
+      </p:sp>
+      <p:sp>
+        <p:nvSpPr>
+          <p:cNvPr id="2" name="Title 1"/>
           <p:cNvSpPr>
             <a:spLocks noGrp="1"/>
           </p:cNvSpPr>
@@ -6719,15 +7124,27 @@
         </p:nvSpPr>
         <p:spPr>
           <a:xfrm>
-            <a:off x="722313" y="4406900"/>
-            <a:ext cx="7772400" cy="1362075"/>
+            <a:off x="822960" y="758952"/>
+            <a:ext cx="7543800" cy="3566160"/>
           </a:xfrm>
         </p:spPr>
         <p:txBody>
-          <a:bodyPr anchor="t"/>
+          <a:bodyPr anchor="b" anchorCtr="0">
+            <a:normAutofit/>
+          </a:bodyPr>
           <a:lstStyle>
-            <a:lvl1pPr algn="l">
-              <a:defRPr sz="4000" b="1" cap="all"/>
+            <a:lvl1pPr>
+              <a:lnSpc>
+                <a:spcPct val="85000"/>
+              </a:lnSpc>
+              <a:defRPr sz="8000" b="0">
+                <a:solidFill>
+                  <a:schemeClr val="tx1">
+                    <a:lumMod val="85000"/>
+                    <a:lumOff val="15000"/>
+                  </a:schemeClr>
+                </a:solidFill>
+              </a:defRPr>
             </a:lvl1pPr>
           </a:lstStyle>
           <a:p>
@@ -6735,13 +7152,13 @@
               <a:rPr lang="de-DE" smtClean="0"/>
               <a:t>Titelmasterformat durch Klicken bearbeiten</a:t>
             </a:r>
-            <a:endParaRPr lang="de-DE"/>
+            <a:endParaRPr lang="en-US" dirty="0"/>
           </a:p>
         </p:txBody>
       </p:sp>
       <p:sp>
         <p:nvSpPr>
-          <p:cNvPr id="3" name="Textplatzhalter 2"/>
+          <p:cNvPr id="3" name="Text Placeholder 2"/>
           <p:cNvSpPr>
             <a:spLocks noGrp="1"/>
           </p:cNvSpPr>
@@ -6751,21 +7168,22 @@
         </p:nvSpPr>
         <p:spPr>
           <a:xfrm>
-            <a:off x="722313" y="2906713"/>
-            <a:ext cx="7772400" cy="1500187"/>
+            <a:off x="822960" y="4453128"/>
+            <a:ext cx="7543800" cy="1143000"/>
           </a:xfrm>
         </p:spPr>
         <p:txBody>
-          <a:bodyPr anchor="b"/>
+          <a:bodyPr lIns="91440" rIns="91440" anchor="t" anchorCtr="0">
+            <a:normAutofit/>
+          </a:bodyPr>
           <a:lstStyle>
             <a:lvl1pPr marL="0" indent="0">
               <a:buNone/>
-              <a:defRPr sz="2000">
+              <a:defRPr sz="2400" cap="all" spc="200" baseline="0">
                 <a:solidFill>
-                  <a:schemeClr val="tx1">
-                    <a:tint val="75000"/>
-                  </a:schemeClr>
+                  <a:schemeClr val="tx2"/>
                 </a:solidFill>
+                <a:latin typeface="+mj-lt"/>
               </a:defRPr>
             </a:lvl1pPr>
             <a:lvl2pPr marL="457200" indent="0">
@@ -6853,14 +7271,14 @@
             <a:pPr lvl="0"/>
             <a:r>
               <a:rPr lang="de-DE" smtClean="0"/>
-              <a:t>Textmasterformate durch Klicken bearbeiten</a:t>
+              <a:t>Formatvorlagen des Textmasters bearbeiten</a:t>
             </a:r>
           </a:p>
         </p:txBody>
       </p:sp>
       <p:sp>
         <p:nvSpPr>
-          <p:cNvPr id="4" name="Datumsplatzhalter 3"/>
+          <p:cNvPr id="4" name="Date Placeholder 3"/>
           <p:cNvSpPr>
             <a:spLocks noGrp="1"/>
           </p:cNvSpPr>
@@ -6876,7 +7294,7 @@
             <a:fld id="{1BA50D42-C9CD-4801-B293-61D1F53EC57E}" type="datetimeFigureOut">
               <a:rPr lang="de-DE" smtClean="0"/>
               <a:pPr/>
-              <a:t>18.05.2016</a:t>
+              <a:t>22.05.2016</a:t>
             </a:fld>
             <a:endParaRPr lang="de-DE"/>
           </a:p>
@@ -6884,7 +7302,7 @@
       </p:sp>
       <p:sp>
         <p:nvSpPr>
-          <p:cNvPr id="5" name="Fußzeilenplatzhalter 4"/>
+          <p:cNvPr id="5" name="Footer Placeholder 4"/>
           <p:cNvSpPr>
             <a:spLocks noGrp="1"/>
           </p:cNvSpPr>
@@ -6903,7 +7321,7 @@
       </p:sp>
       <p:sp>
         <p:nvSpPr>
-          <p:cNvPr id="6" name="Foliennummernplatzhalter 5"/>
+          <p:cNvPr id="6" name="Slide Number Placeholder 5"/>
           <p:cNvSpPr>
             <a:spLocks noGrp="1"/>
           </p:cNvSpPr>
@@ -6925,7 +7343,50 @@
           </a:p>
         </p:txBody>
       </p:sp>
+      <p:cxnSp>
+        <p:nvCxnSpPr>
+          <p:cNvPr id="9" name="Straight Connector 8"/>
+          <p:cNvCxnSpPr/>
+          <p:nvPr/>
+        </p:nvCxnSpPr>
+        <p:spPr>
+          <a:xfrm>
+            <a:off x="905744" y="4343400"/>
+            <a:ext cx="7406640" cy="0"/>
+          </a:xfrm>
+          <a:prstGeom prst="line">
+            <a:avLst/>
+          </a:prstGeom>
+          <a:ln w="6350">
+            <a:solidFill>
+              <a:schemeClr val="tx1">
+                <a:lumMod val="50000"/>
+                <a:lumOff val="50000"/>
+              </a:schemeClr>
+            </a:solidFill>
+          </a:ln>
+        </p:spPr>
+        <p:style>
+          <a:lnRef idx="1">
+            <a:schemeClr val="accent1"/>
+          </a:lnRef>
+          <a:fillRef idx="0">
+            <a:schemeClr val="accent1"/>
+          </a:fillRef>
+          <a:effectRef idx="0">
+            <a:schemeClr val="accent1"/>
+          </a:effectRef>
+          <a:fontRef idx="minor">
+            <a:schemeClr val="tx1"/>
+          </a:fontRef>
+        </p:style>
+      </p:cxnSp>
     </p:spTree>
+    <p:extLst>
+      <p:ext uri="{BB962C8B-B14F-4D97-AF65-F5344CB8AC3E}">
+        <p14:creationId xmlns:p14="http://schemas.microsoft.com/office/powerpoint/2010/main" val="2988498725"/>
+      </p:ext>
+    </p:extLst>
   </p:cSld>
   <p:clrMapOvr>
     <a:masterClrMapping/>
@@ -6952,7 +7413,7 @@
       </p:grpSpPr>
       <p:sp>
         <p:nvSpPr>
-          <p:cNvPr id="2" name="Titel 1"/>
+          <p:cNvPr id="8" name="Title 7"/>
           <p:cNvSpPr>
             <a:spLocks noGrp="1"/>
           </p:cNvSpPr>
@@ -6960,7 +7421,12 @@
             <p:ph type="title"/>
           </p:nvPr>
         </p:nvSpPr>
-        <p:spPr/>
+        <p:spPr>
+          <a:xfrm>
+            <a:off x="822960" y="286604"/>
+            <a:ext cx="7543800" cy="1450757"/>
+          </a:xfrm>
+        </p:spPr>
         <p:txBody>
           <a:bodyPr/>
           <a:lstStyle/>
@@ -6969,13 +7435,13 @@
               <a:rPr lang="de-DE" smtClean="0"/>
               <a:t>Titelmasterformat durch Klicken bearbeiten</a:t>
             </a:r>
-            <a:endParaRPr lang="de-DE"/>
+            <a:endParaRPr lang="en-US" dirty="0"/>
           </a:p>
         </p:txBody>
       </p:sp>
       <p:sp>
         <p:nvSpPr>
-          <p:cNvPr id="3" name="Inhaltsplatzhalter 2"/>
+          <p:cNvPr id="3" name="Content Placeholder 2"/>
           <p:cNvSpPr>
             <a:spLocks noGrp="1"/>
           </p:cNvSpPr>
@@ -6985,46 +7451,18 @@
         </p:nvSpPr>
         <p:spPr>
           <a:xfrm>
-            <a:off x="457200" y="1600200"/>
-            <a:ext cx="4038600" cy="4525963"/>
+            <a:off x="822960" y="1845735"/>
+            <a:ext cx="3703320" cy="4023359"/>
           </a:xfrm>
         </p:spPr>
         <p:txBody>
           <a:bodyPr/>
-          <a:lstStyle>
-            <a:lvl1pPr>
-              <a:defRPr sz="2800"/>
-            </a:lvl1pPr>
-            <a:lvl2pPr>
-              <a:defRPr sz="2400"/>
-            </a:lvl2pPr>
-            <a:lvl3pPr>
-              <a:defRPr sz="2000"/>
-            </a:lvl3pPr>
-            <a:lvl4pPr>
-              <a:defRPr sz="1800"/>
-            </a:lvl4pPr>
-            <a:lvl5pPr>
-              <a:defRPr sz="1800"/>
-            </a:lvl5pPr>
-            <a:lvl6pPr>
-              <a:defRPr sz="1800"/>
-            </a:lvl6pPr>
-            <a:lvl7pPr>
-              <a:defRPr sz="1800"/>
-            </a:lvl7pPr>
-            <a:lvl8pPr>
-              <a:defRPr sz="1800"/>
-            </a:lvl8pPr>
-            <a:lvl9pPr>
-              <a:defRPr sz="1800"/>
-            </a:lvl9pPr>
-          </a:lstStyle>
+          <a:lstStyle/>
           <a:p>
             <a:pPr lvl="0"/>
             <a:r>
               <a:rPr lang="de-DE" smtClean="0"/>
-              <a:t>Textmasterformate durch Klicken bearbeiten</a:t>
+              <a:t>Formatvorlagen des Textmasters bearbeiten</a:t>
             </a:r>
           </a:p>
           <a:p>
@@ -7054,13 +7492,13 @@
               <a:rPr lang="de-DE" smtClean="0"/>
               <a:t>Fünfte Ebene</a:t>
             </a:r>
-            <a:endParaRPr lang="de-DE"/>
+            <a:endParaRPr lang="en-US" dirty="0"/>
           </a:p>
         </p:txBody>
       </p:sp>
       <p:sp>
         <p:nvSpPr>
-          <p:cNvPr id="4" name="Inhaltsplatzhalter 3"/>
+          <p:cNvPr id="4" name="Content Placeholder 3"/>
           <p:cNvSpPr>
             <a:spLocks noGrp="1"/>
           </p:cNvSpPr>
@@ -7070,46 +7508,18 @@
         </p:nvSpPr>
         <p:spPr>
           <a:xfrm>
-            <a:off x="4648200" y="1600200"/>
-            <a:ext cx="4038600" cy="4525963"/>
+            <a:off x="4663440" y="1845735"/>
+            <a:ext cx="3703320" cy="4023360"/>
           </a:xfrm>
         </p:spPr>
         <p:txBody>
           <a:bodyPr/>
-          <a:lstStyle>
-            <a:lvl1pPr>
-              <a:defRPr sz="2800"/>
-            </a:lvl1pPr>
-            <a:lvl2pPr>
-              <a:defRPr sz="2400"/>
-            </a:lvl2pPr>
-            <a:lvl3pPr>
-              <a:defRPr sz="2000"/>
-            </a:lvl3pPr>
-            <a:lvl4pPr>
-              <a:defRPr sz="1800"/>
-            </a:lvl4pPr>
-            <a:lvl5pPr>
-              <a:defRPr sz="1800"/>
-            </a:lvl5pPr>
-            <a:lvl6pPr>
-              <a:defRPr sz="1800"/>
-            </a:lvl6pPr>
-            <a:lvl7pPr>
-              <a:defRPr sz="1800"/>
-            </a:lvl7pPr>
-            <a:lvl8pPr>
-              <a:defRPr sz="1800"/>
-            </a:lvl8pPr>
-            <a:lvl9pPr>
-              <a:defRPr sz="1800"/>
-            </a:lvl9pPr>
-          </a:lstStyle>
+          <a:lstStyle/>
           <a:p>
             <a:pPr lvl="0"/>
             <a:r>
               <a:rPr lang="de-DE" smtClean="0"/>
-              <a:t>Textmasterformate durch Klicken bearbeiten</a:t>
+              <a:t>Formatvorlagen des Textmasters bearbeiten</a:t>
             </a:r>
           </a:p>
           <a:p>
@@ -7139,13 +7549,13 @@
               <a:rPr lang="de-DE" smtClean="0"/>
               <a:t>Fünfte Ebene</a:t>
             </a:r>
-            <a:endParaRPr lang="de-DE"/>
+            <a:endParaRPr lang="en-US" dirty="0"/>
           </a:p>
         </p:txBody>
       </p:sp>
       <p:sp>
         <p:nvSpPr>
-          <p:cNvPr id="5" name="Datumsplatzhalter 4"/>
+          <p:cNvPr id="5" name="Date Placeholder 4"/>
           <p:cNvSpPr>
             <a:spLocks noGrp="1"/>
           </p:cNvSpPr>
@@ -7161,7 +7571,7 @@
             <a:fld id="{1BA50D42-C9CD-4801-B293-61D1F53EC57E}" type="datetimeFigureOut">
               <a:rPr lang="de-DE" smtClean="0"/>
               <a:pPr/>
-              <a:t>18.05.2016</a:t>
+              <a:t>22.05.2016</a:t>
             </a:fld>
             <a:endParaRPr lang="de-DE"/>
           </a:p>
@@ -7169,7 +7579,7 @@
       </p:sp>
       <p:sp>
         <p:nvSpPr>
-          <p:cNvPr id="6" name="Fußzeilenplatzhalter 5"/>
+          <p:cNvPr id="6" name="Footer Placeholder 5"/>
           <p:cNvSpPr>
             <a:spLocks noGrp="1"/>
           </p:cNvSpPr>
@@ -7188,7 +7598,7 @@
       </p:sp>
       <p:sp>
         <p:nvSpPr>
-          <p:cNvPr id="7" name="Foliennummernplatzhalter 6"/>
+          <p:cNvPr id="7" name="Slide Number Placeholder 6"/>
           <p:cNvSpPr>
             <a:spLocks noGrp="1"/>
           </p:cNvSpPr>
@@ -7211,6 +7621,11 @@
         </p:txBody>
       </p:sp>
     </p:spTree>
+    <p:extLst>
+      <p:ext uri="{BB962C8B-B14F-4D97-AF65-F5344CB8AC3E}">
+        <p14:creationId xmlns:p14="http://schemas.microsoft.com/office/powerpoint/2010/main" val="2763278326"/>
+      </p:ext>
+    </p:extLst>
   </p:cSld>
   <p:clrMapOvr>
     <a:masterClrMapping/>
@@ -7237,7 +7652,7 @@
       </p:grpSpPr>
       <p:sp>
         <p:nvSpPr>
-          <p:cNvPr id="2" name="Titel 1"/>
+          <p:cNvPr id="10" name="Title 9"/>
           <p:cNvSpPr>
             <a:spLocks noGrp="1"/>
           </p:cNvSpPr>
@@ -7245,26 +7660,27 @@
             <p:ph type="title"/>
           </p:nvPr>
         </p:nvSpPr>
-        <p:spPr/>
+        <p:spPr>
+          <a:xfrm>
+            <a:off x="822960" y="286604"/>
+            <a:ext cx="7543800" cy="1450757"/>
+          </a:xfrm>
+        </p:spPr>
         <p:txBody>
           <a:bodyPr/>
-          <a:lstStyle>
-            <a:lvl1pPr>
-              <a:defRPr/>
-            </a:lvl1pPr>
-          </a:lstStyle>
+          <a:lstStyle/>
           <a:p>
             <a:r>
               <a:rPr lang="de-DE" smtClean="0"/>
               <a:t>Titelmasterformat durch Klicken bearbeiten</a:t>
             </a:r>
-            <a:endParaRPr lang="de-DE"/>
+            <a:endParaRPr lang="en-US" dirty="0"/>
           </a:p>
         </p:txBody>
       </p:sp>
       <p:sp>
         <p:nvSpPr>
-          <p:cNvPr id="3" name="Textplatzhalter 2"/>
+          <p:cNvPr id="3" name="Text Placeholder 2"/>
           <p:cNvSpPr>
             <a:spLocks noGrp="1"/>
           </p:cNvSpPr>
@@ -7274,16 +7690,22 @@
         </p:nvSpPr>
         <p:spPr>
           <a:xfrm>
-            <a:off x="457200" y="1535113"/>
-            <a:ext cx="4040188" cy="639762"/>
+            <a:off x="822960" y="1846052"/>
+            <a:ext cx="3703320" cy="736282"/>
           </a:xfrm>
         </p:spPr>
         <p:txBody>
-          <a:bodyPr anchor="b"/>
+          <a:bodyPr lIns="91440" rIns="91440" anchor="ctr">
+            <a:normAutofit/>
+          </a:bodyPr>
           <a:lstStyle>
             <a:lvl1pPr marL="0" indent="0">
               <a:buNone/>
-              <a:defRPr sz="2400" b="1"/>
+              <a:defRPr sz="2000" b="0" cap="all" baseline="0">
+                <a:solidFill>
+                  <a:schemeClr val="tx2"/>
+                </a:solidFill>
+              </a:defRPr>
             </a:lvl1pPr>
             <a:lvl2pPr marL="457200" indent="0">
               <a:buNone/>
@@ -7322,14 +7744,14 @@
             <a:pPr lvl="0"/>
             <a:r>
               <a:rPr lang="de-DE" smtClean="0"/>
-              <a:t>Textmasterformate durch Klicken bearbeiten</a:t>
+              <a:t>Formatvorlagen des Textmasters bearbeiten</a:t>
             </a:r>
           </a:p>
         </p:txBody>
       </p:sp>
       <p:sp>
         <p:nvSpPr>
-          <p:cNvPr id="4" name="Inhaltsplatzhalter 3"/>
+          <p:cNvPr id="4" name="Content Placeholder 3"/>
           <p:cNvSpPr>
             <a:spLocks noGrp="1"/>
           </p:cNvSpPr>
@@ -7339,46 +7761,18 @@
         </p:nvSpPr>
         <p:spPr>
           <a:xfrm>
-            <a:off x="457200" y="2174875"/>
-            <a:ext cx="4040188" cy="3951288"/>
+            <a:off x="822960" y="2582335"/>
+            <a:ext cx="3703320" cy="3286760"/>
           </a:xfrm>
         </p:spPr>
         <p:txBody>
           <a:bodyPr/>
-          <a:lstStyle>
-            <a:lvl1pPr>
-              <a:defRPr sz="2400"/>
-            </a:lvl1pPr>
-            <a:lvl2pPr>
-              <a:defRPr sz="2000"/>
-            </a:lvl2pPr>
-            <a:lvl3pPr>
-              <a:defRPr sz="1800"/>
-            </a:lvl3pPr>
-            <a:lvl4pPr>
-              <a:defRPr sz="1600"/>
-            </a:lvl4pPr>
-            <a:lvl5pPr>
-              <a:defRPr sz="1600"/>
-            </a:lvl5pPr>
-            <a:lvl6pPr>
-              <a:defRPr sz="1600"/>
-            </a:lvl6pPr>
-            <a:lvl7pPr>
-              <a:defRPr sz="1600"/>
-            </a:lvl7pPr>
-            <a:lvl8pPr>
-              <a:defRPr sz="1600"/>
-            </a:lvl8pPr>
-            <a:lvl9pPr>
-              <a:defRPr sz="1600"/>
-            </a:lvl9pPr>
-          </a:lstStyle>
+          <a:lstStyle/>
           <a:p>
             <a:pPr lvl="0"/>
             <a:r>
               <a:rPr lang="de-DE" smtClean="0"/>
-              <a:t>Textmasterformate durch Klicken bearbeiten</a:t>
+              <a:t>Formatvorlagen des Textmasters bearbeiten</a:t>
             </a:r>
           </a:p>
           <a:p>
@@ -7408,13 +7802,13 @@
               <a:rPr lang="de-DE" smtClean="0"/>
               <a:t>Fünfte Ebene</a:t>
             </a:r>
-            <a:endParaRPr lang="de-DE"/>
+            <a:endParaRPr lang="en-US" dirty="0"/>
           </a:p>
         </p:txBody>
       </p:sp>
       <p:sp>
         <p:nvSpPr>
-          <p:cNvPr id="5" name="Textplatzhalter 4"/>
+          <p:cNvPr id="5" name="Text Placeholder 4"/>
           <p:cNvSpPr>
             <a:spLocks noGrp="1"/>
           </p:cNvSpPr>
@@ -7424,16 +7818,22 @@
         </p:nvSpPr>
         <p:spPr>
           <a:xfrm>
-            <a:off x="4645025" y="1535113"/>
-            <a:ext cx="4041775" cy="639762"/>
+            <a:off x="4663440" y="1846052"/>
+            <a:ext cx="3703320" cy="736282"/>
           </a:xfrm>
         </p:spPr>
         <p:txBody>
-          <a:bodyPr anchor="b"/>
+          <a:bodyPr lIns="91440" rIns="91440" anchor="ctr">
+            <a:normAutofit/>
+          </a:bodyPr>
           <a:lstStyle>
             <a:lvl1pPr marL="0" indent="0">
               <a:buNone/>
-              <a:defRPr sz="2400" b="1"/>
+              <a:defRPr sz="2000" b="0" cap="all" baseline="0">
+                <a:solidFill>
+                  <a:schemeClr val="tx2"/>
+                </a:solidFill>
+              </a:defRPr>
             </a:lvl1pPr>
             <a:lvl2pPr marL="457200" indent="0">
               <a:buNone/>
@@ -7472,14 +7872,14 @@
             <a:pPr lvl="0"/>
             <a:r>
               <a:rPr lang="de-DE" smtClean="0"/>
-              <a:t>Textmasterformate durch Klicken bearbeiten</a:t>
+              <a:t>Formatvorlagen des Textmasters bearbeiten</a:t>
             </a:r>
           </a:p>
         </p:txBody>
       </p:sp>
       <p:sp>
         <p:nvSpPr>
-          <p:cNvPr id="6" name="Inhaltsplatzhalter 5"/>
+          <p:cNvPr id="6" name="Content Placeholder 5"/>
           <p:cNvSpPr>
             <a:spLocks noGrp="1"/>
           </p:cNvSpPr>
@@ -7489,46 +7889,18 @@
         </p:nvSpPr>
         <p:spPr>
           <a:xfrm>
-            <a:off x="4645025" y="2174875"/>
-            <a:ext cx="4041775" cy="3951288"/>
+            <a:off x="4663440" y="2582334"/>
+            <a:ext cx="3703320" cy="3286760"/>
           </a:xfrm>
         </p:spPr>
         <p:txBody>
           <a:bodyPr/>
-          <a:lstStyle>
-            <a:lvl1pPr>
-              <a:defRPr sz="2400"/>
-            </a:lvl1pPr>
-            <a:lvl2pPr>
-              <a:defRPr sz="2000"/>
-            </a:lvl2pPr>
-            <a:lvl3pPr>
-              <a:defRPr sz="1800"/>
-            </a:lvl3pPr>
-            <a:lvl4pPr>
-              <a:defRPr sz="1600"/>
-            </a:lvl4pPr>
-            <a:lvl5pPr>
-              <a:defRPr sz="1600"/>
-            </a:lvl5pPr>
-            <a:lvl6pPr>
-              <a:defRPr sz="1600"/>
-            </a:lvl6pPr>
-            <a:lvl7pPr>
-              <a:defRPr sz="1600"/>
-            </a:lvl7pPr>
-            <a:lvl8pPr>
-              <a:defRPr sz="1600"/>
-            </a:lvl8pPr>
-            <a:lvl9pPr>
-              <a:defRPr sz="1600"/>
-            </a:lvl9pPr>
-          </a:lstStyle>
+          <a:lstStyle/>
           <a:p>
             <a:pPr lvl="0"/>
             <a:r>
               <a:rPr lang="de-DE" smtClean="0"/>
-              <a:t>Textmasterformate durch Klicken bearbeiten</a:t>
+              <a:t>Formatvorlagen des Textmasters bearbeiten</a:t>
             </a:r>
           </a:p>
           <a:p>
@@ -7558,13 +7930,13 @@
               <a:rPr lang="de-DE" smtClean="0"/>
               <a:t>Fünfte Ebene</a:t>
             </a:r>
-            <a:endParaRPr lang="de-DE"/>
+            <a:endParaRPr lang="en-US" dirty="0"/>
           </a:p>
         </p:txBody>
       </p:sp>
       <p:sp>
         <p:nvSpPr>
-          <p:cNvPr id="7" name="Datumsplatzhalter 6"/>
+          <p:cNvPr id="7" name="Date Placeholder 6"/>
           <p:cNvSpPr>
             <a:spLocks noGrp="1"/>
           </p:cNvSpPr>
@@ -7580,7 +7952,7 @@
             <a:fld id="{1BA50D42-C9CD-4801-B293-61D1F53EC57E}" type="datetimeFigureOut">
               <a:rPr lang="de-DE" smtClean="0"/>
               <a:pPr/>
-              <a:t>18.05.2016</a:t>
+              <a:t>22.05.2016</a:t>
             </a:fld>
             <a:endParaRPr lang="de-DE"/>
           </a:p>
@@ -7588,7 +7960,7 @@
       </p:sp>
       <p:sp>
         <p:nvSpPr>
-          <p:cNvPr id="8" name="Fußzeilenplatzhalter 7"/>
+          <p:cNvPr id="8" name="Footer Placeholder 7"/>
           <p:cNvSpPr>
             <a:spLocks noGrp="1"/>
           </p:cNvSpPr>
@@ -7607,7 +7979,7 @@
       </p:sp>
       <p:sp>
         <p:nvSpPr>
-          <p:cNvPr id="9" name="Foliennummernplatzhalter 8"/>
+          <p:cNvPr id="9" name="Slide Number Placeholder 8"/>
           <p:cNvSpPr>
             <a:spLocks noGrp="1"/>
           </p:cNvSpPr>
@@ -7630,6 +8002,11 @@
         </p:txBody>
       </p:sp>
     </p:spTree>
+    <p:extLst>
+      <p:ext uri="{BB962C8B-B14F-4D97-AF65-F5344CB8AC3E}">
+        <p14:creationId xmlns:p14="http://schemas.microsoft.com/office/powerpoint/2010/main" val="675981858"/>
+      </p:ext>
+    </p:extLst>
   </p:cSld>
   <p:clrMapOvr>
     <a:masterClrMapping/>
@@ -7656,7 +8033,7 @@
       </p:grpSpPr>
       <p:sp>
         <p:nvSpPr>
-          <p:cNvPr id="2" name="Titel 1"/>
+          <p:cNvPr id="2" name="Title 1"/>
           <p:cNvSpPr>
             <a:spLocks noGrp="1"/>
           </p:cNvSpPr>
@@ -7673,13 +8050,13 @@
               <a:rPr lang="de-DE" smtClean="0"/>
               <a:t>Titelmasterformat durch Klicken bearbeiten</a:t>
             </a:r>
-            <a:endParaRPr lang="de-DE"/>
+            <a:endParaRPr lang="en-US" dirty="0"/>
           </a:p>
         </p:txBody>
       </p:sp>
       <p:sp>
         <p:nvSpPr>
-          <p:cNvPr id="3" name="Datumsplatzhalter 2"/>
+          <p:cNvPr id="3" name="Date Placeholder 2"/>
           <p:cNvSpPr>
             <a:spLocks noGrp="1"/>
           </p:cNvSpPr>
@@ -7695,7 +8072,7 @@
             <a:fld id="{1BA50D42-C9CD-4801-B293-61D1F53EC57E}" type="datetimeFigureOut">
               <a:rPr lang="de-DE" smtClean="0"/>
               <a:pPr/>
-              <a:t>18.05.2016</a:t>
+              <a:t>22.05.2016</a:t>
             </a:fld>
             <a:endParaRPr lang="de-DE"/>
           </a:p>
@@ -7703,7 +8080,7 @@
       </p:sp>
       <p:sp>
         <p:nvSpPr>
-          <p:cNvPr id="4" name="Fußzeilenplatzhalter 3"/>
+          <p:cNvPr id="4" name="Footer Placeholder 3"/>
           <p:cNvSpPr>
             <a:spLocks noGrp="1"/>
           </p:cNvSpPr>
@@ -7722,7 +8099,7 @@
       </p:sp>
       <p:sp>
         <p:nvSpPr>
-          <p:cNvPr id="5" name="Foliennummernplatzhalter 4"/>
+          <p:cNvPr id="5" name="Slide Number Placeholder 4"/>
           <p:cNvSpPr>
             <a:spLocks noGrp="1"/>
           </p:cNvSpPr>
@@ -7745,6 +8122,11 @@
         </p:txBody>
       </p:sp>
     </p:spTree>
+    <p:extLst>
+      <p:ext uri="{BB962C8B-B14F-4D97-AF65-F5344CB8AC3E}">
+        <p14:creationId xmlns:p14="http://schemas.microsoft.com/office/powerpoint/2010/main" val="1541309378"/>
+      </p:ext>
+    </p:extLst>
   </p:cSld>
   <p:clrMapOvr>
     <a:masterClrMapping/>
@@ -7753,7 +8135,7 @@
 </file>
 
 <file path=ppt/slideLayouts/slideLayout7.xml><?xml version="1.0" encoding="utf-8"?>
-<p:sldLayout xmlns:a="http://schemas.openxmlformats.org/drawingml/2006/main" xmlns:r="http://schemas.openxmlformats.org/officeDocument/2006/relationships" xmlns:p="http://schemas.openxmlformats.org/presentationml/2006/main" type="blank" preserve="1">
+<p:sldLayout xmlns:a="http://schemas.openxmlformats.org/drawingml/2006/main" xmlns:r="http://schemas.openxmlformats.org/officeDocument/2006/relationships" xmlns:p="http://schemas.openxmlformats.org/presentationml/2006/main" showMasterSp="0" type="blank" preserve="1">
   <p:cSld name="Leer">
     <p:spTree>
       <p:nvGrpSpPr>
@@ -7771,7 +8153,83 @@
       </p:grpSpPr>
       <p:sp>
         <p:nvSpPr>
-          <p:cNvPr id="2" name="Datumsplatzhalter 1"/>
+          <p:cNvPr id="5" name="Rectangle 4"/>
+          <p:cNvSpPr/>
+          <p:nvPr/>
+        </p:nvSpPr>
+        <p:spPr>
+          <a:xfrm>
+            <a:off x="2382" y="6400800"/>
+            <a:ext cx="9141619" cy="457200"/>
+          </a:xfrm>
+          <a:prstGeom prst="rect">
+            <a:avLst/>
+          </a:prstGeom>
+          <a:solidFill>
+            <a:schemeClr val="accent2"/>
+          </a:solidFill>
+          <a:ln>
+            <a:noFill/>
+          </a:ln>
+        </p:spPr>
+        <p:style>
+          <a:lnRef idx="2">
+            <a:schemeClr val="accent1">
+              <a:shade val="50000"/>
+            </a:schemeClr>
+          </a:lnRef>
+          <a:fillRef idx="1">
+            <a:schemeClr val="accent1"/>
+          </a:fillRef>
+          <a:effectRef idx="0">
+            <a:schemeClr val="accent1"/>
+          </a:effectRef>
+          <a:fontRef idx="minor">
+            <a:schemeClr val="lt1"/>
+          </a:fontRef>
+        </p:style>
+      </p:sp>
+      <p:sp>
+        <p:nvSpPr>
+          <p:cNvPr id="6" name="Rectangle 5"/>
+          <p:cNvSpPr/>
+          <p:nvPr/>
+        </p:nvSpPr>
+        <p:spPr>
+          <a:xfrm>
+            <a:off x="12" y="6334316"/>
+            <a:ext cx="9141619" cy="64008"/>
+          </a:xfrm>
+          <a:prstGeom prst="rect">
+            <a:avLst/>
+          </a:prstGeom>
+          <a:solidFill>
+            <a:schemeClr val="accent1"/>
+          </a:solidFill>
+          <a:ln>
+            <a:noFill/>
+          </a:ln>
+        </p:spPr>
+        <p:style>
+          <a:lnRef idx="2">
+            <a:schemeClr val="accent1">
+              <a:shade val="50000"/>
+            </a:schemeClr>
+          </a:lnRef>
+          <a:fillRef idx="1">
+            <a:schemeClr val="accent1"/>
+          </a:fillRef>
+          <a:effectRef idx="0">
+            <a:schemeClr val="accent1"/>
+          </a:effectRef>
+          <a:fontRef idx="minor">
+            <a:schemeClr val="lt1"/>
+          </a:fontRef>
+        </p:style>
+      </p:sp>
+      <p:sp>
+        <p:nvSpPr>
+          <p:cNvPr id="7" name="Date Placeholder 6"/>
           <p:cNvSpPr>
             <a:spLocks noGrp="1"/>
           </p:cNvSpPr>
@@ -7787,7 +8245,7 @@
             <a:fld id="{1BA50D42-C9CD-4801-B293-61D1F53EC57E}" type="datetimeFigureOut">
               <a:rPr lang="de-DE" smtClean="0"/>
               <a:pPr/>
-              <a:t>18.05.2016</a:t>
+              <a:t>22.05.2016</a:t>
             </a:fld>
             <a:endParaRPr lang="de-DE"/>
           </a:p>
@@ -7795,7 +8253,7 @@
       </p:sp>
       <p:sp>
         <p:nvSpPr>
-          <p:cNvPr id="3" name="Fußzeilenplatzhalter 2"/>
+          <p:cNvPr id="8" name="Footer Placeholder 7"/>
           <p:cNvSpPr>
             <a:spLocks noGrp="1"/>
           </p:cNvSpPr>
@@ -7806,7 +8264,15 @@
         <p:spPr/>
         <p:txBody>
           <a:bodyPr/>
-          <a:lstStyle/>
+          <a:lstStyle>
+            <a:lvl1pPr>
+              <a:defRPr>
+                <a:solidFill>
+                  <a:srgbClr val="FFFFFF"/>
+                </a:solidFill>
+              </a:defRPr>
+            </a:lvl1pPr>
+          </a:lstStyle>
           <a:p>
             <a:endParaRPr lang="de-DE"/>
           </a:p>
@@ -7814,7 +8280,7 @@
       </p:sp>
       <p:sp>
         <p:nvSpPr>
-          <p:cNvPr id="4" name="Foliennummernplatzhalter 3"/>
+          <p:cNvPr id="9" name="Slide Number Placeholder 8"/>
           <p:cNvSpPr>
             <a:spLocks noGrp="1"/>
           </p:cNvSpPr>
@@ -7837,6 +8303,11 @@
         </p:txBody>
       </p:sp>
     </p:spTree>
+    <p:extLst>
+      <p:ext uri="{BB962C8B-B14F-4D97-AF65-F5344CB8AC3E}">
+        <p14:creationId xmlns:p14="http://schemas.microsoft.com/office/powerpoint/2010/main" val="3903905052"/>
+      </p:ext>
+    </p:extLst>
   </p:cSld>
   <p:clrMapOvr>
     <a:masterClrMapping/>
@@ -7845,7 +8316,7 @@
 </file>
 
 <file path=ppt/slideLayouts/slideLayout8.xml><?xml version="1.0" encoding="utf-8"?>
-<p:sldLayout xmlns:a="http://schemas.openxmlformats.org/drawingml/2006/main" xmlns:r="http://schemas.openxmlformats.org/officeDocument/2006/relationships" xmlns:p="http://schemas.openxmlformats.org/presentationml/2006/main" type="objTx" preserve="1">
+<p:sldLayout xmlns:a="http://schemas.openxmlformats.org/drawingml/2006/main" xmlns:r="http://schemas.openxmlformats.org/officeDocument/2006/relationships" xmlns:p="http://schemas.openxmlformats.org/presentationml/2006/main" showMasterSp="0" type="objTx" preserve="1">
   <p:cSld name="Inhalt mit Überschrift">
     <p:spTree>
       <p:nvGrpSpPr>
@@ -7863,7 +8334,83 @@
       </p:grpSpPr>
       <p:sp>
         <p:nvSpPr>
-          <p:cNvPr id="2" name="Titel 1"/>
+          <p:cNvPr id="8" name="Rectangle 7"/>
+          <p:cNvSpPr/>
+          <p:nvPr/>
+        </p:nvSpPr>
+        <p:spPr>
+          <a:xfrm>
+            <a:off x="13" y="0"/>
+            <a:ext cx="3038093" cy="6858000"/>
+          </a:xfrm>
+          <a:prstGeom prst="rect">
+            <a:avLst/>
+          </a:prstGeom>
+          <a:solidFill>
+            <a:schemeClr val="accent2"/>
+          </a:solidFill>
+          <a:ln>
+            <a:noFill/>
+          </a:ln>
+        </p:spPr>
+        <p:style>
+          <a:lnRef idx="2">
+            <a:schemeClr val="accent1">
+              <a:shade val="50000"/>
+            </a:schemeClr>
+          </a:lnRef>
+          <a:fillRef idx="1">
+            <a:schemeClr val="accent1"/>
+          </a:fillRef>
+          <a:effectRef idx="0">
+            <a:schemeClr val="accent1"/>
+          </a:effectRef>
+          <a:fontRef idx="minor">
+            <a:schemeClr val="lt1"/>
+          </a:fontRef>
+        </p:style>
+      </p:sp>
+      <p:sp>
+        <p:nvSpPr>
+          <p:cNvPr id="9" name="Rectangle 8"/>
+          <p:cNvSpPr/>
+          <p:nvPr/>
+        </p:nvSpPr>
+        <p:spPr>
+          <a:xfrm>
+            <a:off x="3030053" y="0"/>
+            <a:ext cx="48006" cy="6858000"/>
+          </a:xfrm>
+          <a:prstGeom prst="rect">
+            <a:avLst/>
+          </a:prstGeom>
+          <a:solidFill>
+            <a:schemeClr val="accent1"/>
+          </a:solidFill>
+          <a:ln>
+            <a:noFill/>
+          </a:ln>
+        </p:spPr>
+        <p:style>
+          <a:lnRef idx="2">
+            <a:schemeClr val="accent1">
+              <a:shade val="50000"/>
+            </a:schemeClr>
+          </a:lnRef>
+          <a:fillRef idx="1">
+            <a:schemeClr val="accent1"/>
+          </a:fillRef>
+          <a:effectRef idx="0">
+            <a:schemeClr val="accent1"/>
+          </a:effectRef>
+          <a:fontRef idx="minor">
+            <a:schemeClr val="lt1"/>
+          </a:fontRef>
+        </p:style>
+      </p:sp>
+      <p:sp>
+        <p:nvSpPr>
+          <p:cNvPr id="2" name="Title 1"/>
           <p:cNvSpPr>
             <a:spLocks noGrp="1"/>
           </p:cNvSpPr>
@@ -7873,15 +8420,21 @@
         </p:nvSpPr>
         <p:spPr>
           <a:xfrm>
-            <a:off x="457200" y="273050"/>
-            <a:ext cx="3008313" cy="1162050"/>
+            <a:off x="342900" y="594359"/>
+            <a:ext cx="2400300" cy="2286000"/>
           </a:xfrm>
         </p:spPr>
         <p:txBody>
-          <a:bodyPr anchor="b"/>
+          <a:bodyPr anchor="b">
+            <a:normAutofit/>
+          </a:bodyPr>
           <a:lstStyle>
-            <a:lvl1pPr algn="l">
-              <a:defRPr sz="2000" b="1"/>
+            <a:lvl1pPr>
+              <a:defRPr sz="3600" b="0">
+                <a:solidFill>
+                  <a:srgbClr val="FFFFFF"/>
+                </a:solidFill>
+              </a:defRPr>
             </a:lvl1pPr>
           </a:lstStyle>
           <a:p>
@@ -7889,13 +8442,13 @@
               <a:rPr lang="de-DE" smtClean="0"/>
               <a:t>Titelmasterformat durch Klicken bearbeiten</a:t>
             </a:r>
-            <a:endParaRPr lang="de-DE"/>
+            <a:endParaRPr lang="en-US" dirty="0"/>
           </a:p>
         </p:txBody>
       </p:sp>
       <p:sp>
         <p:nvSpPr>
-          <p:cNvPr id="3" name="Inhaltsplatzhalter 2"/>
+          <p:cNvPr id="3" name="Content Placeholder 2"/>
           <p:cNvSpPr>
             <a:spLocks noGrp="1"/>
           </p:cNvSpPr>
@@ -7905,46 +8458,18 @@
         </p:nvSpPr>
         <p:spPr>
           <a:xfrm>
-            <a:off x="3575050" y="273050"/>
-            <a:ext cx="5111750" cy="5853113"/>
+            <a:off x="3600450" y="731520"/>
+            <a:ext cx="4869180" cy="5257800"/>
           </a:xfrm>
         </p:spPr>
         <p:txBody>
           <a:bodyPr/>
-          <a:lstStyle>
-            <a:lvl1pPr>
-              <a:defRPr sz="3200"/>
-            </a:lvl1pPr>
-            <a:lvl2pPr>
-              <a:defRPr sz="2800"/>
-            </a:lvl2pPr>
-            <a:lvl3pPr>
-              <a:defRPr sz="2400"/>
-            </a:lvl3pPr>
-            <a:lvl4pPr>
-              <a:defRPr sz="2000"/>
-            </a:lvl4pPr>
-            <a:lvl5pPr>
-              <a:defRPr sz="2000"/>
-            </a:lvl5pPr>
-            <a:lvl6pPr>
-              <a:defRPr sz="2000"/>
-            </a:lvl6pPr>
-            <a:lvl7pPr>
-              <a:defRPr sz="2000"/>
-            </a:lvl7pPr>
-            <a:lvl8pPr>
-              <a:defRPr sz="2000"/>
-            </a:lvl8pPr>
-            <a:lvl9pPr>
-              <a:defRPr sz="2000"/>
-            </a:lvl9pPr>
-          </a:lstStyle>
+          <a:lstStyle/>
           <a:p>
             <a:pPr lvl="0"/>
             <a:r>
               <a:rPr lang="de-DE" smtClean="0"/>
-              <a:t>Textmasterformate durch Klicken bearbeiten</a:t>
+              <a:t>Formatvorlagen des Textmasters bearbeiten</a:t>
             </a:r>
           </a:p>
           <a:p>
@@ -7974,13 +8499,13 @@
               <a:rPr lang="de-DE" smtClean="0"/>
               <a:t>Fünfte Ebene</a:t>
             </a:r>
-            <a:endParaRPr lang="de-DE"/>
+            <a:endParaRPr lang="en-US" dirty="0"/>
           </a:p>
         </p:txBody>
       </p:sp>
       <p:sp>
         <p:nvSpPr>
-          <p:cNvPr id="4" name="Textplatzhalter 3"/>
+          <p:cNvPr id="4" name="Text Placeholder 3"/>
           <p:cNvSpPr>
             <a:spLocks noGrp="1"/>
           </p:cNvSpPr>
@@ -7990,16 +8515,22 @@
         </p:nvSpPr>
         <p:spPr>
           <a:xfrm>
-            <a:off x="457200" y="1435100"/>
-            <a:ext cx="3008313" cy="4691063"/>
+            <a:off x="342900" y="2926080"/>
+            <a:ext cx="2400300" cy="3379124"/>
           </a:xfrm>
         </p:spPr>
         <p:txBody>
-          <a:bodyPr/>
+          <a:bodyPr lIns="91440" rIns="91440">
+            <a:normAutofit/>
+          </a:bodyPr>
           <a:lstStyle>
             <a:lvl1pPr marL="0" indent="0">
               <a:buNone/>
-              <a:defRPr sz="1400"/>
+              <a:defRPr sz="1500">
+                <a:solidFill>
+                  <a:srgbClr val="FFFFFF"/>
+                </a:solidFill>
+              </a:defRPr>
             </a:lvl1pPr>
             <a:lvl2pPr marL="457200" indent="0">
               <a:buNone/>
@@ -8038,14 +8569,14 @@
             <a:pPr lvl="0"/>
             <a:r>
               <a:rPr lang="de-DE" smtClean="0"/>
-              <a:t>Textmasterformate durch Klicken bearbeiten</a:t>
+              <a:t>Formatvorlagen des Textmasters bearbeiten</a:t>
             </a:r>
           </a:p>
         </p:txBody>
       </p:sp>
       <p:sp>
         <p:nvSpPr>
-          <p:cNvPr id="5" name="Datumsplatzhalter 4"/>
+          <p:cNvPr id="5" name="Date Placeholder 4"/>
           <p:cNvSpPr>
             <a:spLocks noGrp="1"/>
           </p:cNvSpPr>
@@ -8053,15 +8584,24 @@
             <p:ph type="dt" sz="half" idx="10"/>
           </p:nvPr>
         </p:nvSpPr>
-        <p:spPr/>
+        <p:spPr>
+          <a:xfrm>
+            <a:off x="349134" y="6459786"/>
+            <a:ext cx="1963883" cy="365125"/>
+          </a:xfrm>
+        </p:spPr>
         <p:txBody>
           <a:bodyPr/>
-          <a:lstStyle/>
+          <a:lstStyle>
+            <a:lvl1pPr algn="l">
+              <a:defRPr/>
+            </a:lvl1pPr>
+          </a:lstStyle>
           <a:p>
             <a:fld id="{1BA50D42-C9CD-4801-B293-61D1F53EC57E}" type="datetimeFigureOut">
               <a:rPr lang="de-DE" smtClean="0"/>
               <a:pPr/>
-              <a:t>18.05.2016</a:t>
+              <a:t>22.05.2016</a:t>
             </a:fld>
             <a:endParaRPr lang="de-DE"/>
           </a:p>
@@ -8069,7 +8609,7 @@
       </p:sp>
       <p:sp>
         <p:nvSpPr>
-          <p:cNvPr id="6" name="Fußzeilenplatzhalter 5"/>
+          <p:cNvPr id="6" name="Footer Placeholder 5"/>
           <p:cNvSpPr>
             <a:spLocks noGrp="1"/>
           </p:cNvSpPr>
@@ -8077,10 +8617,23 @@
             <p:ph type="ftr" sz="quarter" idx="11"/>
           </p:nvPr>
         </p:nvSpPr>
-        <p:spPr/>
+        <p:spPr>
+          <a:xfrm>
+            <a:off x="3600450" y="6459786"/>
+            <a:ext cx="3486150" cy="365125"/>
+          </a:xfrm>
+        </p:spPr>
         <p:txBody>
           <a:bodyPr/>
-          <a:lstStyle/>
+          <a:lstStyle>
+            <a:lvl1pPr algn="l">
+              <a:defRPr>
+                <a:solidFill>
+                  <a:schemeClr val="tx2"/>
+                </a:solidFill>
+              </a:defRPr>
+            </a:lvl1pPr>
+          </a:lstStyle>
           <a:p>
             <a:endParaRPr lang="de-DE"/>
           </a:p>
@@ -8088,7 +8641,7 @@
       </p:sp>
       <p:sp>
         <p:nvSpPr>
-          <p:cNvPr id="7" name="Foliennummernplatzhalter 6"/>
+          <p:cNvPr id="7" name="Slide Number Placeholder 6"/>
           <p:cNvSpPr>
             <a:spLocks noGrp="1"/>
           </p:cNvSpPr>
@@ -8099,7 +8652,15 @@
         <p:spPr/>
         <p:txBody>
           <a:bodyPr/>
-          <a:lstStyle/>
+          <a:lstStyle>
+            <a:lvl1pPr>
+              <a:defRPr>
+                <a:solidFill>
+                  <a:schemeClr val="tx2"/>
+                </a:solidFill>
+              </a:defRPr>
+            </a:lvl1pPr>
+          </a:lstStyle>
           <a:p>
             <a:fld id="{6C6AE60A-B69C-4790-82F7-3882EDF23186}" type="slidenum">
               <a:rPr lang="de-DE" smtClean="0"/>
@@ -8111,6 +8672,11 @@
         </p:txBody>
       </p:sp>
     </p:spTree>
+    <p:extLst>
+      <p:ext uri="{BB962C8B-B14F-4D97-AF65-F5344CB8AC3E}">
+        <p14:creationId xmlns:p14="http://schemas.microsoft.com/office/powerpoint/2010/main" val="477510668"/>
+      </p:ext>
+    </p:extLst>
   </p:cSld>
   <p:clrMapOvr>
     <a:masterClrMapping/>
@@ -8119,7 +8685,7 @@
 </file>
 
 <file path=ppt/slideLayouts/slideLayout9.xml><?xml version="1.0" encoding="utf-8"?>
-<p:sldLayout xmlns:a="http://schemas.openxmlformats.org/drawingml/2006/main" xmlns:r="http://schemas.openxmlformats.org/officeDocument/2006/relationships" xmlns:p="http://schemas.openxmlformats.org/presentationml/2006/main" type="picTx" preserve="1">
+<p:sldLayout xmlns:a="http://schemas.openxmlformats.org/drawingml/2006/main" xmlns:r="http://schemas.openxmlformats.org/officeDocument/2006/relationships" xmlns:p="http://schemas.openxmlformats.org/presentationml/2006/main" showMasterSp="0" type="picTx" preserve="1">
   <p:cSld name="Bild mit Überschrift">
     <p:spTree>
       <p:nvGrpSpPr>
@@ -8137,7 +8703,83 @@
       </p:grpSpPr>
       <p:sp>
         <p:nvSpPr>
-          <p:cNvPr id="2" name="Titel 1"/>
+          <p:cNvPr id="8" name="Rectangle 7"/>
+          <p:cNvSpPr/>
+          <p:nvPr/>
+        </p:nvSpPr>
+        <p:spPr>
+          <a:xfrm>
+            <a:off x="0" y="4953000"/>
+            <a:ext cx="9141619" cy="1905000"/>
+          </a:xfrm>
+          <a:prstGeom prst="rect">
+            <a:avLst/>
+          </a:prstGeom>
+          <a:solidFill>
+            <a:schemeClr val="accent2"/>
+          </a:solidFill>
+          <a:ln>
+            <a:noFill/>
+          </a:ln>
+        </p:spPr>
+        <p:style>
+          <a:lnRef idx="2">
+            <a:schemeClr val="accent1">
+              <a:shade val="50000"/>
+            </a:schemeClr>
+          </a:lnRef>
+          <a:fillRef idx="1">
+            <a:schemeClr val="accent1"/>
+          </a:fillRef>
+          <a:effectRef idx="0">
+            <a:schemeClr val="accent1"/>
+          </a:effectRef>
+          <a:fontRef idx="minor">
+            <a:schemeClr val="lt1"/>
+          </a:fontRef>
+        </p:style>
+      </p:sp>
+      <p:sp>
+        <p:nvSpPr>
+          <p:cNvPr id="9" name="Rectangle 8"/>
+          <p:cNvSpPr/>
+          <p:nvPr/>
+        </p:nvSpPr>
+        <p:spPr>
+          <a:xfrm>
+            <a:off x="12" y="4915076"/>
+            <a:ext cx="9141619" cy="64008"/>
+          </a:xfrm>
+          <a:prstGeom prst="rect">
+            <a:avLst/>
+          </a:prstGeom>
+          <a:solidFill>
+            <a:schemeClr val="accent1"/>
+          </a:solidFill>
+          <a:ln>
+            <a:noFill/>
+          </a:ln>
+        </p:spPr>
+        <p:style>
+          <a:lnRef idx="2">
+            <a:schemeClr val="accent1">
+              <a:shade val="50000"/>
+            </a:schemeClr>
+          </a:lnRef>
+          <a:fillRef idx="1">
+            <a:schemeClr val="accent1"/>
+          </a:fillRef>
+          <a:effectRef idx="0">
+            <a:schemeClr val="accent1"/>
+          </a:effectRef>
+          <a:fontRef idx="minor">
+            <a:schemeClr val="lt1"/>
+          </a:fontRef>
+        </p:style>
+      </p:sp>
+      <p:sp>
+        <p:nvSpPr>
+          <p:cNvPr id="2" name="Title 1"/>
           <p:cNvSpPr>
             <a:spLocks noGrp="1"/>
           </p:cNvSpPr>
@@ -8147,15 +8789,21 @@
         </p:nvSpPr>
         <p:spPr>
           <a:xfrm>
-            <a:off x="1792288" y="4800600"/>
-            <a:ext cx="5486400" cy="566738"/>
+            <a:off x="822960" y="5074920"/>
+            <a:ext cx="7589520" cy="822960"/>
           </a:xfrm>
         </p:spPr>
         <p:txBody>
-          <a:bodyPr anchor="b"/>
+          <a:bodyPr tIns="0" bIns="0" anchor="b">
+            <a:noAutofit/>
+          </a:bodyPr>
           <a:lstStyle>
-            <a:lvl1pPr algn="l">
-              <a:defRPr sz="2000" b="1"/>
+            <a:lvl1pPr>
+              <a:defRPr sz="3600" b="0">
+                <a:solidFill>
+                  <a:srgbClr val="FFFFFF"/>
+                </a:solidFill>
+              </a:defRPr>
             </a:lvl1pPr>
           </a:lstStyle>
           <a:p>
@@ -8163,15 +8811,15 @@
               <a:rPr lang="de-DE" smtClean="0"/>
               <a:t>Titelmasterformat durch Klicken bearbeiten</a:t>
             </a:r>
-            <a:endParaRPr lang="de-DE"/>
+            <a:endParaRPr lang="en-US" dirty="0"/>
           </a:p>
         </p:txBody>
       </p:sp>
       <p:sp>
         <p:nvSpPr>
-          <p:cNvPr id="3" name="Bildplatzhalter 2"/>
+          <p:cNvPr id="3" name="Picture Placeholder 2"/>
           <p:cNvSpPr>
-            <a:spLocks noGrp="1"/>
+            <a:spLocks noGrp="1" noChangeAspect="1"/>
           </p:cNvSpPr>
           <p:nvPr>
             <p:ph type="pic" idx="1"/>
@@ -8179,12 +8827,17 @@
         </p:nvSpPr>
         <p:spPr>
           <a:xfrm>
-            <a:off x="1792288" y="612775"/>
-            <a:ext cx="5486400" cy="4114800"/>
+            <a:off x="12" y="0"/>
+            <a:ext cx="9143989" cy="4915076"/>
           </a:xfrm>
+          <a:solidFill>
+            <a:schemeClr val="bg2">
+              <a:lumMod val="90000"/>
+            </a:schemeClr>
+          </a:solidFill>
         </p:spPr>
         <p:txBody>
-          <a:bodyPr/>
+          <a:bodyPr lIns="457200" tIns="457200" anchor="t"/>
           <a:lstStyle>
             <a:lvl1pPr marL="0" indent="0">
               <a:buNone/>
@@ -8224,13 +8877,17 @@
             </a:lvl9pPr>
           </a:lstStyle>
           <a:p>
-            <a:endParaRPr lang="de-DE"/>
+            <a:r>
+              <a:rPr lang="de-DE" smtClean="0"/>
+              <a:t>Bild durch Klicken auf Symbol hinzufügen</a:t>
+            </a:r>
+            <a:endParaRPr lang="en-US" dirty="0"/>
           </a:p>
         </p:txBody>
       </p:sp>
       <p:sp>
         <p:nvSpPr>
-          <p:cNvPr id="4" name="Textplatzhalter 3"/>
+          <p:cNvPr id="4" name="Text Placeholder 3"/>
           <p:cNvSpPr>
             <a:spLocks noGrp="1"/>
           </p:cNvSpPr>
@@ -8240,16 +8897,28 @@
         </p:nvSpPr>
         <p:spPr>
           <a:xfrm>
-            <a:off x="1792288" y="5367338"/>
-            <a:ext cx="5486400" cy="804862"/>
+            <a:off x="822960" y="5907024"/>
+            <a:ext cx="7589520" cy="594360"/>
           </a:xfrm>
         </p:spPr>
         <p:txBody>
-          <a:bodyPr/>
+          <a:bodyPr lIns="91440" tIns="0" rIns="91440" bIns="0">
+            <a:normAutofit/>
+          </a:bodyPr>
           <a:lstStyle>
             <a:lvl1pPr marL="0" indent="0">
+              <a:spcBef>
+                <a:spcPts val="0"/>
+              </a:spcBef>
+              <a:spcAft>
+                <a:spcPts val="600"/>
+              </a:spcAft>
               <a:buNone/>
-              <a:defRPr sz="1400"/>
+              <a:defRPr sz="1500">
+                <a:solidFill>
+                  <a:srgbClr val="FFFFFF"/>
+                </a:solidFill>
+              </a:defRPr>
             </a:lvl1pPr>
             <a:lvl2pPr marL="457200" indent="0">
               <a:buNone/>
@@ -8288,14 +8957,14 @@
             <a:pPr lvl="0"/>
             <a:r>
               <a:rPr lang="de-DE" smtClean="0"/>
-              <a:t>Textmasterformate durch Klicken bearbeiten</a:t>
+              <a:t>Formatvorlagen des Textmasters bearbeiten</a:t>
             </a:r>
           </a:p>
         </p:txBody>
       </p:sp>
       <p:sp>
         <p:nvSpPr>
-          <p:cNvPr id="5" name="Datumsplatzhalter 4"/>
+          <p:cNvPr id="5" name="Date Placeholder 4"/>
           <p:cNvSpPr>
             <a:spLocks noGrp="1"/>
           </p:cNvSpPr>
@@ -8311,7 +8980,7 @@
             <a:fld id="{1BA50D42-C9CD-4801-B293-61D1F53EC57E}" type="datetimeFigureOut">
               <a:rPr lang="de-DE" smtClean="0"/>
               <a:pPr/>
-              <a:t>18.05.2016</a:t>
+              <a:t>22.05.2016</a:t>
             </a:fld>
             <a:endParaRPr lang="de-DE"/>
           </a:p>
@@ -8319,7 +8988,7 @@
       </p:sp>
       <p:sp>
         <p:nvSpPr>
-          <p:cNvPr id="6" name="Fußzeilenplatzhalter 5"/>
+          <p:cNvPr id="6" name="Footer Placeholder 5"/>
           <p:cNvSpPr>
             <a:spLocks noGrp="1"/>
           </p:cNvSpPr>
@@ -8338,7 +9007,7 @@
       </p:sp>
       <p:sp>
         <p:nvSpPr>
-          <p:cNvPr id="7" name="Foliennummernplatzhalter 6"/>
+          <p:cNvPr id="7" name="Slide Number Placeholder 6"/>
           <p:cNvSpPr>
             <a:spLocks noGrp="1"/>
           </p:cNvSpPr>
@@ -8361,6 +9030,11 @@
         </p:txBody>
       </p:sp>
     </p:spTree>
+    <p:extLst>
+      <p:ext uri="{BB962C8B-B14F-4D97-AF65-F5344CB8AC3E}">
+        <p14:creationId xmlns:p14="http://schemas.microsoft.com/office/powerpoint/2010/main" val="3721849584"/>
+      </p:ext>
+    </p:extLst>
   </p:cSld>
   <p:clrMapOvr>
     <a:masterClrMapping/>
@@ -8392,7 +9066,83 @@
       </p:grpSpPr>
       <p:sp>
         <p:nvSpPr>
-          <p:cNvPr id="2" name="Titelplatzhalter 1"/>
+          <p:cNvPr id="7" name="Rectangle 6"/>
+          <p:cNvSpPr/>
+          <p:nvPr/>
+        </p:nvSpPr>
+        <p:spPr>
+          <a:xfrm>
+            <a:off x="0" y="6400800"/>
+            <a:ext cx="9144001" cy="457200"/>
+          </a:xfrm>
+          <a:prstGeom prst="rect">
+            <a:avLst/>
+          </a:prstGeom>
+          <a:solidFill>
+            <a:schemeClr val="accent2"/>
+          </a:solidFill>
+          <a:ln>
+            <a:noFill/>
+          </a:ln>
+        </p:spPr>
+        <p:style>
+          <a:lnRef idx="2">
+            <a:schemeClr val="accent1">
+              <a:shade val="50000"/>
+            </a:schemeClr>
+          </a:lnRef>
+          <a:fillRef idx="1">
+            <a:schemeClr val="accent1"/>
+          </a:fillRef>
+          <a:effectRef idx="0">
+            <a:schemeClr val="accent1"/>
+          </a:effectRef>
+          <a:fontRef idx="minor">
+            <a:schemeClr val="lt1"/>
+          </a:fontRef>
+        </p:style>
+      </p:sp>
+      <p:sp>
+        <p:nvSpPr>
+          <p:cNvPr id="9" name="Rectangle 8"/>
+          <p:cNvSpPr/>
+          <p:nvPr/>
+        </p:nvSpPr>
+        <p:spPr>
+          <a:xfrm>
+            <a:off x="0" y="6334316"/>
+            <a:ext cx="9144001" cy="66484"/>
+          </a:xfrm>
+          <a:prstGeom prst="rect">
+            <a:avLst/>
+          </a:prstGeom>
+          <a:solidFill>
+            <a:schemeClr val="accent1"/>
+          </a:solidFill>
+          <a:ln>
+            <a:noFill/>
+          </a:ln>
+        </p:spPr>
+        <p:style>
+          <a:lnRef idx="2">
+            <a:schemeClr val="accent1">
+              <a:shade val="50000"/>
+            </a:schemeClr>
+          </a:lnRef>
+          <a:fillRef idx="1">
+            <a:schemeClr val="accent1"/>
+          </a:fillRef>
+          <a:effectRef idx="0">
+            <a:schemeClr val="accent1"/>
+          </a:effectRef>
+          <a:fontRef idx="minor">
+            <a:schemeClr val="lt1"/>
+          </a:fontRef>
+        </p:style>
+      </p:sp>
+      <p:sp>
+        <p:nvSpPr>
+          <p:cNvPr id="2" name="Title Placeholder 1"/>
           <p:cNvSpPr>
             <a:spLocks noGrp="1"/>
           </p:cNvSpPr>
@@ -8402,15 +9152,15 @@
         </p:nvSpPr>
         <p:spPr>
           <a:xfrm>
-            <a:off x="457200" y="274638"/>
-            <a:ext cx="8229600" cy="1143000"/>
+            <a:off x="822960" y="286604"/>
+            <a:ext cx="7543800" cy="1450757"/>
           </a:xfrm>
           <a:prstGeom prst="rect">
             <a:avLst/>
           </a:prstGeom>
         </p:spPr>
         <p:txBody>
-          <a:bodyPr vert="horz" lIns="91440" tIns="45720" rIns="91440" bIns="45720" rtlCol="0" anchor="ctr">
+          <a:bodyPr vert="horz" lIns="91440" tIns="45720" rIns="91440" bIns="45720" rtlCol="0" anchor="b">
             <a:normAutofit/>
           </a:bodyPr>
           <a:lstStyle/>
@@ -8419,13 +9169,13 @@
               <a:rPr lang="de-DE" smtClean="0"/>
               <a:t>Titelmasterformat durch Klicken bearbeiten</a:t>
             </a:r>
-            <a:endParaRPr lang="de-DE"/>
+            <a:endParaRPr lang="en-US" dirty="0"/>
           </a:p>
         </p:txBody>
       </p:sp>
       <p:sp>
         <p:nvSpPr>
-          <p:cNvPr id="3" name="Textplatzhalter 2"/>
+          <p:cNvPr id="3" name="Text Placeholder 2"/>
           <p:cNvSpPr>
             <a:spLocks noGrp="1"/>
           </p:cNvSpPr>
@@ -8435,15 +9185,15 @@
         </p:nvSpPr>
         <p:spPr>
           <a:xfrm>
-            <a:off x="457200" y="1600200"/>
-            <a:ext cx="8229600" cy="4525963"/>
+            <a:off x="822959" y="1845734"/>
+            <a:ext cx="7543801" cy="4023360"/>
           </a:xfrm>
           <a:prstGeom prst="rect">
             <a:avLst/>
           </a:prstGeom>
         </p:spPr>
         <p:txBody>
-          <a:bodyPr vert="horz" lIns="91440" tIns="45720" rIns="91440" bIns="45720" rtlCol="0">
+          <a:bodyPr vert="horz" lIns="0" tIns="45720" rIns="0" bIns="45720" rtlCol="0">
             <a:normAutofit/>
           </a:bodyPr>
           <a:lstStyle/>
@@ -8451,7 +9201,7 @@
             <a:pPr lvl="0"/>
             <a:r>
               <a:rPr lang="de-DE" smtClean="0"/>
-              <a:t>Textmasterformate durch Klicken bearbeiten</a:t>
+              <a:t>Formatvorlagen des Textmasters bearbeiten</a:t>
             </a:r>
           </a:p>
           <a:p>
@@ -8481,13 +9231,13 @@
               <a:rPr lang="de-DE" smtClean="0"/>
               <a:t>Fünfte Ebene</a:t>
             </a:r>
-            <a:endParaRPr lang="de-DE"/>
+            <a:endParaRPr lang="en-US" dirty="0"/>
           </a:p>
         </p:txBody>
       </p:sp>
       <p:sp>
         <p:nvSpPr>
-          <p:cNvPr id="4" name="Datumsplatzhalter 3"/>
+          <p:cNvPr id="4" name="Date Placeholder 3"/>
           <p:cNvSpPr>
             <a:spLocks noGrp="1"/>
           </p:cNvSpPr>
@@ -8497,8 +9247,8 @@
         </p:nvSpPr>
         <p:spPr>
           <a:xfrm>
-            <a:off x="457200" y="6356350"/>
-            <a:ext cx="2133600" cy="365125"/>
+            <a:off x="822961" y="6459786"/>
+            <a:ext cx="1854203" cy="365125"/>
           </a:xfrm>
           <a:prstGeom prst="rect">
             <a:avLst/>
@@ -8508,11 +9258,9 @@
           <a:bodyPr vert="horz" lIns="91440" tIns="45720" rIns="91440" bIns="45720" rtlCol="0" anchor="ctr"/>
           <a:lstStyle>
             <a:lvl1pPr algn="l">
-              <a:defRPr sz="1200">
+              <a:defRPr sz="900">
                 <a:solidFill>
-                  <a:schemeClr val="tx1">
-                    <a:tint val="75000"/>
-                  </a:schemeClr>
+                  <a:srgbClr val="FFFFFF"/>
                 </a:solidFill>
               </a:defRPr>
             </a:lvl1pPr>
@@ -8521,7 +9269,7 @@
             <a:fld id="{1BA50D42-C9CD-4801-B293-61D1F53EC57E}" type="datetimeFigureOut">
               <a:rPr lang="de-DE" smtClean="0"/>
               <a:pPr/>
-              <a:t>18.05.2016</a:t>
+              <a:t>22.05.2016</a:t>
             </a:fld>
             <a:endParaRPr lang="de-DE"/>
           </a:p>
@@ -8529,7 +9277,7 @@
       </p:sp>
       <p:sp>
         <p:nvSpPr>
-          <p:cNvPr id="5" name="Fußzeilenplatzhalter 4"/>
+          <p:cNvPr id="5" name="Footer Placeholder 4"/>
           <p:cNvSpPr>
             <a:spLocks noGrp="1"/>
           </p:cNvSpPr>
@@ -8539,8 +9287,8 @@
         </p:nvSpPr>
         <p:spPr>
           <a:xfrm>
-            <a:off x="3124200" y="6356350"/>
-            <a:ext cx="2895600" cy="365125"/>
+            <a:off x="2764639" y="6459786"/>
+            <a:ext cx="3617103" cy="365125"/>
           </a:xfrm>
           <a:prstGeom prst="rect">
             <a:avLst/>
@@ -8550,11 +9298,9 @@
           <a:bodyPr vert="horz" lIns="91440" tIns="45720" rIns="91440" bIns="45720" rtlCol="0" anchor="ctr"/>
           <a:lstStyle>
             <a:lvl1pPr algn="ctr">
-              <a:defRPr sz="1200">
+              <a:defRPr sz="900" cap="all" baseline="0">
                 <a:solidFill>
-                  <a:schemeClr val="tx1">
-                    <a:tint val="75000"/>
-                  </a:schemeClr>
+                  <a:srgbClr val="FFFFFF"/>
                 </a:solidFill>
               </a:defRPr>
             </a:lvl1pPr>
@@ -8566,7 +9312,7 @@
       </p:sp>
       <p:sp>
         <p:nvSpPr>
-          <p:cNvPr id="6" name="Foliennummernplatzhalter 5"/>
+          <p:cNvPr id="6" name="Slide Number Placeholder 5"/>
           <p:cNvSpPr>
             <a:spLocks noGrp="1"/>
           </p:cNvSpPr>
@@ -8576,8 +9322,8 @@
         </p:nvSpPr>
         <p:spPr>
           <a:xfrm>
-            <a:off x="6553200" y="6356350"/>
-            <a:ext cx="2133600" cy="365125"/>
+            <a:off x="7425344" y="6459786"/>
+            <a:ext cx="984019" cy="365125"/>
           </a:xfrm>
           <a:prstGeom prst="rect">
             <a:avLst/>
@@ -8587,11 +9333,9 @@
           <a:bodyPr vert="horz" lIns="91440" tIns="45720" rIns="91440" bIns="45720" rtlCol="0" anchor="ctr"/>
           <a:lstStyle>
             <a:lvl1pPr algn="r">
-              <a:defRPr sz="1200">
+              <a:defRPr sz="1050">
                 <a:solidFill>
-                  <a:schemeClr val="tx1">
-                    <a:tint val="75000"/>
-                  </a:schemeClr>
+                  <a:srgbClr val="FFFFFF"/>
                 </a:solidFill>
               </a:defRPr>
             </a:lvl1pPr>
@@ -8606,32 +9350,81 @@
           </a:p>
         </p:txBody>
       </p:sp>
+      <p:cxnSp>
+        <p:nvCxnSpPr>
+          <p:cNvPr id="10" name="Straight Connector 9"/>
+          <p:cNvCxnSpPr/>
+          <p:nvPr/>
+        </p:nvCxnSpPr>
+        <p:spPr>
+          <a:xfrm>
+            <a:off x="895149" y="1737845"/>
+            <a:ext cx="7475220" cy="0"/>
+          </a:xfrm>
+          <a:prstGeom prst="line">
+            <a:avLst/>
+          </a:prstGeom>
+          <a:ln w="6350">
+            <a:solidFill>
+              <a:schemeClr val="tx1">
+                <a:lumMod val="50000"/>
+                <a:lumOff val="50000"/>
+              </a:schemeClr>
+            </a:solidFill>
+          </a:ln>
+        </p:spPr>
+        <p:style>
+          <a:lnRef idx="1">
+            <a:schemeClr val="accent1"/>
+          </a:lnRef>
+          <a:fillRef idx="0">
+            <a:schemeClr val="accent1"/>
+          </a:fillRef>
+          <a:effectRef idx="0">
+            <a:schemeClr val="accent1"/>
+          </a:effectRef>
+          <a:fontRef idx="minor">
+            <a:schemeClr val="tx1"/>
+          </a:fontRef>
+        </p:style>
+      </p:cxnSp>
     </p:spTree>
+    <p:extLst>
+      <p:ext uri="{BB962C8B-B14F-4D97-AF65-F5344CB8AC3E}">
+        <p14:creationId xmlns:p14="http://schemas.microsoft.com/office/powerpoint/2010/main" val="333461540"/>
+      </p:ext>
+    </p:extLst>
   </p:cSld>
   <p:clrMap bg1="lt1" tx1="dk1" bg2="lt2" tx2="dk2" accent1="accent1" accent2="accent2" accent3="accent3" accent4="accent4" accent5="accent5" accent6="accent6" hlink="hlink" folHlink="folHlink"/>
   <p:sldLayoutIdLst>
-    <p:sldLayoutId id="2147483901" r:id="rId1"/>
-    <p:sldLayoutId id="2147483902" r:id="rId2"/>
-    <p:sldLayoutId id="2147483903" r:id="rId3"/>
-    <p:sldLayoutId id="2147483904" r:id="rId4"/>
-    <p:sldLayoutId id="2147483905" r:id="rId5"/>
-    <p:sldLayoutId id="2147483906" r:id="rId6"/>
-    <p:sldLayoutId id="2147483907" r:id="rId7"/>
-    <p:sldLayoutId id="2147483908" r:id="rId8"/>
-    <p:sldLayoutId id="2147483909" r:id="rId9"/>
-    <p:sldLayoutId id="2147483910" r:id="rId10"/>
-    <p:sldLayoutId id="2147483911" r:id="rId11"/>
+    <p:sldLayoutId id="2147483925" r:id="rId1"/>
+    <p:sldLayoutId id="2147483926" r:id="rId2"/>
+    <p:sldLayoutId id="2147483927" r:id="rId3"/>
+    <p:sldLayoutId id="2147483928" r:id="rId4"/>
+    <p:sldLayoutId id="2147483929" r:id="rId5"/>
+    <p:sldLayoutId id="2147483930" r:id="rId6"/>
+    <p:sldLayoutId id="2147483931" r:id="rId7"/>
+    <p:sldLayoutId id="2147483932" r:id="rId8"/>
+    <p:sldLayoutId id="2147483933" r:id="rId9"/>
+    <p:sldLayoutId id="2147483934" r:id="rId10"/>
+    <p:sldLayoutId id="2147483935" r:id="rId11"/>
   </p:sldLayoutIdLst>
   <p:txStyles>
     <p:titleStyle>
-      <a:lvl1pPr algn="ctr" defTabSz="914400" rtl="0" eaLnBrk="1" latinLnBrk="0" hangingPunct="1">
+      <a:lvl1pPr algn="l" defTabSz="914400" rtl="0" eaLnBrk="1" latinLnBrk="0" hangingPunct="1">
+        <a:lnSpc>
+          <a:spcPct val="85000"/>
+        </a:lnSpc>
         <a:spcBef>
           <a:spcPct val="0"/>
         </a:spcBef>
         <a:buNone/>
-        <a:defRPr sz="4400" kern="1200">
+        <a:defRPr sz="4800" kern="1200" spc="-50" baseline="0">
           <a:solidFill>
-            <a:schemeClr val="tx1"/>
+            <a:schemeClr val="tx1">
+              <a:lumMod val="75000"/>
+              <a:lumOff val="25000"/>
+            </a:schemeClr>
           </a:solidFill>
           <a:latin typeface="+mj-lt"/>
           <a:ea typeface="+mj-ea"/>
@@ -8640,135 +9433,244 @@
       </a:lvl1pPr>
     </p:titleStyle>
     <p:bodyStyle>
-      <a:lvl1pPr marL="342900" indent="-342900" algn="l" defTabSz="914400" rtl="0" eaLnBrk="1" latinLnBrk="0" hangingPunct="1">
+      <a:lvl1pPr marL="91440" indent="-91440" algn="l" defTabSz="914400" rtl="0" eaLnBrk="1" latinLnBrk="0" hangingPunct="1">
+        <a:lnSpc>
+          <a:spcPct val="90000"/>
+        </a:lnSpc>
         <a:spcBef>
-          <a:spcPct val="20000"/>
+          <a:spcPts val="1200"/>
         </a:spcBef>
-        <a:buFont typeface="Arial" pitchFamily="34" charset="0"/>
-        <a:buChar char="•"/>
-        <a:defRPr sz="3200" kern="1200">
+        <a:spcAft>
+          <a:spcPts val="200"/>
+        </a:spcAft>
+        <a:buClr>
+          <a:schemeClr val="accent1"/>
+        </a:buClr>
+        <a:buSzPct val="100000"/>
+        <a:buFont typeface="Calibri" panose="020F0502020204030204" pitchFamily="34" charset="0"/>
+        <a:buChar char=" "/>
+        <a:defRPr sz="2000" kern="1200">
           <a:solidFill>
-            <a:schemeClr val="tx1"/>
+            <a:schemeClr val="tx1">
+              <a:lumMod val="75000"/>
+              <a:lumOff val="25000"/>
+            </a:schemeClr>
           </a:solidFill>
           <a:latin typeface="+mn-lt"/>
           <a:ea typeface="+mn-ea"/>
           <a:cs typeface="+mn-cs"/>
         </a:defRPr>
       </a:lvl1pPr>
-      <a:lvl2pPr marL="742950" indent="-285750" algn="l" defTabSz="914400" rtl="0" eaLnBrk="1" latinLnBrk="0" hangingPunct="1">
+      <a:lvl2pPr marL="384048" indent="-182880" algn="l" defTabSz="914400" rtl="0" eaLnBrk="1" latinLnBrk="0" hangingPunct="1">
+        <a:lnSpc>
+          <a:spcPct val="90000"/>
+        </a:lnSpc>
         <a:spcBef>
-          <a:spcPct val="20000"/>
+          <a:spcPts val="200"/>
         </a:spcBef>
-        <a:buFont typeface="Arial" pitchFamily="34" charset="0"/>
-        <a:buChar char="–"/>
-        <a:defRPr sz="2800" kern="1200">
+        <a:spcAft>
+          <a:spcPts val="400"/>
+        </a:spcAft>
+        <a:buClr>
+          <a:schemeClr val="accent1"/>
+        </a:buClr>
+        <a:buFont typeface="Calibri" pitchFamily="34" charset="0"/>
+        <a:buChar char="◦"/>
+        <a:defRPr sz="1800" kern="1200">
           <a:solidFill>
-            <a:schemeClr val="tx1"/>
+            <a:schemeClr val="tx1">
+              <a:lumMod val="75000"/>
+              <a:lumOff val="25000"/>
+            </a:schemeClr>
           </a:solidFill>
           <a:latin typeface="+mn-lt"/>
           <a:ea typeface="+mn-ea"/>
           <a:cs typeface="+mn-cs"/>
         </a:defRPr>
       </a:lvl2pPr>
-      <a:lvl3pPr marL="1143000" indent="-228600" algn="l" defTabSz="914400" rtl="0" eaLnBrk="1" latinLnBrk="0" hangingPunct="1">
+      <a:lvl3pPr marL="566928" indent="-182880" algn="l" defTabSz="914400" rtl="0" eaLnBrk="1" latinLnBrk="0" hangingPunct="1">
+        <a:lnSpc>
+          <a:spcPct val="90000"/>
+        </a:lnSpc>
         <a:spcBef>
-          <a:spcPct val="20000"/>
+          <a:spcPts val="200"/>
         </a:spcBef>
-        <a:buFont typeface="Arial" pitchFamily="34" charset="0"/>
-        <a:buChar char="•"/>
-        <a:defRPr sz="2400" kern="1200">
+        <a:spcAft>
+          <a:spcPts val="400"/>
+        </a:spcAft>
+        <a:buClr>
+          <a:schemeClr val="accent1"/>
+        </a:buClr>
+        <a:buFont typeface="Calibri" pitchFamily="34" charset="0"/>
+        <a:buChar char="◦"/>
+        <a:defRPr sz="1400" kern="1200">
           <a:solidFill>
-            <a:schemeClr val="tx1"/>
+            <a:schemeClr val="tx1">
+              <a:lumMod val="75000"/>
+              <a:lumOff val="25000"/>
+            </a:schemeClr>
           </a:solidFill>
           <a:latin typeface="+mn-lt"/>
           <a:ea typeface="+mn-ea"/>
           <a:cs typeface="+mn-cs"/>
         </a:defRPr>
       </a:lvl3pPr>
-      <a:lvl4pPr marL="1600200" indent="-228600" algn="l" defTabSz="914400" rtl="0" eaLnBrk="1" latinLnBrk="0" hangingPunct="1">
+      <a:lvl4pPr marL="749808" indent="-182880" algn="l" defTabSz="914400" rtl="0" eaLnBrk="1" latinLnBrk="0" hangingPunct="1">
+        <a:lnSpc>
+          <a:spcPct val="90000"/>
+        </a:lnSpc>
         <a:spcBef>
-          <a:spcPct val="20000"/>
+          <a:spcPts val="200"/>
         </a:spcBef>
-        <a:buFont typeface="Arial" pitchFamily="34" charset="0"/>
-        <a:buChar char="–"/>
-        <a:defRPr sz="2000" kern="1200">
+        <a:spcAft>
+          <a:spcPts val="400"/>
+        </a:spcAft>
+        <a:buClr>
+          <a:schemeClr val="accent1"/>
+        </a:buClr>
+        <a:buFont typeface="Calibri" pitchFamily="34" charset="0"/>
+        <a:buChar char="◦"/>
+        <a:defRPr sz="1400" kern="1200">
           <a:solidFill>
-            <a:schemeClr val="tx1"/>
+            <a:schemeClr val="tx1">
+              <a:lumMod val="75000"/>
+              <a:lumOff val="25000"/>
+            </a:schemeClr>
           </a:solidFill>
           <a:latin typeface="+mn-lt"/>
           <a:ea typeface="+mn-ea"/>
           <a:cs typeface="+mn-cs"/>
         </a:defRPr>
       </a:lvl4pPr>
-      <a:lvl5pPr marL="2057400" indent="-228600" algn="l" defTabSz="914400" rtl="0" eaLnBrk="1" latinLnBrk="0" hangingPunct="1">
+      <a:lvl5pPr marL="932688" indent="-182880" algn="l" defTabSz="914400" rtl="0" eaLnBrk="1" latinLnBrk="0" hangingPunct="1">
+        <a:lnSpc>
+          <a:spcPct val="90000"/>
+        </a:lnSpc>
         <a:spcBef>
-          <a:spcPct val="20000"/>
+          <a:spcPts val="200"/>
         </a:spcBef>
-        <a:buFont typeface="Arial" pitchFamily="34" charset="0"/>
-        <a:buChar char="»"/>
-        <a:defRPr sz="2000" kern="1200">
+        <a:spcAft>
+          <a:spcPts val="400"/>
+        </a:spcAft>
+        <a:buClr>
+          <a:schemeClr val="accent1"/>
+        </a:buClr>
+        <a:buFont typeface="Calibri" pitchFamily="34" charset="0"/>
+        <a:buChar char="◦"/>
+        <a:defRPr sz="1400" kern="1200">
           <a:solidFill>
-            <a:schemeClr val="tx1"/>
+            <a:schemeClr val="tx1">
+              <a:lumMod val="75000"/>
+              <a:lumOff val="25000"/>
+            </a:schemeClr>
           </a:solidFill>
           <a:latin typeface="+mn-lt"/>
           <a:ea typeface="+mn-ea"/>
           <a:cs typeface="+mn-cs"/>
         </a:defRPr>
       </a:lvl5pPr>
-      <a:lvl6pPr marL="2514600" indent="-228600" algn="l" defTabSz="914400" rtl="0" eaLnBrk="1" latinLnBrk="0" hangingPunct="1">
+      <a:lvl6pPr marL="1100000" indent="-228600" algn="l" defTabSz="914400" rtl="0" eaLnBrk="1" latinLnBrk="0" hangingPunct="1">
+        <a:lnSpc>
+          <a:spcPct val="90000"/>
+        </a:lnSpc>
         <a:spcBef>
-          <a:spcPct val="20000"/>
+          <a:spcPts val="200"/>
         </a:spcBef>
-        <a:buFont typeface="Arial" pitchFamily="34" charset="0"/>
-        <a:buChar char="•"/>
-        <a:defRPr sz="2000" kern="1200">
+        <a:spcAft>
+          <a:spcPts val="400"/>
+        </a:spcAft>
+        <a:buClr>
+          <a:schemeClr val="accent1"/>
+        </a:buClr>
+        <a:buFont typeface="Calibri" pitchFamily="34" charset="0"/>
+        <a:buChar char="◦"/>
+        <a:defRPr sz="1400" kern="1200">
           <a:solidFill>
-            <a:schemeClr val="tx1"/>
+            <a:schemeClr val="tx1">
+              <a:lumMod val="75000"/>
+              <a:lumOff val="25000"/>
+            </a:schemeClr>
           </a:solidFill>
           <a:latin typeface="+mn-lt"/>
           <a:ea typeface="+mn-ea"/>
           <a:cs typeface="+mn-cs"/>
         </a:defRPr>
       </a:lvl6pPr>
-      <a:lvl7pPr marL="2971800" indent="-228600" algn="l" defTabSz="914400" rtl="0" eaLnBrk="1" latinLnBrk="0" hangingPunct="1">
+      <a:lvl7pPr marL="1300000" indent="-228600" algn="l" defTabSz="914400" rtl="0" eaLnBrk="1" latinLnBrk="0" hangingPunct="1">
+        <a:lnSpc>
+          <a:spcPct val="90000"/>
+        </a:lnSpc>
         <a:spcBef>
-          <a:spcPct val="20000"/>
+          <a:spcPts val="200"/>
         </a:spcBef>
-        <a:buFont typeface="Arial" pitchFamily="34" charset="0"/>
-        <a:buChar char="•"/>
-        <a:defRPr sz="2000" kern="1200">
+        <a:spcAft>
+          <a:spcPts val="400"/>
+        </a:spcAft>
+        <a:buClr>
+          <a:schemeClr val="accent1"/>
+        </a:buClr>
+        <a:buFont typeface="Calibri" pitchFamily="34" charset="0"/>
+        <a:buChar char="◦"/>
+        <a:defRPr sz="1400" kern="1200">
           <a:solidFill>
-            <a:schemeClr val="tx1"/>
+            <a:schemeClr val="tx1">
+              <a:lumMod val="75000"/>
+              <a:lumOff val="25000"/>
+            </a:schemeClr>
           </a:solidFill>
           <a:latin typeface="+mn-lt"/>
           <a:ea typeface="+mn-ea"/>
           <a:cs typeface="+mn-cs"/>
         </a:defRPr>
       </a:lvl7pPr>
-      <a:lvl8pPr marL="3429000" indent="-228600" algn="l" defTabSz="914400" rtl="0" eaLnBrk="1" latinLnBrk="0" hangingPunct="1">
+      <a:lvl8pPr marL="1500000" indent="-228600" algn="l" defTabSz="914400" rtl="0" eaLnBrk="1" latinLnBrk="0" hangingPunct="1">
+        <a:lnSpc>
+          <a:spcPct val="90000"/>
+        </a:lnSpc>
         <a:spcBef>
-          <a:spcPct val="20000"/>
+          <a:spcPts val="200"/>
         </a:spcBef>
-        <a:buFont typeface="Arial" pitchFamily="34" charset="0"/>
-        <a:buChar char="•"/>
-        <a:defRPr sz="2000" kern="1200">
+        <a:spcAft>
+          <a:spcPts val="400"/>
+        </a:spcAft>
+        <a:buClr>
+          <a:schemeClr val="accent1"/>
+        </a:buClr>
+        <a:buFont typeface="Calibri" pitchFamily="34" charset="0"/>
+        <a:buChar char="◦"/>
+        <a:defRPr sz="1400" kern="1200">
           <a:solidFill>
-            <a:schemeClr val="tx1"/>
+            <a:schemeClr val="tx1">
+              <a:lumMod val="75000"/>
+              <a:lumOff val="25000"/>
+            </a:schemeClr>
           </a:solidFill>
           <a:latin typeface="+mn-lt"/>
           <a:ea typeface="+mn-ea"/>
           <a:cs typeface="+mn-cs"/>
         </a:defRPr>
       </a:lvl8pPr>
-      <a:lvl9pPr marL="3886200" indent="-228600" algn="l" defTabSz="914400" rtl="0" eaLnBrk="1" latinLnBrk="0" hangingPunct="1">
+      <a:lvl9pPr marL="1700000" indent="-228600" algn="l" defTabSz="914400" rtl="0" eaLnBrk="1" latinLnBrk="0" hangingPunct="1">
+        <a:lnSpc>
+          <a:spcPct val="90000"/>
+        </a:lnSpc>
         <a:spcBef>
-          <a:spcPct val="20000"/>
+          <a:spcPts val="200"/>
         </a:spcBef>
-        <a:buFont typeface="Arial" pitchFamily="34" charset="0"/>
-        <a:buChar char="•"/>
-        <a:defRPr sz="2000" kern="1200">
+        <a:spcAft>
+          <a:spcPts val="400"/>
+        </a:spcAft>
+        <a:buClr>
+          <a:schemeClr val="accent1"/>
+        </a:buClr>
+        <a:buFont typeface="Calibri" pitchFamily="34" charset="0"/>
+        <a:buChar char="◦"/>
+        <a:defRPr sz="1400" kern="1200">
           <a:solidFill>
-            <a:schemeClr val="tx1"/>
+            <a:schemeClr val="tx1">
+              <a:lumMod val="75000"/>
+              <a:lumOff val="25000"/>
+            </a:schemeClr>
           </a:solidFill>
           <a:latin typeface="+mn-lt"/>
           <a:ea typeface="+mn-ea"/>
@@ -8778,7 +9680,7 @@
     </p:bodyStyle>
     <p:otherStyle>
       <a:defPPr>
-        <a:defRPr lang="de-DE"/>
+        <a:defRPr lang="en-US"/>
       </a:defPPr>
       <a:lvl1pPr marL="0" algn="l" defTabSz="914400" rtl="0" eaLnBrk="1" latinLnBrk="0" hangingPunct="1">
         <a:defRPr sz="1800" kern="1200">
@@ -8933,10 +9835,15 @@
             <p:ph idx="1"/>
           </p:nvPr>
         </p:nvSpPr>
-        <p:spPr/>
+        <p:spPr>
+          <a:xfrm>
+            <a:off x="802024" y="2204864"/>
+            <a:ext cx="7543801" cy="4023360"/>
+          </a:xfrm>
+        </p:spPr>
         <p:txBody>
           <a:bodyPr>
-            <a:normAutofit lnSpcReduction="10000"/>
+            <a:normAutofit/>
           </a:bodyPr>
           <a:lstStyle/>
           <a:p>
@@ -9004,7 +9911,7 @@
         </p:blipFill>
         <p:spPr bwMode="auto">
           <a:xfrm>
-            <a:off x="2699792" y="1556792"/>
+            <a:off x="2764547" y="2132856"/>
             <a:ext cx="3660626" cy="2619531"/>
           </a:xfrm>
           <a:prstGeom prst="rect">
@@ -9094,7 +10001,12 @@
             <p:ph idx="1"/>
           </p:nvPr>
         </p:nvSpPr>
-        <p:spPr/>
+        <p:spPr>
+          <a:xfrm>
+            <a:off x="822960" y="2420888"/>
+            <a:ext cx="7543801" cy="4023360"/>
+          </a:xfrm>
+        </p:spPr>
         <p:txBody>
           <a:bodyPr>
             <a:normAutofit fontScale="77500" lnSpcReduction="20000"/>
@@ -9176,13 +10088,8 @@
             </a:pPr>
             <a:r>
               <a:rPr lang="en-US" sz="4100" dirty="0" smtClean="0"/>
-              <a:t>g</a:t>
+              <a:t>generates new theory</a:t>
             </a:r>
-            <a:r>
-              <a:rPr lang="en-US" sz="4100" dirty="0" smtClean="0"/>
-              <a:t>enerates new theory</a:t>
-            </a:r>
-            <a:endParaRPr lang="en-US" sz="4100" dirty="0" smtClean="0"/>
           </a:p>
         </p:txBody>
       </p:sp>
@@ -9192,10 +10099,16 @@
           <p:cNvGraphicFramePr>
             <a:graphicFrameLocks/>
           </p:cNvGraphicFramePr>
-          <p:nvPr/>
+          <p:nvPr>
+            <p:extLst>
+              <p:ext uri="{D42A27DB-BD31-4B8C-83A1-F6EECF244321}">
+                <p14:modId xmlns:p14="http://schemas.microsoft.com/office/powerpoint/2010/main" val="3699555679"/>
+              </p:ext>
+            </p:extLst>
+          </p:nvPr>
         </p:nvGraphicFramePr>
         <p:xfrm>
-          <a:off x="1619672" y="1412776"/>
+          <a:off x="1619672" y="1844824"/>
           <a:ext cx="5698976" cy="2985195"/>
         </p:xfrm>
         <a:graphic>
@@ -9273,7 +10186,12 @@
             <p:ph idx="1"/>
           </p:nvPr>
         </p:nvSpPr>
-        <p:spPr/>
+        <p:spPr>
+          <a:xfrm>
+            <a:off x="822960" y="2132856"/>
+            <a:ext cx="7543801" cy="4023360"/>
+          </a:xfrm>
+        </p:spPr>
         <p:txBody>
           <a:bodyPr>
             <a:normAutofit fontScale="85000" lnSpcReduction="20000"/>
@@ -9328,15 +10246,7 @@
             </a:pPr>
             <a:r>
               <a:rPr lang="en-US" sz="3800" dirty="0" smtClean="0"/>
-              <a:t>difficult </a:t>
-            </a:r>
-            <a:r>
-              <a:rPr lang="en-US" sz="3800" dirty="0" smtClean="0"/>
-              <a:t>for other researchers to use in </a:t>
-            </a:r>
-            <a:r>
-              <a:rPr lang="en-US" sz="3800" dirty="0" smtClean="0"/>
-              <a:t>practice</a:t>
+              <a:t>difficult for other researchers to use in practice</a:t>
             </a:r>
           </a:p>
           <a:p>
@@ -9355,10 +10265,16 @@
         <p:nvGraphicFramePr>
           <p:cNvPr id="4" name="Diagramm 3"/>
           <p:cNvGraphicFramePr/>
-          <p:nvPr/>
+          <p:nvPr>
+            <p:extLst>
+              <p:ext uri="{D42A27DB-BD31-4B8C-83A1-F6EECF244321}">
+                <p14:modId xmlns:p14="http://schemas.microsoft.com/office/powerpoint/2010/main" val="3247369186"/>
+              </p:ext>
+            </p:extLst>
+          </p:nvPr>
         </p:nvGraphicFramePr>
         <p:xfrm>
-          <a:off x="2195736" y="1484784"/>
+          <a:off x="2278772" y="1772816"/>
           <a:ext cx="4632176" cy="2968104"/>
         </p:xfrm>
         <a:graphic>
@@ -9383,9 +10299,9 @@
 </file>
 
 <file path=ppt/theme/theme1.xml><?xml version="1.0" encoding="utf-8"?>
-<a:theme xmlns:a="http://schemas.openxmlformats.org/drawingml/2006/main" name="Larissa-Design">
+<a:theme xmlns:a="http://schemas.openxmlformats.org/drawingml/2006/main" name="Rückblick">
   <a:themeElements>
-    <a:clrScheme name="Larissa">
+    <a:clrScheme name="Rückblick">
       <a:dk1>
         <a:sysClr val="windowText" lastClr="000000"/>
       </a:dk1>
@@ -9393,39 +10309,39 @@
         <a:sysClr val="window" lastClr="FFFFFF"/>
       </a:lt1>
       <a:dk2>
-        <a:srgbClr val="1F497D"/>
+        <a:srgbClr val="344068"/>
       </a:dk2>
       <a:lt2>
-        <a:srgbClr val="EEECE1"/>
+        <a:srgbClr val="D9E0E6"/>
       </a:lt2>
       <a:accent1>
-        <a:srgbClr val="4F81BD"/>
+        <a:srgbClr val="1CADE4"/>
       </a:accent1>
       <a:accent2>
-        <a:srgbClr val="C0504D"/>
+        <a:srgbClr val="2683C6"/>
       </a:accent2>
       <a:accent3>
-        <a:srgbClr val="9BBB59"/>
+        <a:srgbClr val="28C4CC"/>
       </a:accent3>
       <a:accent4>
-        <a:srgbClr val="8064A2"/>
+        <a:srgbClr val="42BA97"/>
       </a:accent4>
       <a:accent5>
-        <a:srgbClr val="4BACC6"/>
+        <a:srgbClr val="3E8853"/>
       </a:accent5>
       <a:accent6>
-        <a:srgbClr val="F79646"/>
+        <a:srgbClr val="62A39F"/>
       </a:accent6>
       <a:hlink>
-        <a:srgbClr val="0000FF"/>
+        <a:srgbClr val="6EAC1C"/>
       </a:hlink>
       <a:folHlink>
-        <a:srgbClr val="800080"/>
+        <a:srgbClr val="B26B02"/>
       </a:folHlink>
     </a:clrScheme>
-    <a:fontScheme name="Larissa">
+    <a:fontScheme name="Rückblick">
       <a:majorFont>
-        <a:latin typeface="Calibri"/>
+        <a:latin typeface="Calibri Light" panose="020F0302020204030204"/>
         <a:ea typeface=""/>
         <a:cs typeface=""/>
         <a:font script="Jpan" typeface="ＭＳ Ｐゴシック"/>
@@ -9457,9 +10373,10 @@
         <a:font script="Mong" typeface="Mongolian Baiti"/>
         <a:font script="Viet" typeface="Times New Roman"/>
         <a:font script="Uigh" typeface="Microsoft Uighur"/>
+        <a:font script="Geor" typeface="Sylfaen"/>
       </a:majorFont>
       <a:minorFont>
-        <a:latin typeface="Calibri"/>
+        <a:latin typeface="Calibri" panose="020F0502020204030204"/>
         <a:ea typeface=""/>
         <a:cs typeface=""/>
         <a:font script="Jpan" typeface="ＭＳ Ｐゴシック"/>
@@ -9491,9 +10408,10 @@
         <a:font script="Mong" typeface="Mongolian Baiti"/>
         <a:font script="Viet" typeface="Arial"/>
         <a:font script="Uigh" typeface="Microsoft Uighur"/>
+        <a:font script="Geor" typeface="Sylfaen"/>
       </a:minorFont>
     </a:fontScheme>
-    <a:fmtScheme name="Larissa">
+    <a:fmtScheme name="Rückblick">
       <a:fillStyleLst>
         <a:solidFill>
           <a:schemeClr val="phClr"/>
@@ -9502,56 +10420,73 @@
           <a:gsLst>
             <a:gs pos="0">
               <a:schemeClr val="phClr">
-                <a:tint val="50000"/>
-                <a:satMod val="300000"/>
+                <a:tint val="65000"/>
+                <a:shade val="92000"/>
+                <a:satMod val="130000"/>
               </a:schemeClr>
             </a:gs>
-            <a:gs pos="35000">
+            <a:gs pos="45000">
               <a:schemeClr val="phClr">
-                <a:tint val="37000"/>
-                <a:satMod val="300000"/>
+                <a:tint val="60000"/>
+                <a:shade val="99000"/>
+                <a:satMod val="120000"/>
               </a:schemeClr>
             </a:gs>
             <a:gs pos="100000">
               <a:schemeClr val="phClr">
-                <a:tint val="15000"/>
-                <a:satMod val="350000"/>
+                <a:tint val="55000"/>
+                <a:satMod val="140000"/>
               </a:schemeClr>
             </a:gs>
           </a:gsLst>
-          <a:lin ang="16200000" scaled="1"/>
+          <a:path path="circle">
+            <a:fillToRect l="100000" t="100000" r="100000" b="100000"/>
+          </a:path>
         </a:gradFill>
         <a:gradFill rotWithShape="1">
           <a:gsLst>
             <a:gs pos="0">
               <a:schemeClr val="phClr">
-                <a:shade val="51000"/>
+                <a:shade val="85000"/>
                 <a:satMod val="130000"/>
               </a:schemeClr>
             </a:gs>
-            <a:gs pos="80000">
+            <a:gs pos="34000">
               <a:schemeClr val="phClr">
-                <a:shade val="93000"/>
+                <a:shade val="87000"/>
+                <a:satMod val="125000"/>
+              </a:schemeClr>
+            </a:gs>
+            <a:gs pos="70000">
+              <a:schemeClr val="phClr">
+                <a:tint val="100000"/>
+                <a:shade val="90000"/>
                 <a:satMod val="130000"/>
               </a:schemeClr>
             </a:gs>
             <a:gs pos="100000">
               <a:schemeClr val="phClr">
-                <a:shade val="94000"/>
-                <a:satMod val="135000"/>
+                <a:tint val="100000"/>
+                <a:shade val="100000"/>
+                <a:satMod val="110000"/>
               </a:schemeClr>
             </a:gs>
           </a:gsLst>
-          <a:lin ang="16200000" scaled="0"/>
+          <a:path path="circle">
+            <a:fillToRect l="100000" t="100000" r="100000" b="100000"/>
+          </a:path>
         </a:gradFill>
       </a:fillStyleLst>
       <a:lnStyleLst>
-        <a:ln w="9525" cap="flat" cmpd="sng" algn="ctr">
+        <a:ln w="12700" cap="flat" cmpd="sng" algn="ctr">
           <a:solidFill>
-            <a:schemeClr val="phClr">
-              <a:shade val="95000"/>
-              <a:satMod val="105000"/>
-            </a:schemeClr>
+            <a:schemeClr val="phClr"/>
+          </a:solidFill>
+          <a:prstDash val="solid"/>
+        </a:ln>
+        <a:ln w="15875" cap="flat" cmpd="sng" algn="ctr">
+          <a:solidFill>
+            <a:schemeClr val="phClr"/>
           </a:solidFill>
           <a:prstDash val="solid"/>
         </a:ln>
@@ -9561,37 +10496,25 @@
           </a:solidFill>
           <a:prstDash val="solid"/>
         </a:ln>
-        <a:ln w="38100" cap="flat" cmpd="sng" algn="ctr">
-          <a:solidFill>
-            <a:schemeClr val="phClr"/>
-          </a:solidFill>
-          <a:prstDash val="solid"/>
-        </a:ln>
       </a:lnStyleLst>
       <a:effectStyleLst>
         <a:effectStyle>
+          <a:effectLst/>
+        </a:effectStyle>
+        <a:effectStyle>
           <a:effectLst>
-            <a:outerShdw blurRad="40000" dist="20000" dir="5400000" rotWithShape="0">
+            <a:outerShdw blurRad="38100" dist="25400" dir="2700000" algn="br" rotWithShape="0">
               <a:srgbClr val="000000">
-                <a:alpha val="38000"/>
+                <a:alpha val="60000"/>
               </a:srgbClr>
             </a:outerShdw>
           </a:effectLst>
         </a:effectStyle>
         <a:effectStyle>
           <a:effectLst>
-            <a:outerShdw blurRad="40000" dist="23000" dir="5400000" rotWithShape="0">
+            <a:outerShdw blurRad="44450" dist="25400" dir="2700000" algn="br" rotWithShape="0">
               <a:srgbClr val="000000">
-                <a:alpha val="35000"/>
-              </a:srgbClr>
-            </a:outerShdw>
-          </a:effectLst>
-        </a:effectStyle>
-        <a:effectStyle>
-          <a:effectLst>
-            <a:outerShdw blurRad="40000" dist="23000" dir="5400000" rotWithShape="0">
-              <a:srgbClr val="000000">
-                <a:alpha val="35000"/>
+                <a:alpha val="60000"/>
               </a:srgbClr>
             </a:outerShdw>
           </a:effectLst>
@@ -9600,11 +10523,11 @@
               <a:rot lat="0" lon="0" rev="0"/>
             </a:camera>
             <a:lightRig rig="threePt" dir="t">
-              <a:rot lat="0" lon="0" rev="1200000"/>
+              <a:rot lat="0" lon="0" rev="19800000"/>
             </a:lightRig>
           </a:scene3d>
-          <a:sp3d>
-            <a:bevelT w="63500" h="25400"/>
+          <a:sp3d prstMaterial="flat">
+            <a:bevelT w="25400" h="31750"/>
           </a:sp3d>
         </a:effectStyle>
       </a:effectStyleLst>
@@ -9612,55 +10535,48 @@
         <a:solidFill>
           <a:schemeClr val="phClr"/>
         </a:solidFill>
+        <a:solidFill>
+          <a:schemeClr val="phClr">
+            <a:tint val="90000"/>
+            <a:shade val="97000"/>
+            <a:satMod val="130000"/>
+          </a:schemeClr>
+        </a:solidFill>
         <a:gradFill rotWithShape="1">
           <a:gsLst>
             <a:gs pos="0">
               <a:schemeClr val="phClr">
-                <a:tint val="40000"/>
-                <a:satMod val="350000"/>
+                <a:tint val="96000"/>
+                <a:shade val="99000"/>
+                <a:satMod val="140000"/>
               </a:schemeClr>
             </a:gs>
-            <a:gs pos="40000">
+            <a:gs pos="65000">
               <a:schemeClr val="phClr">
-                <a:tint val="45000"/>
-                <a:shade val="99000"/>
-                <a:satMod val="350000"/>
+                <a:tint val="100000"/>
+                <a:shade val="80000"/>
+                <a:satMod val="130000"/>
               </a:schemeClr>
             </a:gs>
             <a:gs pos="100000">
               <a:schemeClr val="phClr">
-                <a:shade val="20000"/>
-                <a:satMod val="255000"/>
+                <a:tint val="100000"/>
+                <a:shade val="48000"/>
+                <a:satMod val="120000"/>
               </a:schemeClr>
             </a:gs>
           </a:gsLst>
-          <a:path path="circle">
-            <a:fillToRect l="50000" t="-80000" r="50000" b="180000"/>
-          </a:path>
-        </a:gradFill>
-        <a:gradFill rotWithShape="1">
-          <a:gsLst>
-            <a:gs pos="0">
-              <a:schemeClr val="phClr">
-                <a:tint val="80000"/>
-                <a:satMod val="300000"/>
-              </a:schemeClr>
-            </a:gs>
-            <a:gs pos="100000">
-              <a:schemeClr val="phClr">
-                <a:shade val="30000"/>
-                <a:satMod val="200000"/>
-              </a:schemeClr>
-            </a:gs>
-          </a:gsLst>
-          <a:path path="circle">
-            <a:fillToRect l="50000" t="50000" r="50000" b="50000"/>
-          </a:path>
+          <a:lin ang="16200000" scaled="0"/>
         </a:gradFill>
       </a:bgFillStyleLst>
     </a:fmtScheme>
   </a:themeElements>
   <a:objectDefaults/>
   <a:extraClrSchemeLst/>
+  <a:extLst>
+    <a:ext uri="{05A4C25C-085E-4340-85A3-A5531E510DB2}">
+      <thm15:themeFamily xmlns:thm15="http://schemas.microsoft.com/office/thememl/2012/main" name="Retrospect" id="{5F128B03-DCCA-4EEB-AB3B-CF2899314A46}" vid="{9CC26709-368C-4D72-9060-94E5B3FF3CD6}"/>
+    </a:ext>
+  </a:extLst>
 </a:theme>
 </file>
</xml_diff>

<commit_message>
Some little fixes for the new design with my slides
</commit_message>
<xml_diff>
--- a/Impulsvortrag/4_Activity_Grounded_Hybrid_Theory.pptx
+++ b/Impulsvortrag/4_Activity_Grounded_Hybrid_Theory.pptx
@@ -108,7 +108,7 @@
   </p:defaultTextStyle>
   <p:extLst>
     <p:ext uri="{EFAFB233-063F-42B5-8137-9DF3F51BA10A}">
-      <p15:sldGuideLst xmlns:p15="http://schemas.microsoft.com/office/powerpoint/2012/main">
+      <p15:sldGuideLst xmlns:p15="http://schemas.microsoft.com/office/powerpoint/2012/main" xmlns="">
         <p15:guide id="1" orient="horz" pos="2160">
           <p15:clr>
             <a:srgbClr val="A4A3A4"/>
@@ -1942,16 +1942,16 @@
     </dgm:pt>
   </dgm:ptLst>
   <dgm:cxnLst>
+    <dgm:cxn modelId="{10B6853D-9C1F-478C-BC5E-987825091D0E}" type="presOf" srcId="{CA136722-4657-4B20-BF53-67B9036F0CB8}" destId="{903B71E9-A3DD-4708-A62B-744D8945C04C}" srcOrd="0" destOrd="0" presId="urn:microsoft.com/office/officeart/2005/8/layout/cycle5"/>
+    <dgm:cxn modelId="{B3D83F0C-2601-45CD-9404-33DF300D517D}" srcId="{1D172BBA-A3F6-40CE-9E33-3AAEAAA19B68}" destId="{888F3C9D-9AB8-40A9-BB25-70718C74FC0D}" srcOrd="0" destOrd="0" parTransId="{E6EB266E-5B44-4760-9195-D5D5B5407979}" sibTransId="{0E101679-2D5C-4B22-B4AC-9A4BA254570C}"/>
+    <dgm:cxn modelId="{57A935BD-B250-4092-87AC-2110021A1B66}" type="presOf" srcId="{995EC6C3-2C46-4AF8-A609-F6B171B829A4}" destId="{B4337CB5-A10A-4031-BF3D-0E952902C3AE}" srcOrd="0" destOrd="0" presId="urn:microsoft.com/office/officeart/2005/8/layout/cycle5"/>
+    <dgm:cxn modelId="{30514C0B-C92C-48A4-A9AB-356D91C8A571}" srcId="{1D172BBA-A3F6-40CE-9E33-3AAEAAA19B68}" destId="{E1D8D4A4-08A1-4F14-A4FF-E38FC5B80912}" srcOrd="2" destOrd="0" parTransId="{2E41F75C-7E46-4A62-8C1E-66472EE22E3C}" sibTransId="{995EC6C3-2C46-4AF8-A609-F6B171B829A4}"/>
     <dgm:cxn modelId="{F8873359-FA40-4EA0-9538-BFF279DFFC4B}" srcId="{1D172BBA-A3F6-40CE-9E33-3AAEAAA19B68}" destId="{CA136722-4657-4B20-BF53-67B9036F0CB8}" srcOrd="1" destOrd="0" parTransId="{7CF23150-B4D1-4094-946A-6E3FA722CB65}" sibTransId="{236993A6-D9DD-476E-B984-C55FCF7883A9}"/>
-    <dgm:cxn modelId="{B3D83F0C-2601-45CD-9404-33DF300D517D}" srcId="{1D172BBA-A3F6-40CE-9E33-3AAEAAA19B68}" destId="{888F3C9D-9AB8-40A9-BB25-70718C74FC0D}" srcOrd="0" destOrd="0" parTransId="{E6EB266E-5B44-4760-9195-D5D5B5407979}" sibTransId="{0E101679-2D5C-4B22-B4AC-9A4BA254570C}"/>
-    <dgm:cxn modelId="{10B6853D-9C1F-478C-BC5E-987825091D0E}" type="presOf" srcId="{CA136722-4657-4B20-BF53-67B9036F0CB8}" destId="{903B71E9-A3DD-4708-A62B-744D8945C04C}" srcOrd="0" destOrd="0" presId="urn:microsoft.com/office/officeart/2005/8/layout/cycle5"/>
     <dgm:cxn modelId="{8EFE629A-B36C-4AF3-846F-BEC7AA9C0CC4}" type="presOf" srcId="{1D172BBA-A3F6-40CE-9E33-3AAEAAA19B68}" destId="{08FEDF54-9A5F-4462-B506-BCE0D51A27A0}" srcOrd="0" destOrd="0" presId="urn:microsoft.com/office/officeart/2005/8/layout/cycle5"/>
-    <dgm:cxn modelId="{30514C0B-C92C-48A4-A9AB-356D91C8A571}" srcId="{1D172BBA-A3F6-40CE-9E33-3AAEAAA19B68}" destId="{E1D8D4A4-08A1-4F14-A4FF-E38FC5B80912}" srcOrd="2" destOrd="0" parTransId="{2E41F75C-7E46-4A62-8C1E-66472EE22E3C}" sibTransId="{995EC6C3-2C46-4AF8-A609-F6B171B829A4}"/>
-    <dgm:cxn modelId="{57A935BD-B250-4092-87AC-2110021A1B66}" type="presOf" srcId="{995EC6C3-2C46-4AF8-A609-F6B171B829A4}" destId="{B4337CB5-A10A-4031-BF3D-0E952902C3AE}" srcOrd="0" destOrd="0" presId="urn:microsoft.com/office/officeart/2005/8/layout/cycle5"/>
     <dgm:cxn modelId="{90A935DA-4B64-4548-8C48-D115D56EB693}" type="presOf" srcId="{E1D8D4A4-08A1-4F14-A4FF-E38FC5B80912}" destId="{0DD0F4A5-9E5C-4510-8FC1-9E20E8E3741B}" srcOrd="0" destOrd="0" presId="urn:microsoft.com/office/officeart/2005/8/layout/cycle5"/>
-    <dgm:cxn modelId="{CCACED45-3A08-41F5-AD4E-1F15A1C764FC}" type="presOf" srcId="{236993A6-D9DD-476E-B984-C55FCF7883A9}" destId="{16605E07-EC61-4879-AF33-FCEF7199F9BF}" srcOrd="0" destOrd="0" presId="urn:microsoft.com/office/officeart/2005/8/layout/cycle5"/>
     <dgm:cxn modelId="{4C38DB2C-6324-46D2-B2DD-DCB5F7BCEAB9}" type="presOf" srcId="{888F3C9D-9AB8-40A9-BB25-70718C74FC0D}" destId="{BE9C9A74-B427-4D9B-97B2-6636A09FDBAC}" srcOrd="0" destOrd="0" presId="urn:microsoft.com/office/officeart/2005/8/layout/cycle5"/>
     <dgm:cxn modelId="{59F86FC7-46B8-422C-B045-36294AD0E218}" type="presOf" srcId="{0E101679-2D5C-4B22-B4AC-9A4BA254570C}" destId="{E52E9E77-30A9-446B-B6E7-F10DD6257421}" srcOrd="0" destOrd="0" presId="urn:microsoft.com/office/officeart/2005/8/layout/cycle5"/>
+    <dgm:cxn modelId="{CCACED45-3A08-41F5-AD4E-1F15A1C764FC}" type="presOf" srcId="{236993A6-D9DD-476E-B984-C55FCF7883A9}" destId="{16605E07-EC61-4879-AF33-FCEF7199F9BF}" srcOrd="0" destOrd="0" presId="urn:microsoft.com/office/officeart/2005/8/layout/cycle5"/>
     <dgm:cxn modelId="{33691A64-F365-452F-BB34-6B8196BC7311}" type="presParOf" srcId="{08FEDF54-9A5F-4462-B506-BCE0D51A27A0}" destId="{BE9C9A74-B427-4D9B-97B2-6636A09FDBAC}" srcOrd="0" destOrd="0" presId="urn:microsoft.com/office/officeart/2005/8/layout/cycle5"/>
     <dgm:cxn modelId="{0AD02758-1BCB-4410-BAFD-C7DC83732099}" type="presParOf" srcId="{08FEDF54-9A5F-4462-B506-BCE0D51A27A0}" destId="{D7DC8D62-8481-43F7-ADE7-5D2068F3A585}" srcOrd="1" destOrd="0" presId="urn:microsoft.com/office/officeart/2005/8/layout/cycle5"/>
     <dgm:cxn modelId="{546D4629-22A6-4986-AC96-DCAECE7524BE}" type="presParOf" srcId="{08FEDF54-9A5F-4462-B506-BCE0D51A27A0}" destId="{E52E9E77-30A9-446B-B6E7-F10DD6257421}" srcOrd="2" destOrd="0" presId="urn:microsoft.com/office/officeart/2005/8/layout/cycle5"/>
@@ -1966,7 +1966,7 @@
   <dgm:whole/>
   <dgm:extLst>
     <a:ext uri="http://schemas.microsoft.com/office/drawing/2008/diagram">
-      <dsp:dataModelExt xmlns:dsp="http://schemas.microsoft.com/office/drawing/2008/diagram" relId="rId6" minVer="http://schemas.openxmlformats.org/drawingml/2006/diagram"/>
+      <dsp:dataModelExt xmlns:dsp="http://schemas.microsoft.com/office/drawing/2008/diagram" xmlns="" relId="rId6" minVer="http://schemas.openxmlformats.org/drawingml/2006/diagram"/>
     </a:ext>
   </dgm:extLst>
 </dgm:dataModel>
@@ -2228,15 +2228,15 @@
     </dgm:pt>
   </dgm:ptLst>
   <dgm:cxnLst>
+    <dgm:cxn modelId="{5AB3C5F5-10DF-42AE-AA91-5D9F06FFFD67}" type="presOf" srcId="{E972E312-DBFF-41C7-8543-33BEDA3725E0}" destId="{CF9FA0BD-6C96-46C5-9109-4FEBED892E92}" srcOrd="0" destOrd="0" presId="urn:microsoft.com/office/officeart/2005/8/layout/funnel1"/>
     <dgm:cxn modelId="{8EC27B23-1B3C-449A-9F41-B40200BA28E6}" srcId="{8DC3DE76-903F-4759-A432-EE7CFB81B6BA}" destId="{8F32951F-0516-44DB-A971-F56447B12ECE}" srcOrd="3" destOrd="0" parTransId="{4DC4D477-4FC3-4D5C-9A26-024EA25DD4F5}" sibTransId="{153A8A4D-FD22-4828-B45C-0A3AB292CE7A}"/>
+    <dgm:cxn modelId="{44D8C9B2-73B3-489B-904A-465A0AEF81DE}" type="presOf" srcId="{8DC3DE76-903F-4759-A432-EE7CFB81B6BA}" destId="{3EF277F9-90A1-4C20-8CA8-F2DDCD6B6388}" srcOrd="0" destOrd="0" presId="urn:microsoft.com/office/officeart/2005/8/layout/funnel1"/>
     <dgm:cxn modelId="{1CDFDC68-5ED5-4043-A979-D21AF9B67EAF}" srcId="{8DC3DE76-903F-4759-A432-EE7CFB81B6BA}" destId="{E4E46E1F-C2E2-43A9-983C-C350F2863ED8}" srcOrd="2" destOrd="0" parTransId="{4E3FDAFF-1EF9-4585-9204-907F323163DE}" sibTransId="{45FBBBDE-7383-45FD-84F4-ECF6DB458B03}"/>
+    <dgm:cxn modelId="{0793501D-177D-4258-A943-93749DE12E74}" type="presOf" srcId="{66D69CCA-46B2-43AF-AB5C-F81F6C25C0E7}" destId="{747AEF02-8F1F-426A-9CAB-5D33747352F0}" srcOrd="0" destOrd="0" presId="urn:microsoft.com/office/officeart/2005/8/layout/funnel1"/>
+    <dgm:cxn modelId="{C857A254-410E-4D0A-80F4-2A944BE7C360}" type="presOf" srcId="{E4E46E1F-C2E2-43A9-983C-C350F2863ED8}" destId="{8127A5E6-493F-44B3-A335-FCA2F1A02DFE}" srcOrd="0" destOrd="0" presId="urn:microsoft.com/office/officeart/2005/8/layout/funnel1"/>
     <dgm:cxn modelId="{E35669E1-CBDC-4BC7-A467-A6D0D28FDCDE}" type="presOf" srcId="{8F32951F-0516-44DB-A971-F56447B12ECE}" destId="{C576A65B-8480-4509-83E9-F5A4C1FDA0FE}" srcOrd="0" destOrd="0" presId="urn:microsoft.com/office/officeart/2005/8/layout/funnel1"/>
-    <dgm:cxn modelId="{44D8C9B2-73B3-489B-904A-465A0AEF81DE}" type="presOf" srcId="{8DC3DE76-903F-4759-A432-EE7CFB81B6BA}" destId="{3EF277F9-90A1-4C20-8CA8-F2DDCD6B6388}" srcOrd="0" destOrd="0" presId="urn:microsoft.com/office/officeart/2005/8/layout/funnel1"/>
     <dgm:cxn modelId="{3EC55052-A89E-4C3A-BE8A-14250781397B}" srcId="{8DC3DE76-903F-4759-A432-EE7CFB81B6BA}" destId="{E972E312-DBFF-41C7-8543-33BEDA3725E0}" srcOrd="0" destOrd="0" parTransId="{C497FFC2-94F0-49C8-83D3-4BE3B235E875}" sibTransId="{A3F11F0C-6849-4823-A505-453710D71D19}"/>
-    <dgm:cxn modelId="{0793501D-177D-4258-A943-93749DE12E74}" type="presOf" srcId="{66D69CCA-46B2-43AF-AB5C-F81F6C25C0E7}" destId="{747AEF02-8F1F-426A-9CAB-5D33747352F0}" srcOrd="0" destOrd="0" presId="urn:microsoft.com/office/officeart/2005/8/layout/funnel1"/>
     <dgm:cxn modelId="{0F413C8A-BF29-4BEA-93D9-B35183B566C2}" srcId="{8DC3DE76-903F-4759-A432-EE7CFB81B6BA}" destId="{66D69CCA-46B2-43AF-AB5C-F81F6C25C0E7}" srcOrd="1" destOrd="0" parTransId="{74FBEE16-0640-49EB-9D1D-4271DF58FA50}" sibTransId="{E9C356B4-2A54-465C-A316-95F8E241D62C}"/>
-    <dgm:cxn modelId="{5AB3C5F5-10DF-42AE-AA91-5D9F06FFFD67}" type="presOf" srcId="{E972E312-DBFF-41C7-8543-33BEDA3725E0}" destId="{CF9FA0BD-6C96-46C5-9109-4FEBED892E92}" srcOrd="0" destOrd="0" presId="urn:microsoft.com/office/officeart/2005/8/layout/funnel1"/>
-    <dgm:cxn modelId="{C857A254-410E-4D0A-80F4-2A944BE7C360}" type="presOf" srcId="{E4E46E1F-C2E2-43A9-983C-C350F2863ED8}" destId="{8127A5E6-493F-44B3-A335-FCA2F1A02DFE}" srcOrd="0" destOrd="0" presId="urn:microsoft.com/office/officeart/2005/8/layout/funnel1"/>
     <dgm:cxn modelId="{EA70A1AD-9FFF-4AF7-BC26-B72A7B1D615C}" type="presParOf" srcId="{3EF277F9-90A1-4C20-8CA8-F2DDCD6B6388}" destId="{3CCF0AC6-1077-4C8A-A896-3602296930E5}" srcOrd="0" destOrd="0" presId="urn:microsoft.com/office/officeart/2005/8/layout/funnel1"/>
     <dgm:cxn modelId="{D4A72E7A-6A3F-42BD-A391-ED5A92BB3AEB}" type="presParOf" srcId="{3EF277F9-90A1-4C20-8CA8-F2DDCD6B6388}" destId="{449C4019-57EC-4A35-9F2B-0DBC75DCC6BB}" srcOrd="1" destOrd="0" presId="urn:microsoft.com/office/officeart/2005/8/layout/funnel1"/>
     <dgm:cxn modelId="{29FEF5C3-5F1C-4129-910A-0E858BAFB315}" type="presParOf" srcId="{3EF277F9-90A1-4C20-8CA8-F2DDCD6B6388}" destId="{C576A65B-8480-4509-83E9-F5A4C1FDA0FE}" srcOrd="2" destOrd="0" presId="urn:microsoft.com/office/officeart/2005/8/layout/funnel1"/>
@@ -2249,14 +2249,14 @@
   <dgm:whole/>
   <dgm:extLst>
     <a:ext uri="http://schemas.microsoft.com/office/drawing/2008/diagram">
-      <dsp:dataModelExt xmlns:dsp="http://schemas.microsoft.com/office/drawing/2008/diagram" relId="rId6" minVer="http://schemas.openxmlformats.org/drawingml/2006/diagram"/>
+      <dsp:dataModelExt xmlns:dsp="http://schemas.microsoft.com/office/drawing/2008/diagram" xmlns="" relId="rId6" minVer="http://schemas.openxmlformats.org/drawingml/2006/diagram"/>
     </a:ext>
   </dgm:extLst>
 </dgm:dataModel>
 </file>
 
 <file path=ppt/diagrams/drawing1.xml><?xml version="1.0" encoding="utf-8"?>
-<dsp:drawing xmlns:dgm="http://schemas.openxmlformats.org/drawingml/2006/diagram" xmlns:dsp="http://schemas.microsoft.com/office/drawing/2008/diagram" xmlns:a="http://schemas.openxmlformats.org/drawingml/2006/main">
+<dsp:drawing xmlns:dgm="http://schemas.openxmlformats.org/drawingml/2006/diagram" xmlns:a="http://schemas.openxmlformats.org/drawingml/2006/main" xmlns:dsp="http://schemas.microsoft.com/office/drawing/2008/diagram">
   <dsp:spTree>
     <dsp:nvGrpSpPr>
       <dsp:cNvPr id="0" name=""/>
@@ -2383,8 +2383,8 @@
         </a:p>
       </dsp:txBody>
       <dsp:txXfrm>
-        <a:off x="2207733" y="44404"/>
-        <a:ext cx="1283509" cy="803840"/>
+        <a:off x="2164247" y="918"/>
+        <a:ext cx="1370481" cy="890812"/>
       </dsp:txXfrm>
     </dsp:sp>
     <dsp:sp modelId="{E52E9E77-30A9-446B-B6E7-F10DD6257421}">
@@ -2556,8 +2556,8 @@
         </a:p>
       </dsp:txBody>
       <dsp:txXfrm>
-        <a:off x="3235486" y="1824525"/>
-        <a:ext cx="1283509" cy="803840"/>
+        <a:off x="3192000" y="1781039"/>
+        <a:ext cx="1370481" cy="890812"/>
       </dsp:txXfrm>
     </dsp:sp>
     <dsp:sp modelId="{16605E07-EC61-4879-AF33-FCEF7199F9BF}">
@@ -2630,7 +2630,7 @@
           <a:gsLst>
             <a:gs pos="0">
               <a:schemeClr val="accent2">
-                <a:hueOff val="-1331824"/>
+                <a:hueOff val="-1331825"/>
                 <a:satOff val="-586"/>
                 <a:lumOff val="1569"/>
                 <a:alphaOff val="0"/>
@@ -2640,7 +2640,7 @@
             </a:gs>
             <a:gs pos="34000">
               <a:schemeClr val="accent2">
-                <a:hueOff val="-1331824"/>
+                <a:hueOff val="-1331825"/>
                 <a:satOff val="-586"/>
                 <a:lumOff val="1569"/>
                 <a:alphaOff val="0"/>
@@ -2650,7 +2650,7 @@
             </a:gs>
             <a:gs pos="70000">
               <a:schemeClr val="accent2">
-                <a:hueOff val="-1331824"/>
+                <a:hueOff val="-1331825"/>
                 <a:satOff val="-586"/>
                 <a:lumOff val="1569"/>
                 <a:alphaOff val="0"/>
@@ -2661,7 +2661,7 @@
             </a:gs>
             <a:gs pos="100000">
               <a:schemeClr val="accent2">
-                <a:hueOff val="-1331824"/>
+                <a:hueOff val="-1331825"/>
                 <a:satOff val="-586"/>
                 <a:lumOff val="1569"/>
                 <a:alphaOff val="0"/>
@@ -2733,8 +2733,8 @@
         </a:p>
       </dsp:txBody>
       <dsp:txXfrm>
-        <a:off x="1179980" y="1824525"/>
-        <a:ext cx="1283509" cy="803840"/>
+        <a:off x="1136494" y="1781039"/>
+        <a:ext cx="1370481" cy="890812"/>
       </dsp:txXfrm>
     </dsp:sp>
     <dsp:sp modelId="{B4337CB5-A10A-4031-BF3D-0E952902C3AE}">
@@ -2766,7 +2766,7 @@
         <a:ln w="12700" cap="flat" cmpd="sng" algn="ctr">
           <a:solidFill>
             <a:schemeClr val="accent2">
-              <a:hueOff val="-1331824"/>
+              <a:hueOff val="-1331825"/>
               <a:satOff val="-586"/>
               <a:lumOff val="1569"/>
               <a:alphaOff val="0"/>
@@ -2795,7 +2795,7 @@
 </file>
 
 <file path=ppt/diagrams/drawing2.xml><?xml version="1.0" encoding="utf-8"?>
-<dsp:drawing xmlns:dgm="http://schemas.openxmlformats.org/drawingml/2006/diagram" xmlns:dsp="http://schemas.microsoft.com/office/drawing/2008/diagram" xmlns:a="http://schemas.openxmlformats.org/drawingml/2006/main">
+<dsp:drawing xmlns:dgm="http://schemas.openxmlformats.org/drawingml/2006/diagram" xmlns:a="http://schemas.openxmlformats.org/drawingml/2006/main" xmlns:dsp="http://schemas.microsoft.com/office/drawing/2008/diagram">
   <dsp:spTree>
     <dsp:nvGrpSpPr>
       <dsp:cNvPr id="0" name=""/>
@@ -3088,8 +3088,8 @@
         </a:p>
       </dsp:txBody>
       <dsp:txXfrm>
-        <a:off x="2108137" y="1138084"/>
-        <a:ext cx="590277" cy="590277"/>
+        <a:off x="1985886" y="1015833"/>
+        <a:ext cx="834779" cy="834779"/>
       </dsp:txXfrm>
     </dsp:sp>
     <dsp:sp modelId="{747AEF02-8F1F-426A-9CAB-5D33747352F0}">
@@ -3212,8 +3212,8 @@
         </a:p>
       </dsp:txBody>
       <dsp:txXfrm>
-        <a:off x="1510806" y="511814"/>
-        <a:ext cx="590277" cy="590277"/>
+        <a:off x="1388555" y="389563"/>
+        <a:ext cx="834779" cy="834779"/>
       </dsp:txXfrm>
     </dsp:sp>
     <dsp:sp modelId="{CF9FA0BD-6C96-46C5-9109-4FEBED892E92}">
@@ -3233,7 +3233,7 @@
           <a:gsLst>
             <a:gs pos="0">
               <a:schemeClr val="accent2">
-                <a:hueOff val="-1331824"/>
+                <a:hueOff val="-1331825"/>
                 <a:satOff val="-586"/>
                 <a:lumOff val="1569"/>
                 <a:alphaOff val="0"/>
@@ -3243,7 +3243,7 @@
             </a:gs>
             <a:gs pos="34000">
               <a:schemeClr val="accent2">
-                <a:hueOff val="-1331824"/>
+                <a:hueOff val="-1331825"/>
                 <a:satOff val="-586"/>
                 <a:lumOff val="1569"/>
                 <a:alphaOff val="0"/>
@@ -3253,7 +3253,7 @@
             </a:gs>
             <a:gs pos="70000">
               <a:schemeClr val="accent2">
-                <a:hueOff val="-1331824"/>
+                <a:hueOff val="-1331825"/>
                 <a:satOff val="-586"/>
                 <a:lumOff val="1569"/>
                 <a:alphaOff val="0"/>
@@ -3264,7 +3264,7 @@
             </a:gs>
             <a:gs pos="100000">
               <a:schemeClr val="accent2">
-                <a:hueOff val="-1331824"/>
+                <a:hueOff val="-1331825"/>
                 <a:satOff val="-586"/>
                 <a:lumOff val="1569"/>
                 <a:alphaOff val="0"/>
@@ -3336,8 +3336,8 @@
         </a:p>
       </dsp:txBody>
       <dsp:txXfrm>
-        <a:off x="2364136" y="309983"/>
-        <a:ext cx="590277" cy="590277"/>
+        <a:off x="2241885" y="187732"/>
+        <a:ext cx="834779" cy="834779"/>
       </dsp:txXfrm>
     </dsp:sp>
     <dsp:sp modelId="{1FBAEFC3-C401-42FD-9F16-EA927271936B}">
@@ -6399,7 +6399,7 @@
     </p:spTree>
     <p:extLst>
       <p:ext uri="{BB962C8B-B14F-4D97-AF65-F5344CB8AC3E}">
-        <p14:creationId xmlns:p14="http://schemas.microsoft.com/office/powerpoint/2010/main" val="4258504480"/>
+        <p14:creationId xmlns:p14="http://schemas.microsoft.com/office/powerpoint/2010/main" xmlns="" val="4258504480"/>
       </p:ext>
     </p:extLst>
   </p:cSld>
@@ -6571,7 +6571,7 @@
     </p:spTree>
     <p:extLst>
       <p:ext uri="{BB962C8B-B14F-4D97-AF65-F5344CB8AC3E}">
-        <p14:creationId xmlns:p14="http://schemas.microsoft.com/office/powerpoint/2010/main" val="2473321595"/>
+        <p14:creationId xmlns:p14="http://schemas.microsoft.com/office/powerpoint/2010/main" xmlns="" val="2473321595"/>
       </p:ext>
     </p:extLst>
   </p:cSld>
@@ -6829,7 +6829,7 @@
     </p:spTree>
     <p:extLst>
       <p:ext uri="{BB962C8B-B14F-4D97-AF65-F5344CB8AC3E}">
-        <p14:creationId xmlns:p14="http://schemas.microsoft.com/office/powerpoint/2010/main" val="206359443"/>
+        <p14:creationId xmlns:p14="http://schemas.microsoft.com/office/powerpoint/2010/main" xmlns="" val="206359443"/>
       </p:ext>
     </p:extLst>
   </p:cSld>
@@ -7001,7 +7001,7 @@
     </p:spTree>
     <p:extLst>
       <p:ext uri="{BB962C8B-B14F-4D97-AF65-F5344CB8AC3E}">
-        <p14:creationId xmlns:p14="http://schemas.microsoft.com/office/powerpoint/2010/main" val="3397220835"/>
+        <p14:creationId xmlns:p14="http://schemas.microsoft.com/office/powerpoint/2010/main" xmlns="" val="3397220835"/>
       </p:ext>
     </p:extLst>
   </p:cSld>
@@ -7384,7 +7384,7 @@
     </p:spTree>
     <p:extLst>
       <p:ext uri="{BB962C8B-B14F-4D97-AF65-F5344CB8AC3E}">
-        <p14:creationId xmlns:p14="http://schemas.microsoft.com/office/powerpoint/2010/main" val="2988498725"/>
+        <p14:creationId xmlns:p14="http://schemas.microsoft.com/office/powerpoint/2010/main" xmlns="" val="2988498725"/>
       </p:ext>
     </p:extLst>
   </p:cSld>
@@ -7623,7 +7623,7 @@
     </p:spTree>
     <p:extLst>
       <p:ext uri="{BB962C8B-B14F-4D97-AF65-F5344CB8AC3E}">
-        <p14:creationId xmlns:p14="http://schemas.microsoft.com/office/powerpoint/2010/main" val="2763278326"/>
+        <p14:creationId xmlns:p14="http://schemas.microsoft.com/office/powerpoint/2010/main" xmlns="" val="2763278326"/>
       </p:ext>
     </p:extLst>
   </p:cSld>
@@ -8004,7 +8004,7 @@
     </p:spTree>
     <p:extLst>
       <p:ext uri="{BB962C8B-B14F-4D97-AF65-F5344CB8AC3E}">
-        <p14:creationId xmlns:p14="http://schemas.microsoft.com/office/powerpoint/2010/main" val="675981858"/>
+        <p14:creationId xmlns:p14="http://schemas.microsoft.com/office/powerpoint/2010/main" xmlns="" val="675981858"/>
       </p:ext>
     </p:extLst>
   </p:cSld>
@@ -8124,7 +8124,7 @@
     </p:spTree>
     <p:extLst>
       <p:ext uri="{BB962C8B-B14F-4D97-AF65-F5344CB8AC3E}">
-        <p14:creationId xmlns:p14="http://schemas.microsoft.com/office/powerpoint/2010/main" val="1541309378"/>
+        <p14:creationId xmlns:p14="http://schemas.microsoft.com/office/powerpoint/2010/main" xmlns="" val="1541309378"/>
       </p:ext>
     </p:extLst>
   </p:cSld>
@@ -8305,7 +8305,7 @@
     </p:spTree>
     <p:extLst>
       <p:ext uri="{BB962C8B-B14F-4D97-AF65-F5344CB8AC3E}">
-        <p14:creationId xmlns:p14="http://schemas.microsoft.com/office/powerpoint/2010/main" val="3903905052"/>
+        <p14:creationId xmlns:p14="http://schemas.microsoft.com/office/powerpoint/2010/main" xmlns="" val="3903905052"/>
       </p:ext>
     </p:extLst>
   </p:cSld>
@@ -8674,7 +8674,7 @@
     </p:spTree>
     <p:extLst>
       <p:ext uri="{BB962C8B-B14F-4D97-AF65-F5344CB8AC3E}">
-        <p14:creationId xmlns:p14="http://schemas.microsoft.com/office/powerpoint/2010/main" val="477510668"/>
+        <p14:creationId xmlns:p14="http://schemas.microsoft.com/office/powerpoint/2010/main" xmlns="" val="477510668"/>
       </p:ext>
     </p:extLst>
   </p:cSld>
@@ -9032,7 +9032,7 @@
     </p:spTree>
     <p:extLst>
       <p:ext uri="{BB962C8B-B14F-4D97-AF65-F5344CB8AC3E}">
-        <p14:creationId xmlns:p14="http://schemas.microsoft.com/office/powerpoint/2010/main" val="3721849584"/>
+        <p14:creationId xmlns:p14="http://schemas.microsoft.com/office/powerpoint/2010/main" xmlns="" val="3721849584"/>
       </p:ext>
     </p:extLst>
   </p:cSld>
@@ -9391,7 +9391,7 @@
     </p:spTree>
     <p:extLst>
       <p:ext uri="{BB962C8B-B14F-4D97-AF65-F5344CB8AC3E}">
-        <p14:creationId xmlns:p14="http://schemas.microsoft.com/office/powerpoint/2010/main" val="333461540"/>
+        <p14:creationId xmlns:p14="http://schemas.microsoft.com/office/powerpoint/2010/main" xmlns="" val="333461540"/>
       </p:ext>
     </p:extLst>
   </p:cSld>
@@ -9874,11 +9874,11 @@
               <a:t> </a:t>
             </a:r>
             <a:r>
-              <a:rPr lang="en-US" dirty="0" smtClean="0"/>
+              <a:rPr lang="en-US" sz="2400" dirty="0" smtClean="0"/>
               <a:t>requires </a:t>
             </a:r>
             <a:r>
-              <a:rPr lang="en-US" dirty="0"/>
+              <a:rPr lang="en-US" sz="2400" dirty="0"/>
               <a:t>considerable learning and experience </a:t>
             </a:r>
           </a:p>
@@ -9888,7 +9888,7 @@
               <a:buChar char="ü"/>
             </a:pPr>
             <a:r>
-              <a:rPr lang="en-US" dirty="0" smtClean="0"/>
+              <a:rPr lang="en-US" sz="2400" dirty="0" smtClean="0"/>
               <a:t> helps to identify tensions and contradictions</a:t>
             </a:r>
           </a:p>
@@ -9911,7 +9911,7 @@
         </p:blipFill>
         <p:spPr bwMode="auto">
           <a:xfrm>
-            <a:off x="2764547" y="2132856"/>
+            <a:off x="2771800" y="2060848"/>
             <a:ext cx="3660626" cy="2619531"/>
           </a:xfrm>
           <a:prstGeom prst="rect">
@@ -10009,7 +10009,7 @@
         </p:spPr>
         <p:txBody>
           <a:bodyPr>
-            <a:normAutofit fontScale="77500" lnSpcReduction="20000"/>
+            <a:normAutofit fontScale="85000" lnSpcReduction="20000"/>
           </a:bodyPr>
           <a:lstStyle/>
           <a:p>
@@ -10051,23 +10051,23 @@
               <a:buChar char="-"/>
             </a:pPr>
             <a:r>
-              <a:rPr lang="en-US" sz="4100" dirty="0" smtClean="0"/>
-              <a:t>depends </a:t>
+              <a:rPr lang="en-US" sz="3100" dirty="0" smtClean="0"/>
+              <a:t> depends </a:t>
             </a:r>
             <a:r>
-              <a:rPr lang="en-US" sz="4100" dirty="0"/>
+              <a:rPr lang="en-US" sz="3100" dirty="0"/>
               <a:t>on the skills </a:t>
             </a:r>
             <a:r>
-              <a:rPr lang="en-US" sz="4100" dirty="0" smtClean="0"/>
+              <a:rPr lang="en-US" sz="3100" dirty="0" smtClean="0"/>
               <a:t>of </a:t>
             </a:r>
             <a:r>
-              <a:rPr lang="en-US" sz="4100" dirty="0"/>
+              <a:rPr lang="en-US" sz="3100" dirty="0"/>
               <a:t>the </a:t>
             </a:r>
             <a:r>
-              <a:rPr lang="en-US" sz="4100" dirty="0" smtClean="0"/>
+              <a:rPr lang="en-US" sz="3100" dirty="0" smtClean="0"/>
               <a:t>analyst</a:t>
             </a:r>
           </a:p>
@@ -10077,8 +10077,12 @@
               <a:buChar char="-"/>
             </a:pPr>
             <a:r>
-              <a:rPr lang="en-US" sz="4100" dirty="0" smtClean="0"/>
-              <a:t>very time-consuming</a:t>
+              <a:rPr lang="en-US" sz="3100" dirty="0" smtClean="0"/>
+              <a:t> very </a:t>
+            </a:r>
+            <a:r>
+              <a:rPr lang="en-US" sz="3100" dirty="0" smtClean="0"/>
+              <a:t>time-consuming</a:t>
             </a:r>
           </a:p>
           <a:p>
@@ -10087,8 +10091,12 @@
               <a:buChar char="ü"/>
             </a:pPr>
             <a:r>
-              <a:rPr lang="en-US" sz="4100" dirty="0" smtClean="0"/>
-              <a:t>generates new theory</a:t>
+              <a:rPr lang="en-US" sz="3100" dirty="0" smtClean="0"/>
+              <a:t> generates </a:t>
+            </a:r>
+            <a:r>
+              <a:rPr lang="en-US" sz="3100" dirty="0" smtClean="0"/>
+              <a:t>new theory</a:t>
             </a:r>
           </a:p>
         </p:txBody>
@@ -10102,7 +10110,7 @@
           <p:nvPr>
             <p:extLst>
               <p:ext uri="{D42A27DB-BD31-4B8C-83A1-F6EECF244321}">
-                <p14:modId xmlns:p14="http://schemas.microsoft.com/office/powerpoint/2010/main" val="3699555679"/>
+                <p14:modId xmlns:p14="http://schemas.microsoft.com/office/powerpoint/2010/main" xmlns="" val="3699555679"/>
               </p:ext>
             </p:extLst>
           </p:nvPr>
@@ -10194,7 +10202,7 @@
         </p:spPr>
         <p:txBody>
           <a:bodyPr>
-            <a:normAutofit fontScale="85000" lnSpcReduction="20000"/>
+            <a:normAutofit fontScale="92500" lnSpcReduction="10000"/>
           </a:bodyPr>
           <a:lstStyle/>
           <a:p>
@@ -10245,8 +10253,12 @@
               <a:buChar char="-"/>
             </a:pPr>
             <a:r>
-              <a:rPr lang="en-US" sz="3800" dirty="0" smtClean="0"/>
-              <a:t>difficult for other researchers to use in practice</a:t>
+              <a:rPr lang="en-US" sz="2800" dirty="0" smtClean="0"/>
+              <a:t> difficult </a:t>
+            </a:r>
+            <a:r>
+              <a:rPr lang="en-US" sz="2800" dirty="0" smtClean="0"/>
+              <a:t>for other researchers to use in practice</a:t>
             </a:r>
           </a:p>
           <a:p>
@@ -10255,8 +10267,12 @@
               <a:buChar char="ü"/>
             </a:pPr>
             <a:r>
-              <a:rPr lang="en-US" sz="3800" dirty="0" smtClean="0"/>
-              <a:t>Synthesizes new concepts</a:t>
+              <a:rPr lang="en-US" sz="2800" dirty="0" smtClean="0"/>
+              <a:t> synthesizes </a:t>
+            </a:r>
+            <a:r>
+              <a:rPr lang="en-US" sz="2800" dirty="0" smtClean="0"/>
+              <a:t>new concepts</a:t>
             </a:r>
           </a:p>
         </p:txBody>
@@ -10268,13 +10284,13 @@
           <p:nvPr>
             <p:extLst>
               <p:ext uri="{D42A27DB-BD31-4B8C-83A1-F6EECF244321}">
-                <p14:modId xmlns:p14="http://schemas.microsoft.com/office/powerpoint/2010/main" val="3247369186"/>
+                <p14:modId xmlns:p14="http://schemas.microsoft.com/office/powerpoint/2010/main" xmlns="" val="3247369186"/>
               </p:ext>
             </p:extLst>
           </p:nvPr>
         </p:nvGraphicFramePr>
         <p:xfrm>
-          <a:off x="2278772" y="1772816"/>
+          <a:off x="2339752" y="1988840"/>
           <a:ext cx="4632176" cy="2968104"/>
         </p:xfrm>
         <a:graphic>
@@ -10341,7 +10357,7 @@
     </a:clrScheme>
     <a:fontScheme name="Rückblick">
       <a:majorFont>
-        <a:latin typeface="Calibri Light" panose="020F0302020204030204"/>
+        <a:latin typeface="Calibri Light"/>
         <a:ea typeface=""/>
         <a:cs typeface=""/>
         <a:font script="Jpan" typeface="ＭＳ Ｐゴシック"/>
@@ -10376,7 +10392,7 @@
         <a:font script="Geor" typeface="Sylfaen"/>
       </a:majorFont>
       <a:minorFont>
-        <a:latin typeface="Calibri" panose="020F0502020204030204"/>
+        <a:latin typeface="Calibri"/>
         <a:ea typeface=""/>
         <a:cs typeface=""/>
         <a:font script="Jpan" typeface="ＭＳ Ｐゴシック"/>
@@ -10575,7 +10591,7 @@
   <a:extraClrSchemeLst/>
   <a:extLst>
     <a:ext uri="{05A4C25C-085E-4340-85A3-A5531E510DB2}">
-      <thm15:themeFamily xmlns:thm15="http://schemas.microsoft.com/office/thememl/2012/main" name="Retrospect" id="{5F128B03-DCCA-4EEB-AB3B-CF2899314A46}" vid="{9CC26709-368C-4D72-9060-94E5B3FF3CD6}"/>
+      <thm15:themeFamily xmlns:thm15="http://schemas.microsoft.com/office/thememl/2012/main" xmlns="" name="Retrospect" id="{5F128B03-DCCA-4EEB-AB3B-CF2899314A46}" vid="{9CC26709-368C-4D72-9060-94E5B3FF3CD6}"/>
     </a:ext>
   </a:extLst>
 </a:theme>

</xml_diff>